<commit_message>
Sections added in different files, images updated
</commit_message>
<xml_diff>
--- a/images/ArrayIndex.pptx
+++ b/images/ArrayIndex.pptx
@@ -9,6 +9,7 @@
     <p:sldId id="257" r:id="rId3"/>
     <p:sldId id="258" r:id="rId4"/>
     <p:sldId id="259" r:id="rId5"/>
+    <p:sldId id="260" r:id="rId6"/>
   </p:sldIdLst>
   <p:sldSz cx="12192000" cy="6858000"/>
   <p:notesSz cx="6858000" cy="9144000"/>
@@ -246,7 +247,7 @@
           <a:p>
             <a:fld id="{6E95F330-DC13-4D7E-9BB4-97CFBD9A349B}" type="datetimeFigureOut">
               <a:rPr lang="en-US" smtClean="0"/>
-              <a:t>28-Jul-14</a:t>
+              <a:t>25-Sep-14</a:t>
             </a:fld>
             <a:endParaRPr lang="en-US"/>
           </a:p>
@@ -416,7 +417,7 @@
           <a:p>
             <a:fld id="{6E95F330-DC13-4D7E-9BB4-97CFBD9A349B}" type="datetimeFigureOut">
               <a:rPr lang="en-US" smtClean="0"/>
-              <a:t>28-Jul-14</a:t>
+              <a:t>25-Sep-14</a:t>
             </a:fld>
             <a:endParaRPr lang="en-US"/>
           </a:p>
@@ -596,7 +597,7 @@
           <a:p>
             <a:fld id="{6E95F330-DC13-4D7E-9BB4-97CFBD9A349B}" type="datetimeFigureOut">
               <a:rPr lang="en-US" smtClean="0"/>
-              <a:t>28-Jul-14</a:t>
+              <a:t>25-Sep-14</a:t>
             </a:fld>
             <a:endParaRPr lang="en-US"/>
           </a:p>
@@ -766,7 +767,7 @@
           <a:p>
             <a:fld id="{6E95F330-DC13-4D7E-9BB4-97CFBD9A349B}" type="datetimeFigureOut">
               <a:rPr lang="en-US" smtClean="0"/>
-              <a:t>28-Jul-14</a:t>
+              <a:t>25-Sep-14</a:t>
             </a:fld>
             <a:endParaRPr lang="en-US"/>
           </a:p>
@@ -1012,7 +1013,7 @@
           <a:p>
             <a:fld id="{6E95F330-DC13-4D7E-9BB4-97CFBD9A349B}" type="datetimeFigureOut">
               <a:rPr lang="en-US" smtClean="0"/>
-              <a:t>28-Jul-14</a:t>
+              <a:t>25-Sep-14</a:t>
             </a:fld>
             <a:endParaRPr lang="en-US"/>
           </a:p>
@@ -1244,7 +1245,7 @@
           <a:p>
             <a:fld id="{6E95F330-DC13-4D7E-9BB4-97CFBD9A349B}" type="datetimeFigureOut">
               <a:rPr lang="en-US" smtClean="0"/>
-              <a:t>28-Jul-14</a:t>
+              <a:t>25-Sep-14</a:t>
             </a:fld>
             <a:endParaRPr lang="en-US"/>
           </a:p>
@@ -1611,7 +1612,7 @@
           <a:p>
             <a:fld id="{6E95F330-DC13-4D7E-9BB4-97CFBD9A349B}" type="datetimeFigureOut">
               <a:rPr lang="en-US" smtClean="0"/>
-              <a:t>28-Jul-14</a:t>
+              <a:t>25-Sep-14</a:t>
             </a:fld>
             <a:endParaRPr lang="en-US"/>
           </a:p>
@@ -1729,7 +1730,7 @@
           <a:p>
             <a:fld id="{6E95F330-DC13-4D7E-9BB4-97CFBD9A349B}" type="datetimeFigureOut">
               <a:rPr lang="en-US" smtClean="0"/>
-              <a:t>28-Jul-14</a:t>
+              <a:t>25-Sep-14</a:t>
             </a:fld>
             <a:endParaRPr lang="en-US"/>
           </a:p>
@@ -1824,7 +1825,7 @@
           <a:p>
             <a:fld id="{6E95F330-DC13-4D7E-9BB4-97CFBD9A349B}" type="datetimeFigureOut">
               <a:rPr lang="en-US" smtClean="0"/>
-              <a:t>28-Jul-14</a:t>
+              <a:t>25-Sep-14</a:t>
             </a:fld>
             <a:endParaRPr lang="en-US"/>
           </a:p>
@@ -2101,7 +2102,7 @@
           <a:p>
             <a:fld id="{6E95F330-DC13-4D7E-9BB4-97CFBD9A349B}" type="datetimeFigureOut">
               <a:rPr lang="en-US" smtClean="0"/>
-              <a:t>28-Jul-14</a:t>
+              <a:t>25-Sep-14</a:t>
             </a:fld>
             <a:endParaRPr lang="en-US"/>
           </a:p>
@@ -2354,7 +2355,7 @@
           <a:p>
             <a:fld id="{6E95F330-DC13-4D7E-9BB4-97CFBD9A349B}" type="datetimeFigureOut">
               <a:rPr lang="en-US" smtClean="0"/>
-              <a:t>28-Jul-14</a:t>
+              <a:t>25-Sep-14</a:t>
             </a:fld>
             <a:endParaRPr lang="en-US"/>
           </a:p>
@@ -2567,7 +2568,7 @@
           <a:p>
             <a:fld id="{6E95F330-DC13-4D7E-9BB4-97CFBD9A349B}" type="datetimeFigureOut">
               <a:rPr lang="en-US" smtClean="0"/>
-              <a:t>28-Jul-14</a:t>
+              <a:t>25-Sep-14</a:t>
             </a:fld>
             <a:endParaRPr lang="en-US"/>
           </a:p>
@@ -6037,6 +6038,93 @@
 </p:sld>
 </file>
 
+<file path=ppt/slides/slide5.xml><?xml version="1.0" encoding="utf-8"?>
+<p:sld xmlns:a="http://schemas.openxmlformats.org/drawingml/2006/main" xmlns:r="http://schemas.openxmlformats.org/officeDocument/2006/relationships" xmlns:p="http://schemas.openxmlformats.org/presentationml/2006/main">
+  <p:cSld>
+    <p:spTree>
+      <p:nvGrpSpPr>
+        <p:cNvPr id="1" name=""/>
+        <p:cNvGrpSpPr/>
+        <p:nvPr/>
+      </p:nvGrpSpPr>
+      <p:grpSpPr>
+        <a:xfrm>
+          <a:off x="0" y="0"/>
+          <a:ext cx="0" cy="0"/>
+          <a:chOff x="0" y="0"/>
+          <a:chExt cx="0" cy="0"/>
+        </a:xfrm>
+      </p:grpSpPr>
+      <p:graphicFrame>
+        <p:nvGraphicFramePr>
+          <p:cNvPr id="6" name="Object 5"/>
+          <p:cNvGraphicFramePr>
+            <a:graphicFrameLocks noChangeAspect="1"/>
+          </p:cNvGraphicFramePr>
+          <p:nvPr>
+            <p:extLst>
+              <p:ext uri="{D42A27DB-BD31-4B8C-83A1-F6EECF244321}">
+                <p14:modId xmlns:p14="http://schemas.microsoft.com/office/powerpoint/2010/main" val="4063020326"/>
+              </p:ext>
+            </p:extLst>
+          </p:nvPr>
+        </p:nvGraphicFramePr>
+        <p:xfrm>
+          <a:off x="3016380" y="182006"/>
+          <a:ext cx="5354550" cy="6509719"/>
+        </p:xfrm>
+        <a:graphic>
+          <a:graphicData uri="http://schemas.openxmlformats.org/presentationml/2006/ole">
+            <mc:AlternateContent xmlns:mc="http://schemas.openxmlformats.org/markup-compatibility/2006">
+              <mc:Choice xmlns:v="urn:schemas-microsoft-com:vml" Requires="v">
+                <p:oleObj spid="_x0000_s1030" name="Visio" r:id="rId3" imgW="3752882" imgH="4562496" progId="Visio.Drawing.15">
+                  <p:embed/>
+                </p:oleObj>
+              </mc:Choice>
+              <mc:Fallback>
+                <p:oleObj name="Visio" r:id="rId3" imgW="3752882" imgH="4562496" progId="Visio.Drawing.15">
+                  <p:embed/>
+                  <p:pic>
+                    <p:nvPicPr>
+                      <p:cNvPr id="0" name=""/>
+                      <p:cNvPicPr/>
+                      <p:nvPr/>
+                    </p:nvPicPr>
+                    <p:blipFill>
+                      <a:blip r:embed="rId4"/>
+                      <a:stretch>
+                        <a:fillRect/>
+                      </a:stretch>
+                    </p:blipFill>
+                    <p:spPr>
+                      <a:xfrm>
+                        <a:off x="3016380" y="182006"/>
+                        <a:ext cx="5354550" cy="6509719"/>
+                      </a:xfrm>
+                      <a:prstGeom prst="rect">
+                        <a:avLst/>
+                      </a:prstGeom>
+                    </p:spPr>
+                  </p:pic>
+                </p:oleObj>
+              </mc:Fallback>
+            </mc:AlternateContent>
+          </a:graphicData>
+        </a:graphic>
+      </p:graphicFrame>
+    </p:spTree>
+    <p:extLst>
+      <p:ext uri="{BB962C8B-B14F-4D97-AF65-F5344CB8AC3E}">
+        <p14:creationId xmlns:p14="http://schemas.microsoft.com/office/powerpoint/2010/main" val="1375036676"/>
+      </p:ext>
+    </p:extLst>
+  </p:cSld>
+  <p:clrMapOvr>
+    <a:masterClrMapping/>
+  </p:clrMapOvr>
+</p:sld>
+</file>
+
 <file path=ppt/theme/theme1.xml><?xml version="1.0" encoding="utf-8"?>
 <a:theme xmlns:a="http://schemas.openxmlformats.org/drawingml/2006/main" name="Office Theme">
   <a:themeElements>

</xml_diff>

<commit_message>
Overall design diagram changed
</commit_message>
<xml_diff>
--- a/images/ArrayIndex.pptx
+++ b/images/ArrayIndex.pptx
@@ -10,6 +10,8 @@
     <p:sldId id="258" r:id="rId4"/>
     <p:sldId id="259" r:id="rId5"/>
     <p:sldId id="260" r:id="rId6"/>
+    <p:sldId id="261" r:id="rId7"/>
+    <p:sldId id="262" r:id="rId8"/>
   </p:sldIdLst>
   <p:sldSz cx="12192000" cy="6858000"/>
   <p:notesSz cx="6858000" cy="9144000"/>
@@ -247,7 +249,7 @@
           <a:p>
             <a:fld id="{6E95F330-DC13-4D7E-9BB4-97CFBD9A349B}" type="datetimeFigureOut">
               <a:rPr lang="en-US" smtClean="0"/>
-              <a:t>25-Sep-14</a:t>
+              <a:t>03-Nov-14</a:t>
             </a:fld>
             <a:endParaRPr lang="en-US"/>
           </a:p>
@@ -417,7 +419,7 @@
           <a:p>
             <a:fld id="{6E95F330-DC13-4D7E-9BB4-97CFBD9A349B}" type="datetimeFigureOut">
               <a:rPr lang="en-US" smtClean="0"/>
-              <a:t>25-Sep-14</a:t>
+              <a:t>03-Nov-14</a:t>
             </a:fld>
             <a:endParaRPr lang="en-US"/>
           </a:p>
@@ -597,7 +599,7 @@
           <a:p>
             <a:fld id="{6E95F330-DC13-4D7E-9BB4-97CFBD9A349B}" type="datetimeFigureOut">
               <a:rPr lang="en-US" smtClean="0"/>
-              <a:t>25-Sep-14</a:t>
+              <a:t>03-Nov-14</a:t>
             </a:fld>
             <a:endParaRPr lang="en-US"/>
           </a:p>
@@ -767,7 +769,7 @@
           <a:p>
             <a:fld id="{6E95F330-DC13-4D7E-9BB4-97CFBD9A349B}" type="datetimeFigureOut">
               <a:rPr lang="en-US" smtClean="0"/>
-              <a:t>25-Sep-14</a:t>
+              <a:t>03-Nov-14</a:t>
             </a:fld>
             <a:endParaRPr lang="en-US"/>
           </a:p>
@@ -1013,7 +1015,7 @@
           <a:p>
             <a:fld id="{6E95F330-DC13-4D7E-9BB4-97CFBD9A349B}" type="datetimeFigureOut">
               <a:rPr lang="en-US" smtClean="0"/>
-              <a:t>25-Sep-14</a:t>
+              <a:t>03-Nov-14</a:t>
             </a:fld>
             <a:endParaRPr lang="en-US"/>
           </a:p>
@@ -1245,7 +1247,7 @@
           <a:p>
             <a:fld id="{6E95F330-DC13-4D7E-9BB4-97CFBD9A349B}" type="datetimeFigureOut">
               <a:rPr lang="en-US" smtClean="0"/>
-              <a:t>25-Sep-14</a:t>
+              <a:t>03-Nov-14</a:t>
             </a:fld>
             <a:endParaRPr lang="en-US"/>
           </a:p>
@@ -1612,7 +1614,7 @@
           <a:p>
             <a:fld id="{6E95F330-DC13-4D7E-9BB4-97CFBD9A349B}" type="datetimeFigureOut">
               <a:rPr lang="en-US" smtClean="0"/>
-              <a:t>25-Sep-14</a:t>
+              <a:t>03-Nov-14</a:t>
             </a:fld>
             <a:endParaRPr lang="en-US"/>
           </a:p>
@@ -1730,7 +1732,7 @@
           <a:p>
             <a:fld id="{6E95F330-DC13-4D7E-9BB4-97CFBD9A349B}" type="datetimeFigureOut">
               <a:rPr lang="en-US" smtClean="0"/>
-              <a:t>25-Sep-14</a:t>
+              <a:t>03-Nov-14</a:t>
             </a:fld>
             <a:endParaRPr lang="en-US"/>
           </a:p>
@@ -1825,7 +1827,7 @@
           <a:p>
             <a:fld id="{6E95F330-DC13-4D7E-9BB4-97CFBD9A349B}" type="datetimeFigureOut">
               <a:rPr lang="en-US" smtClean="0"/>
-              <a:t>25-Sep-14</a:t>
+              <a:t>03-Nov-14</a:t>
             </a:fld>
             <a:endParaRPr lang="en-US"/>
           </a:p>
@@ -2102,7 +2104,7 @@
           <a:p>
             <a:fld id="{6E95F330-DC13-4D7E-9BB4-97CFBD9A349B}" type="datetimeFigureOut">
               <a:rPr lang="en-US" smtClean="0"/>
-              <a:t>25-Sep-14</a:t>
+              <a:t>03-Nov-14</a:t>
             </a:fld>
             <a:endParaRPr lang="en-US"/>
           </a:p>
@@ -2355,7 +2357,7 @@
           <a:p>
             <a:fld id="{6E95F330-DC13-4D7E-9BB4-97CFBD9A349B}" type="datetimeFigureOut">
               <a:rPr lang="en-US" smtClean="0"/>
-              <a:t>25-Sep-14</a:t>
+              <a:t>03-Nov-14</a:t>
             </a:fld>
             <a:endParaRPr lang="en-US"/>
           </a:p>
@@ -2568,7 +2570,7 @@
           <a:p>
             <a:fld id="{6E95F330-DC13-4D7E-9BB4-97CFBD9A349B}" type="datetimeFigureOut">
               <a:rPr lang="en-US" smtClean="0"/>
-              <a:t>25-Sep-14</a:t>
+              <a:t>03-Nov-14</a:t>
             </a:fld>
             <a:endParaRPr lang="en-US"/>
           </a:p>
@@ -6077,7 +6079,7 @@
           <a:graphicData uri="http://schemas.openxmlformats.org/presentationml/2006/ole">
             <mc:AlternateContent xmlns:mc="http://schemas.openxmlformats.org/markup-compatibility/2006">
               <mc:Choice xmlns:v="urn:schemas-microsoft-com:vml" Requires="v">
-                <p:oleObj spid="_x0000_s1030" name="Visio" r:id="rId3" imgW="3752882" imgH="4562496" progId="Visio.Drawing.15">
+                <p:oleObj spid="_x0000_s1044" name="Visio" r:id="rId3" imgW="3752882" imgH="4562496" progId="Visio.Drawing.15">
                   <p:embed/>
                 </p:oleObj>
               </mc:Choice>
@@ -6116,6 +6118,788 @@
     <p:extLst>
       <p:ext uri="{BB962C8B-B14F-4D97-AF65-F5344CB8AC3E}">
         <p14:creationId xmlns:p14="http://schemas.microsoft.com/office/powerpoint/2010/main" val="1375036676"/>
+      </p:ext>
+    </p:extLst>
+  </p:cSld>
+  <p:clrMapOvr>
+    <a:masterClrMapping/>
+  </p:clrMapOvr>
+</p:sld>
+</file>
+
+<file path=ppt/slides/slide6.xml><?xml version="1.0" encoding="utf-8"?>
+<p:sld xmlns:a="http://schemas.openxmlformats.org/drawingml/2006/main" xmlns:r="http://schemas.openxmlformats.org/officeDocument/2006/relationships" xmlns:p="http://schemas.openxmlformats.org/presentationml/2006/main">
+  <p:cSld>
+    <p:spTree>
+      <p:nvGrpSpPr>
+        <p:cNvPr id="1" name=""/>
+        <p:cNvGrpSpPr/>
+        <p:nvPr/>
+      </p:nvGrpSpPr>
+      <p:grpSpPr>
+        <a:xfrm>
+          <a:off x="0" y="0"/>
+          <a:ext cx="0" cy="0"/>
+          <a:chOff x="0" y="0"/>
+          <a:chExt cx="0" cy="0"/>
+        </a:xfrm>
+      </p:grpSpPr>
+      <p:pic>
+        <p:nvPicPr>
+          <p:cNvPr id="4" name="Picture 3"/>
+          <p:cNvPicPr>
+            <a:picLocks noChangeAspect="1"/>
+          </p:cNvPicPr>
+          <p:nvPr/>
+        </p:nvPicPr>
+        <p:blipFill>
+          <a:blip r:embed="rId2"/>
+          <a:stretch>
+            <a:fillRect/>
+          </a:stretch>
+        </p:blipFill>
+        <p:spPr>
+          <a:xfrm>
+            <a:off x="1466850" y="1368643"/>
+            <a:ext cx="9837788" cy="4108232"/>
+          </a:xfrm>
+          <a:prstGeom prst="rect">
+            <a:avLst/>
+          </a:prstGeom>
+        </p:spPr>
+      </p:pic>
+    </p:spTree>
+    <p:extLst>
+      <p:ext uri="{BB962C8B-B14F-4D97-AF65-F5344CB8AC3E}">
+        <p14:creationId xmlns:p14="http://schemas.microsoft.com/office/powerpoint/2010/main" val="1140815350"/>
+      </p:ext>
+    </p:extLst>
+  </p:cSld>
+  <p:clrMapOvr>
+    <a:masterClrMapping/>
+  </p:clrMapOvr>
+</p:sld>
+</file>
+
+<file path=ppt/slides/slide7.xml><?xml version="1.0" encoding="utf-8"?>
+<p:sld xmlns:a="http://schemas.openxmlformats.org/drawingml/2006/main" xmlns:r="http://schemas.openxmlformats.org/officeDocument/2006/relationships" xmlns:p="http://schemas.openxmlformats.org/presentationml/2006/main">
+  <p:cSld>
+    <p:spTree>
+      <p:nvGrpSpPr>
+        <p:cNvPr id="1" name=""/>
+        <p:cNvGrpSpPr/>
+        <p:nvPr/>
+      </p:nvGrpSpPr>
+      <p:grpSpPr>
+        <a:xfrm>
+          <a:off x="0" y="0"/>
+          <a:ext cx="0" cy="0"/>
+          <a:chOff x="0" y="0"/>
+          <a:chExt cx="0" cy="0"/>
+        </a:xfrm>
+      </p:grpSpPr>
+      <p:sp>
+        <p:nvSpPr>
+          <p:cNvPr id="4" name="Rectangle 3"/>
+          <p:cNvSpPr/>
+          <p:nvPr/>
+        </p:nvSpPr>
+        <p:spPr>
+          <a:xfrm>
+            <a:off x="2201562" y="2830212"/>
+            <a:ext cx="1713470" cy="782595"/>
+          </a:xfrm>
+          <a:prstGeom prst="rect">
+            <a:avLst/>
+          </a:prstGeom>
+        </p:spPr>
+        <p:style>
+          <a:lnRef idx="2">
+            <a:schemeClr val="dk1"/>
+          </a:lnRef>
+          <a:fillRef idx="1">
+            <a:schemeClr val="lt1"/>
+          </a:fillRef>
+          <a:effectRef idx="0">
+            <a:schemeClr val="dk1"/>
+          </a:effectRef>
+          <a:fontRef idx="minor">
+            <a:schemeClr val="dk1"/>
+          </a:fontRef>
+        </p:style>
+        <p:txBody>
+          <a:bodyPr rtlCol="0" anchor="ctr"/>
+          <a:lstStyle/>
+          <a:p>
+            <a:pPr algn="ctr"/>
+            <a:r>
+              <a:rPr lang="en-US" dirty="0" smtClean="0"/>
+              <a:t>Taint analysis module</a:t>
+            </a:r>
+            <a:endParaRPr lang="en-US" dirty="0"/>
+          </a:p>
+        </p:txBody>
+      </p:sp>
+      <p:sp>
+        <p:nvSpPr>
+          <p:cNvPr id="5" name="Rectangle 4"/>
+          <p:cNvSpPr/>
+          <p:nvPr/>
+        </p:nvSpPr>
+        <p:spPr>
+          <a:xfrm>
+            <a:off x="4103739" y="2831499"/>
+            <a:ext cx="1713470" cy="782595"/>
+          </a:xfrm>
+          <a:prstGeom prst="rect">
+            <a:avLst/>
+          </a:prstGeom>
+        </p:spPr>
+        <p:style>
+          <a:lnRef idx="2">
+            <a:schemeClr val="dk1"/>
+          </a:lnRef>
+          <a:fillRef idx="1">
+            <a:schemeClr val="lt1"/>
+          </a:fillRef>
+          <a:effectRef idx="0">
+            <a:schemeClr val="dk1"/>
+          </a:effectRef>
+          <a:fontRef idx="minor">
+            <a:schemeClr val="dk1"/>
+          </a:fontRef>
+        </p:style>
+        <p:txBody>
+          <a:bodyPr rtlCol="0" anchor="ctr"/>
+          <a:lstStyle/>
+          <a:p>
+            <a:pPr algn="ctr"/>
+            <a:r>
+              <a:rPr lang="en-US" dirty="0" smtClean="0"/>
+              <a:t>Call graph analysis module</a:t>
+            </a:r>
+            <a:endParaRPr lang="en-US" dirty="0"/>
+          </a:p>
+        </p:txBody>
+      </p:sp>
+      <p:sp>
+        <p:nvSpPr>
+          <p:cNvPr id="6" name="Rounded Rectangle 5"/>
+          <p:cNvSpPr/>
+          <p:nvPr/>
+        </p:nvSpPr>
+        <p:spPr>
+          <a:xfrm>
+            <a:off x="5372621" y="2097295"/>
+            <a:ext cx="1084859" cy="395416"/>
+          </a:xfrm>
+          <a:prstGeom prst="roundRect">
+            <a:avLst/>
+          </a:prstGeom>
+          <a:ln w="19050"/>
+        </p:spPr>
+        <p:style>
+          <a:lnRef idx="2">
+            <a:schemeClr val="dk1"/>
+          </a:lnRef>
+          <a:fillRef idx="1">
+            <a:schemeClr val="lt1"/>
+          </a:fillRef>
+          <a:effectRef idx="0">
+            <a:schemeClr val="dk1"/>
+          </a:effectRef>
+          <a:fontRef idx="minor">
+            <a:schemeClr val="dk1"/>
+          </a:fontRef>
+        </p:style>
+        <p:txBody>
+          <a:bodyPr rtlCol="0" anchor="ctr"/>
+          <a:lstStyle/>
+          <a:p>
+            <a:pPr algn="ctr"/>
+            <a:r>
+              <a:rPr lang="en-US" sz="1400" dirty="0" smtClean="0"/>
+              <a:t>Byte code</a:t>
+            </a:r>
+            <a:endParaRPr lang="en-US" sz="1400" dirty="0"/>
+          </a:p>
+        </p:txBody>
+      </p:sp>
+      <p:sp>
+        <p:nvSpPr>
+          <p:cNvPr id="7" name="Rounded Rectangle 6"/>
+          <p:cNvSpPr/>
+          <p:nvPr/>
+        </p:nvSpPr>
+        <p:spPr>
+          <a:xfrm>
+            <a:off x="2294512" y="3958797"/>
+            <a:ext cx="1525270" cy="413177"/>
+          </a:xfrm>
+          <a:prstGeom prst="roundRect">
+            <a:avLst/>
+          </a:prstGeom>
+        </p:spPr>
+        <p:style>
+          <a:lnRef idx="2">
+            <a:schemeClr val="dk1"/>
+          </a:lnRef>
+          <a:fillRef idx="1">
+            <a:schemeClr val="lt1"/>
+          </a:fillRef>
+          <a:effectRef idx="0">
+            <a:schemeClr val="dk1"/>
+          </a:effectRef>
+          <a:fontRef idx="minor">
+            <a:schemeClr val="dk1"/>
+          </a:fontRef>
+        </p:style>
+        <p:txBody>
+          <a:bodyPr rtlCol="0" anchor="ctr"/>
+          <a:lstStyle/>
+          <a:p>
+            <a:pPr algn="ctr"/>
+            <a:r>
+              <a:rPr lang="en-US" sz="1400" dirty="0" smtClean="0"/>
+              <a:t>Source and sink information</a:t>
+            </a:r>
+            <a:endParaRPr lang="en-US" sz="1400" dirty="0"/>
+          </a:p>
+        </p:txBody>
+      </p:sp>
+      <p:cxnSp>
+        <p:nvCxnSpPr>
+          <p:cNvPr id="9" name="Straight Arrow Connector 8"/>
+          <p:cNvCxnSpPr>
+            <a:stCxn id="6" idx="2"/>
+            <a:endCxn id="4" idx="0"/>
+          </p:cNvCxnSpPr>
+          <p:nvPr/>
+        </p:nvCxnSpPr>
+        <p:spPr>
+          <a:xfrm flipH="1">
+            <a:off x="3058297" y="2492711"/>
+            <a:ext cx="2856754" cy="337501"/>
+          </a:xfrm>
+          <a:prstGeom prst="straightConnector1">
+            <a:avLst/>
+          </a:prstGeom>
+          <a:ln w="12700">
+            <a:tailEnd type="triangle"/>
+          </a:ln>
+        </p:spPr>
+        <p:style>
+          <a:lnRef idx="1">
+            <a:schemeClr val="dk1"/>
+          </a:lnRef>
+          <a:fillRef idx="0">
+            <a:schemeClr val="dk1"/>
+          </a:fillRef>
+          <a:effectRef idx="0">
+            <a:schemeClr val="dk1"/>
+          </a:effectRef>
+          <a:fontRef idx="minor">
+            <a:schemeClr val="tx1"/>
+          </a:fontRef>
+        </p:style>
+      </p:cxnSp>
+      <p:cxnSp>
+        <p:nvCxnSpPr>
+          <p:cNvPr id="10" name="Straight Arrow Connector 9"/>
+          <p:cNvCxnSpPr>
+            <a:stCxn id="7" idx="0"/>
+            <a:endCxn id="4" idx="2"/>
+          </p:cNvCxnSpPr>
+          <p:nvPr/>
+        </p:nvCxnSpPr>
+        <p:spPr>
+          <a:xfrm flipV="1">
+            <a:off x="3057147" y="3612807"/>
+            <a:ext cx="1150" cy="345990"/>
+          </a:xfrm>
+          <a:prstGeom prst="straightConnector1">
+            <a:avLst/>
+          </a:prstGeom>
+          <a:ln w="12700">
+            <a:tailEnd type="triangle"/>
+          </a:ln>
+        </p:spPr>
+        <p:style>
+          <a:lnRef idx="1">
+            <a:schemeClr val="dk1"/>
+          </a:lnRef>
+          <a:fillRef idx="0">
+            <a:schemeClr val="dk1"/>
+          </a:fillRef>
+          <a:effectRef idx="0">
+            <a:schemeClr val="dk1"/>
+          </a:effectRef>
+          <a:fontRef idx="minor">
+            <a:schemeClr val="tx1"/>
+          </a:fontRef>
+        </p:style>
+      </p:cxnSp>
+      <p:cxnSp>
+        <p:nvCxnSpPr>
+          <p:cNvPr id="24" name="Straight Arrow Connector 23"/>
+          <p:cNvCxnSpPr>
+            <a:stCxn id="4" idx="2"/>
+            <a:endCxn id="47" idx="0"/>
+          </p:cNvCxnSpPr>
+          <p:nvPr/>
+        </p:nvCxnSpPr>
+        <p:spPr>
+          <a:xfrm>
+            <a:off x="3058297" y="3612807"/>
+            <a:ext cx="1909155" cy="334018"/>
+          </a:xfrm>
+          <a:prstGeom prst="straightConnector1">
+            <a:avLst/>
+          </a:prstGeom>
+          <a:ln w="12700">
+            <a:tailEnd type="triangle"/>
+          </a:ln>
+        </p:spPr>
+        <p:style>
+          <a:lnRef idx="1">
+            <a:schemeClr val="dk1"/>
+          </a:lnRef>
+          <a:fillRef idx="0">
+            <a:schemeClr val="dk1"/>
+          </a:fillRef>
+          <a:effectRef idx="0">
+            <a:schemeClr val="dk1"/>
+          </a:effectRef>
+          <a:fontRef idx="minor">
+            <a:schemeClr val="tx1"/>
+          </a:fontRef>
+        </p:style>
+      </p:cxnSp>
+      <p:cxnSp>
+        <p:nvCxnSpPr>
+          <p:cNvPr id="32" name="Straight Arrow Connector 31"/>
+          <p:cNvCxnSpPr>
+            <a:stCxn id="6" idx="2"/>
+            <a:endCxn id="5" idx="0"/>
+          </p:cNvCxnSpPr>
+          <p:nvPr/>
+        </p:nvCxnSpPr>
+        <p:spPr>
+          <a:xfrm flipH="1">
+            <a:off x="4960474" y="2492711"/>
+            <a:ext cx="954577" cy="338788"/>
+          </a:xfrm>
+          <a:prstGeom prst="straightConnector1">
+            <a:avLst/>
+          </a:prstGeom>
+          <a:ln w="12700">
+            <a:tailEnd type="triangle"/>
+          </a:ln>
+        </p:spPr>
+        <p:style>
+          <a:lnRef idx="1">
+            <a:schemeClr val="dk1"/>
+          </a:lnRef>
+          <a:fillRef idx="0">
+            <a:schemeClr val="dk1"/>
+          </a:fillRef>
+          <a:effectRef idx="0">
+            <a:schemeClr val="dk1"/>
+          </a:effectRef>
+          <a:fontRef idx="minor">
+            <a:schemeClr val="tx1"/>
+          </a:fontRef>
+        </p:style>
+      </p:cxnSp>
+      <p:sp>
+        <p:nvSpPr>
+          <p:cNvPr id="38" name="Rectangle 37"/>
+          <p:cNvSpPr/>
+          <p:nvPr/>
+        </p:nvSpPr>
+        <p:spPr>
+          <a:xfrm>
+            <a:off x="6005916" y="2831499"/>
+            <a:ext cx="1713470" cy="782595"/>
+          </a:xfrm>
+          <a:prstGeom prst="rect">
+            <a:avLst/>
+          </a:prstGeom>
+        </p:spPr>
+        <p:style>
+          <a:lnRef idx="2">
+            <a:schemeClr val="dk1"/>
+          </a:lnRef>
+          <a:fillRef idx="1">
+            <a:schemeClr val="lt1"/>
+          </a:fillRef>
+          <a:effectRef idx="0">
+            <a:schemeClr val="dk1"/>
+          </a:effectRef>
+          <a:fontRef idx="minor">
+            <a:schemeClr val="dk1"/>
+          </a:fontRef>
+        </p:style>
+        <p:txBody>
+          <a:bodyPr rtlCol="0" anchor="ctr"/>
+          <a:lstStyle/>
+          <a:p>
+            <a:pPr algn="ctr"/>
+            <a:r>
+              <a:rPr lang="en-US" dirty="0" smtClean="0"/>
+              <a:t>Constraint analysis module</a:t>
+            </a:r>
+            <a:endParaRPr lang="en-US" dirty="0"/>
+          </a:p>
+        </p:txBody>
+      </p:sp>
+      <p:cxnSp>
+        <p:nvCxnSpPr>
+          <p:cNvPr id="40" name="Straight Arrow Connector 39"/>
+          <p:cNvCxnSpPr>
+            <a:stCxn id="6" idx="2"/>
+            <a:endCxn id="38" idx="0"/>
+          </p:cNvCxnSpPr>
+          <p:nvPr/>
+        </p:nvCxnSpPr>
+        <p:spPr>
+          <a:xfrm>
+            <a:off x="5915051" y="2492711"/>
+            <a:ext cx="947600" cy="338788"/>
+          </a:xfrm>
+          <a:prstGeom prst="straightConnector1">
+            <a:avLst/>
+          </a:prstGeom>
+          <a:ln w="12700">
+            <a:tailEnd type="triangle"/>
+          </a:ln>
+        </p:spPr>
+        <p:style>
+          <a:lnRef idx="1">
+            <a:schemeClr val="dk1"/>
+          </a:lnRef>
+          <a:fillRef idx="0">
+            <a:schemeClr val="dk1"/>
+          </a:fillRef>
+          <a:effectRef idx="0">
+            <a:schemeClr val="dk1"/>
+          </a:effectRef>
+          <a:fontRef idx="minor">
+            <a:schemeClr val="tx1"/>
+          </a:fontRef>
+        </p:style>
+      </p:cxnSp>
+      <p:sp>
+        <p:nvSpPr>
+          <p:cNvPr id="47" name="Rounded Rectangle 46"/>
+          <p:cNvSpPr/>
+          <p:nvPr/>
+        </p:nvSpPr>
+        <p:spPr>
+          <a:xfrm>
+            <a:off x="4425022" y="3946825"/>
+            <a:ext cx="1084859" cy="395416"/>
+          </a:xfrm>
+          <a:prstGeom prst="roundRect">
+            <a:avLst/>
+          </a:prstGeom>
+        </p:spPr>
+        <p:style>
+          <a:lnRef idx="2">
+            <a:schemeClr val="dk1"/>
+          </a:lnRef>
+          <a:fillRef idx="1">
+            <a:schemeClr val="lt1"/>
+          </a:fillRef>
+          <a:effectRef idx="0">
+            <a:schemeClr val="dk1"/>
+          </a:effectRef>
+          <a:fontRef idx="minor">
+            <a:schemeClr val="dk1"/>
+          </a:fontRef>
+        </p:style>
+        <p:txBody>
+          <a:bodyPr rtlCol="0" anchor="ctr"/>
+          <a:lstStyle/>
+          <a:p>
+            <a:pPr algn="ctr"/>
+            <a:r>
+              <a:rPr lang="en-US" sz="1400" dirty="0" smtClean="0"/>
+              <a:t>Safe Units</a:t>
+            </a:r>
+            <a:endParaRPr lang="en-US" sz="1400" dirty="0"/>
+          </a:p>
+        </p:txBody>
+      </p:sp>
+      <p:cxnSp>
+        <p:nvCxnSpPr>
+          <p:cNvPr id="50" name="Straight Arrow Connector 49"/>
+          <p:cNvCxnSpPr>
+            <a:stCxn id="38" idx="2"/>
+            <a:endCxn id="47" idx="0"/>
+          </p:cNvCxnSpPr>
+          <p:nvPr/>
+        </p:nvCxnSpPr>
+        <p:spPr>
+          <a:xfrm flipH="1">
+            <a:off x="4967452" y="3614094"/>
+            <a:ext cx="1895199" cy="332731"/>
+          </a:xfrm>
+          <a:prstGeom prst="straightConnector1">
+            <a:avLst/>
+          </a:prstGeom>
+          <a:ln w="12700">
+            <a:tailEnd type="triangle"/>
+          </a:ln>
+        </p:spPr>
+        <p:style>
+          <a:lnRef idx="1">
+            <a:schemeClr val="dk1"/>
+          </a:lnRef>
+          <a:fillRef idx="0">
+            <a:schemeClr val="dk1"/>
+          </a:fillRef>
+          <a:effectRef idx="0">
+            <a:schemeClr val="dk1"/>
+          </a:effectRef>
+          <a:fontRef idx="minor">
+            <a:schemeClr val="tx1"/>
+          </a:fontRef>
+        </p:style>
+      </p:cxnSp>
+      <p:cxnSp>
+        <p:nvCxnSpPr>
+          <p:cNvPr id="51" name="Straight Arrow Connector 50"/>
+          <p:cNvCxnSpPr>
+            <a:stCxn id="5" idx="2"/>
+            <a:endCxn id="47" idx="0"/>
+          </p:cNvCxnSpPr>
+          <p:nvPr/>
+        </p:nvCxnSpPr>
+        <p:spPr>
+          <a:xfrm>
+            <a:off x="4960474" y="3614094"/>
+            <a:ext cx="6978" cy="332731"/>
+          </a:xfrm>
+          <a:prstGeom prst="straightConnector1">
+            <a:avLst/>
+          </a:prstGeom>
+          <a:ln w="12700">
+            <a:tailEnd type="triangle"/>
+          </a:ln>
+        </p:spPr>
+        <p:style>
+          <a:lnRef idx="1">
+            <a:schemeClr val="dk1"/>
+          </a:lnRef>
+          <a:fillRef idx="0">
+            <a:schemeClr val="dk1"/>
+          </a:fillRef>
+          <a:effectRef idx="0">
+            <a:schemeClr val="dk1"/>
+          </a:effectRef>
+          <a:fontRef idx="minor">
+            <a:schemeClr val="tx1"/>
+          </a:fontRef>
+        </p:style>
+      </p:cxnSp>
+      <p:sp>
+        <p:nvSpPr>
+          <p:cNvPr id="61" name="Rectangle 60"/>
+          <p:cNvSpPr/>
+          <p:nvPr/>
+        </p:nvSpPr>
+        <p:spPr>
+          <a:xfrm>
+            <a:off x="7908093" y="2830212"/>
+            <a:ext cx="2135584" cy="782595"/>
+          </a:xfrm>
+          <a:prstGeom prst="rect">
+            <a:avLst/>
+          </a:prstGeom>
+        </p:spPr>
+        <p:style>
+          <a:lnRef idx="2">
+            <a:schemeClr val="dk1"/>
+          </a:lnRef>
+          <a:fillRef idx="1">
+            <a:schemeClr val="lt1"/>
+          </a:fillRef>
+          <a:effectRef idx="0">
+            <a:schemeClr val="dk1"/>
+          </a:effectRef>
+          <a:fontRef idx="minor">
+            <a:schemeClr val="dk1"/>
+          </a:fontRef>
+        </p:style>
+        <p:txBody>
+          <a:bodyPr rtlCol="0" anchor="ctr"/>
+          <a:lstStyle/>
+          <a:p>
+            <a:pPr algn="ctr"/>
+            <a:r>
+              <a:rPr lang="en-US" dirty="0" smtClean="0"/>
+              <a:t>Repairing + dynamic constraint instrumentation</a:t>
+            </a:r>
+            <a:endParaRPr lang="en-US" dirty="0"/>
+          </a:p>
+        </p:txBody>
+      </p:sp>
+      <p:cxnSp>
+        <p:nvCxnSpPr>
+          <p:cNvPr id="63" name="Elbow Connector 62"/>
+          <p:cNvCxnSpPr>
+            <a:stCxn id="47" idx="3"/>
+            <a:endCxn id="61" idx="2"/>
+          </p:cNvCxnSpPr>
+          <p:nvPr/>
+        </p:nvCxnSpPr>
+        <p:spPr>
+          <a:xfrm flipV="1">
+            <a:off x="5509881" y="3612807"/>
+            <a:ext cx="3466004" cy="531726"/>
+          </a:xfrm>
+          <a:prstGeom prst="bentConnector2">
+            <a:avLst/>
+          </a:prstGeom>
+          <a:ln w="12700">
+            <a:tailEnd type="triangle"/>
+          </a:ln>
+        </p:spPr>
+        <p:style>
+          <a:lnRef idx="1">
+            <a:schemeClr val="dk1"/>
+          </a:lnRef>
+          <a:fillRef idx="0">
+            <a:schemeClr val="dk1"/>
+          </a:fillRef>
+          <a:effectRef idx="0">
+            <a:schemeClr val="dk1"/>
+          </a:effectRef>
+          <a:fontRef idx="minor">
+            <a:schemeClr val="tx1"/>
+          </a:fontRef>
+        </p:style>
+      </p:cxnSp>
+      <p:cxnSp>
+        <p:nvCxnSpPr>
+          <p:cNvPr id="77" name="Straight Arrow Connector 76"/>
+          <p:cNvCxnSpPr>
+            <a:stCxn id="6" idx="2"/>
+            <a:endCxn id="61" idx="0"/>
+          </p:cNvCxnSpPr>
+          <p:nvPr/>
+        </p:nvCxnSpPr>
+        <p:spPr>
+          <a:xfrm>
+            <a:off x="5915051" y="2492711"/>
+            <a:ext cx="3060834" cy="337501"/>
+          </a:xfrm>
+          <a:prstGeom prst="straightConnector1">
+            <a:avLst/>
+          </a:prstGeom>
+          <a:ln w="12700">
+            <a:tailEnd type="triangle"/>
+          </a:ln>
+        </p:spPr>
+        <p:style>
+          <a:lnRef idx="1">
+            <a:schemeClr val="dk1"/>
+          </a:lnRef>
+          <a:fillRef idx="0">
+            <a:schemeClr val="dk1"/>
+          </a:fillRef>
+          <a:effectRef idx="0">
+            <a:schemeClr val="dk1"/>
+          </a:effectRef>
+          <a:fontRef idx="minor">
+            <a:schemeClr val="tx1"/>
+          </a:fontRef>
+        </p:style>
+      </p:cxnSp>
+      <p:sp>
+        <p:nvSpPr>
+          <p:cNvPr id="88" name="Rounded Rectangle 87"/>
+          <p:cNvSpPr/>
+          <p:nvPr/>
+        </p:nvSpPr>
+        <p:spPr>
+          <a:xfrm>
+            <a:off x="8087708" y="2097295"/>
+            <a:ext cx="1776353" cy="395416"/>
+          </a:xfrm>
+          <a:prstGeom prst="roundRect">
+            <a:avLst/>
+          </a:prstGeom>
+          <a:ln w="19050"/>
+        </p:spPr>
+        <p:style>
+          <a:lnRef idx="2">
+            <a:schemeClr val="dk1"/>
+          </a:lnRef>
+          <a:fillRef idx="1">
+            <a:schemeClr val="lt1"/>
+          </a:fillRef>
+          <a:effectRef idx="0">
+            <a:schemeClr val="dk1"/>
+          </a:effectRef>
+          <a:fontRef idx="minor">
+            <a:schemeClr val="dk1"/>
+          </a:fontRef>
+        </p:style>
+        <p:txBody>
+          <a:bodyPr rtlCol="0" anchor="ctr"/>
+          <a:lstStyle/>
+          <a:p>
+            <a:pPr algn="ctr"/>
+            <a:r>
+              <a:rPr lang="en-US" sz="1400" dirty="0" smtClean="0"/>
+              <a:t>Repaired Byte code</a:t>
+            </a:r>
+            <a:endParaRPr lang="en-US" sz="1400" dirty="0"/>
+          </a:p>
+        </p:txBody>
+      </p:sp>
+      <p:cxnSp>
+        <p:nvCxnSpPr>
+          <p:cNvPr id="89" name="Straight Arrow Connector 88"/>
+          <p:cNvCxnSpPr>
+            <a:stCxn id="61" idx="0"/>
+            <a:endCxn id="88" idx="2"/>
+          </p:cNvCxnSpPr>
+          <p:nvPr/>
+        </p:nvCxnSpPr>
+        <p:spPr>
+          <a:xfrm flipV="1">
+            <a:off x="8975885" y="2492711"/>
+            <a:ext cx="0" cy="337501"/>
+          </a:xfrm>
+          <a:prstGeom prst="straightConnector1">
+            <a:avLst/>
+          </a:prstGeom>
+          <a:ln w="12700">
+            <a:tailEnd type="triangle"/>
+          </a:ln>
+        </p:spPr>
+        <p:style>
+          <a:lnRef idx="1">
+            <a:schemeClr val="dk1"/>
+          </a:lnRef>
+          <a:fillRef idx="0">
+            <a:schemeClr val="dk1"/>
+          </a:fillRef>
+          <a:effectRef idx="0">
+            <a:schemeClr val="dk1"/>
+          </a:effectRef>
+          <a:fontRef idx="minor">
+            <a:schemeClr val="tx1"/>
+          </a:fontRef>
+        </p:style>
+      </p:cxnSp>
+    </p:spTree>
+    <p:extLst>
+      <p:ext uri="{BB962C8B-B14F-4D97-AF65-F5344CB8AC3E}">
+        <p14:creationId xmlns:p14="http://schemas.microsoft.com/office/powerpoint/2010/main" val="201351828"/>
       </p:ext>
     </p:extLst>
   </p:cSld>

</xml_diff>

<commit_message>
Patching module diagram changed
</commit_message>
<xml_diff>
--- a/images/ArrayIndex.pptx
+++ b/images/ArrayIndex.pptx
@@ -12,6 +12,7 @@
     <p:sldId id="260" r:id="rId6"/>
     <p:sldId id="261" r:id="rId7"/>
     <p:sldId id="262" r:id="rId8"/>
+    <p:sldId id="263" r:id="rId9"/>
   </p:sldIdLst>
   <p:sldSz cx="12192000" cy="6858000"/>
   <p:notesSz cx="6858000" cy="9144000"/>
@@ -6079,7 +6080,7 @@
           <a:graphicData uri="http://schemas.openxmlformats.org/presentationml/2006/ole">
             <mc:AlternateContent xmlns:mc="http://schemas.openxmlformats.org/markup-compatibility/2006">
               <mc:Choice xmlns:v="urn:schemas-microsoft-com:vml" Requires="v">
-                <p:oleObj spid="_x0000_s1044" name="Visio" r:id="rId3" imgW="3752882" imgH="4562496" progId="Visio.Drawing.15">
+                <p:oleObj spid="_x0000_s1055" name="Visio" r:id="rId3" imgW="3752882" imgH="4562496" progId="Visio.Drawing.15">
                   <p:embed/>
                 </p:oleObj>
               </mc:Choice>
@@ -6900,6 +6901,873 @@
     <p:extLst>
       <p:ext uri="{BB962C8B-B14F-4D97-AF65-F5344CB8AC3E}">
         <p14:creationId xmlns:p14="http://schemas.microsoft.com/office/powerpoint/2010/main" val="201351828"/>
+      </p:ext>
+    </p:extLst>
+  </p:cSld>
+  <p:clrMapOvr>
+    <a:masterClrMapping/>
+  </p:clrMapOvr>
+</p:sld>
+</file>
+
+<file path=ppt/slides/slide8.xml><?xml version="1.0" encoding="utf-8"?>
+<p:sld xmlns:a="http://schemas.openxmlformats.org/drawingml/2006/main" xmlns:r="http://schemas.openxmlformats.org/officeDocument/2006/relationships" xmlns:p="http://schemas.openxmlformats.org/presentationml/2006/main">
+  <p:cSld>
+    <p:spTree>
+      <p:nvGrpSpPr>
+        <p:cNvPr id="1" name=""/>
+        <p:cNvGrpSpPr/>
+        <p:nvPr/>
+      </p:nvGrpSpPr>
+      <p:grpSpPr>
+        <a:xfrm>
+          <a:off x="0" y="0"/>
+          <a:ext cx="0" cy="0"/>
+          <a:chOff x="0" y="0"/>
+          <a:chExt cx="0" cy="0"/>
+        </a:xfrm>
+      </p:grpSpPr>
+      <p:sp>
+        <p:nvSpPr>
+          <p:cNvPr id="5" name="Rectangle 4"/>
+          <p:cNvSpPr/>
+          <p:nvPr/>
+        </p:nvSpPr>
+        <p:spPr>
+          <a:xfrm>
+            <a:off x="3740490" y="1340997"/>
+            <a:ext cx="3441359" cy="373503"/>
+          </a:xfrm>
+          <a:prstGeom prst="rect">
+            <a:avLst/>
+          </a:prstGeom>
+        </p:spPr>
+        <p:style>
+          <a:lnRef idx="2">
+            <a:schemeClr val="dk1"/>
+          </a:lnRef>
+          <a:fillRef idx="1">
+            <a:schemeClr val="lt1"/>
+          </a:fillRef>
+          <a:effectRef idx="0">
+            <a:schemeClr val="dk1"/>
+          </a:effectRef>
+          <a:fontRef idx="minor">
+            <a:schemeClr val="dk1"/>
+          </a:fontRef>
+        </p:style>
+        <p:txBody>
+          <a:bodyPr rtlCol="0" anchor="ctr"/>
+          <a:lstStyle/>
+          <a:p>
+            <a:pPr algn="ctr"/>
+            <a:r>
+              <a:rPr lang="en-US" dirty="0" smtClean="0"/>
+              <a:t>Static Constraint analysis</a:t>
+            </a:r>
+            <a:endParaRPr lang="en-US" dirty="0"/>
+          </a:p>
+        </p:txBody>
+      </p:sp>
+      <p:sp>
+        <p:nvSpPr>
+          <p:cNvPr id="6" name="Rounded Rectangle 5"/>
+          <p:cNvSpPr/>
+          <p:nvPr/>
+        </p:nvSpPr>
+        <p:spPr>
+          <a:xfrm>
+            <a:off x="3740489" y="284695"/>
+            <a:ext cx="1256011" cy="573659"/>
+          </a:xfrm>
+          <a:prstGeom prst="roundRect">
+            <a:avLst/>
+          </a:prstGeom>
+        </p:spPr>
+        <p:style>
+          <a:lnRef idx="2">
+            <a:schemeClr val="dk1"/>
+          </a:lnRef>
+          <a:fillRef idx="1">
+            <a:schemeClr val="lt1"/>
+          </a:fillRef>
+          <a:effectRef idx="0">
+            <a:schemeClr val="dk1"/>
+          </a:effectRef>
+          <a:fontRef idx="minor">
+            <a:schemeClr val="dk1"/>
+          </a:fontRef>
+        </p:style>
+        <p:txBody>
+          <a:bodyPr rtlCol="0" anchor="ctr"/>
+          <a:lstStyle/>
+          <a:p>
+            <a:pPr algn="ctr"/>
+            <a:r>
+              <a:rPr lang="en-US" sz="1600" dirty="0" smtClean="0"/>
+              <a:t>Byte code</a:t>
+            </a:r>
+            <a:endParaRPr lang="en-US" sz="1600" dirty="0"/>
+          </a:p>
+        </p:txBody>
+      </p:sp>
+      <p:sp>
+        <p:nvSpPr>
+          <p:cNvPr id="7" name="Rounded Rectangle 6"/>
+          <p:cNvSpPr/>
+          <p:nvPr/>
+        </p:nvSpPr>
+        <p:spPr>
+          <a:xfrm>
+            <a:off x="5925834" y="284695"/>
+            <a:ext cx="1370316" cy="573660"/>
+          </a:xfrm>
+          <a:prstGeom prst="roundRect">
+            <a:avLst/>
+          </a:prstGeom>
+        </p:spPr>
+        <p:style>
+          <a:lnRef idx="2">
+            <a:schemeClr val="dk1"/>
+          </a:lnRef>
+          <a:fillRef idx="1">
+            <a:schemeClr val="lt1"/>
+          </a:fillRef>
+          <a:effectRef idx="0">
+            <a:schemeClr val="dk1"/>
+          </a:effectRef>
+          <a:fontRef idx="minor">
+            <a:schemeClr val="dk1"/>
+          </a:fontRef>
+        </p:style>
+        <p:txBody>
+          <a:bodyPr rtlCol="0" anchor="ctr"/>
+          <a:lstStyle/>
+          <a:p>
+            <a:pPr algn="ctr"/>
+            <a:r>
+              <a:rPr lang="en-US" sz="1600" dirty="0" smtClean="0"/>
+              <a:t>Output from taint analysis</a:t>
+            </a:r>
+            <a:endParaRPr lang="en-US" sz="1600" dirty="0"/>
+          </a:p>
+        </p:txBody>
+      </p:sp>
+      <p:cxnSp>
+        <p:nvCxnSpPr>
+          <p:cNvPr id="9" name="Straight Arrow Connector 8"/>
+          <p:cNvCxnSpPr>
+            <a:endCxn id="5" idx="0"/>
+          </p:cNvCxnSpPr>
+          <p:nvPr/>
+        </p:nvCxnSpPr>
+        <p:spPr>
+          <a:xfrm>
+            <a:off x="4368495" y="858354"/>
+            <a:ext cx="1092675" cy="482643"/>
+          </a:xfrm>
+          <a:prstGeom prst="straightConnector1">
+            <a:avLst/>
+          </a:prstGeom>
+          <a:ln w="19050">
+            <a:tailEnd type="triangle"/>
+          </a:ln>
+        </p:spPr>
+        <p:style>
+          <a:lnRef idx="1">
+            <a:schemeClr val="dk1"/>
+          </a:lnRef>
+          <a:fillRef idx="0">
+            <a:schemeClr val="dk1"/>
+          </a:fillRef>
+          <a:effectRef idx="0">
+            <a:schemeClr val="dk1"/>
+          </a:effectRef>
+          <a:fontRef idx="minor">
+            <a:schemeClr val="tx1"/>
+          </a:fontRef>
+        </p:style>
+      </p:cxnSp>
+      <p:cxnSp>
+        <p:nvCxnSpPr>
+          <p:cNvPr id="12" name="Straight Arrow Connector 11"/>
+          <p:cNvCxnSpPr>
+            <a:endCxn id="5" idx="0"/>
+          </p:cNvCxnSpPr>
+          <p:nvPr/>
+        </p:nvCxnSpPr>
+        <p:spPr>
+          <a:xfrm flipH="1">
+            <a:off x="5461170" y="858355"/>
+            <a:ext cx="1092671" cy="482642"/>
+          </a:xfrm>
+          <a:prstGeom prst="straightConnector1">
+            <a:avLst/>
+          </a:prstGeom>
+          <a:ln w="19050">
+            <a:tailEnd type="triangle"/>
+          </a:ln>
+        </p:spPr>
+        <p:style>
+          <a:lnRef idx="1">
+            <a:schemeClr val="dk1"/>
+          </a:lnRef>
+          <a:fillRef idx="0">
+            <a:schemeClr val="dk1"/>
+          </a:fillRef>
+          <a:effectRef idx="0">
+            <a:schemeClr val="dk1"/>
+          </a:effectRef>
+          <a:fontRef idx="minor">
+            <a:schemeClr val="tx1"/>
+          </a:fontRef>
+        </p:style>
+      </p:cxnSp>
+      <p:sp>
+        <p:nvSpPr>
+          <p:cNvPr id="61" name="Rectangle 60"/>
+          <p:cNvSpPr/>
+          <p:nvPr/>
+        </p:nvSpPr>
+        <p:spPr>
+          <a:xfrm>
+            <a:off x="3740489" y="2010390"/>
+            <a:ext cx="3441359" cy="373503"/>
+          </a:xfrm>
+          <a:prstGeom prst="rect">
+            <a:avLst/>
+          </a:prstGeom>
+        </p:spPr>
+        <p:style>
+          <a:lnRef idx="2">
+            <a:schemeClr val="dk1"/>
+          </a:lnRef>
+          <a:fillRef idx="1">
+            <a:schemeClr val="lt1"/>
+          </a:fillRef>
+          <a:effectRef idx="0">
+            <a:schemeClr val="dk1"/>
+          </a:effectRef>
+          <a:fontRef idx="minor">
+            <a:schemeClr val="dk1"/>
+          </a:fontRef>
+        </p:style>
+        <p:txBody>
+          <a:bodyPr rtlCol="0" anchor="ctr"/>
+          <a:lstStyle/>
+          <a:p>
+            <a:pPr algn="ctr"/>
+            <a:r>
+              <a:rPr lang="en-US" dirty="0" smtClean="0"/>
+              <a:t>Skip the Unit if tagged unsafe</a:t>
+            </a:r>
+            <a:endParaRPr lang="en-US" dirty="0"/>
+          </a:p>
+        </p:txBody>
+      </p:sp>
+      <p:sp>
+        <p:nvSpPr>
+          <p:cNvPr id="65" name="Rectangle 64"/>
+          <p:cNvSpPr/>
+          <p:nvPr/>
+        </p:nvSpPr>
+        <p:spPr>
+          <a:xfrm>
+            <a:off x="3740489" y="2679784"/>
+            <a:ext cx="3441359" cy="501566"/>
+          </a:xfrm>
+          <a:prstGeom prst="rect">
+            <a:avLst/>
+          </a:prstGeom>
+        </p:spPr>
+        <p:style>
+          <a:lnRef idx="2">
+            <a:schemeClr val="dk1"/>
+          </a:lnRef>
+          <a:fillRef idx="1">
+            <a:schemeClr val="lt1"/>
+          </a:fillRef>
+          <a:effectRef idx="0">
+            <a:schemeClr val="dk1"/>
+          </a:effectRef>
+          <a:fontRef idx="minor">
+            <a:schemeClr val="dk1"/>
+          </a:fontRef>
+        </p:style>
+        <p:txBody>
+          <a:bodyPr rtlCol="0" anchor="ctr"/>
+          <a:lstStyle/>
+          <a:p>
+            <a:pPr algn="ctr"/>
+            <a:r>
+              <a:rPr lang="en-US" dirty="0" smtClean="0"/>
+              <a:t>Determine if the Unit can throw runtime exception</a:t>
+            </a:r>
+            <a:endParaRPr lang="en-US" dirty="0"/>
+          </a:p>
+        </p:txBody>
+      </p:sp>
+      <p:sp>
+        <p:nvSpPr>
+          <p:cNvPr id="66" name="Rectangle 65"/>
+          <p:cNvSpPr/>
+          <p:nvPr/>
+        </p:nvSpPr>
+        <p:spPr>
+          <a:xfrm>
+            <a:off x="3740489" y="3535929"/>
+            <a:ext cx="3441359" cy="501566"/>
+          </a:xfrm>
+          <a:prstGeom prst="rect">
+            <a:avLst/>
+          </a:prstGeom>
+        </p:spPr>
+        <p:style>
+          <a:lnRef idx="2">
+            <a:schemeClr val="dk1"/>
+          </a:lnRef>
+          <a:fillRef idx="1">
+            <a:schemeClr val="lt1"/>
+          </a:fillRef>
+          <a:effectRef idx="0">
+            <a:schemeClr val="dk1"/>
+          </a:effectRef>
+          <a:fontRef idx="minor">
+            <a:schemeClr val="dk1"/>
+          </a:fontRef>
+        </p:style>
+        <p:txBody>
+          <a:bodyPr rtlCol="0" anchor="ctr"/>
+          <a:lstStyle/>
+          <a:p>
+            <a:pPr algn="ctr"/>
+            <a:r>
+              <a:rPr lang="en-US" dirty="0" smtClean="0"/>
+              <a:t>Instrument the object by solving the constraints</a:t>
+            </a:r>
+            <a:endParaRPr lang="en-US" dirty="0"/>
+          </a:p>
+        </p:txBody>
+      </p:sp>
+      <p:cxnSp>
+        <p:nvCxnSpPr>
+          <p:cNvPr id="67" name="Straight Arrow Connector 66"/>
+          <p:cNvCxnSpPr>
+            <a:stCxn id="5" idx="2"/>
+            <a:endCxn id="61" idx="0"/>
+          </p:cNvCxnSpPr>
+          <p:nvPr/>
+        </p:nvCxnSpPr>
+        <p:spPr>
+          <a:xfrm flipH="1">
+            <a:off x="5461169" y="1714500"/>
+            <a:ext cx="1" cy="295890"/>
+          </a:xfrm>
+          <a:prstGeom prst="straightConnector1">
+            <a:avLst/>
+          </a:prstGeom>
+          <a:ln w="19050">
+            <a:tailEnd type="triangle"/>
+          </a:ln>
+        </p:spPr>
+        <p:style>
+          <a:lnRef idx="1">
+            <a:schemeClr val="dk1"/>
+          </a:lnRef>
+          <a:fillRef idx="0">
+            <a:schemeClr val="dk1"/>
+          </a:fillRef>
+          <a:effectRef idx="0">
+            <a:schemeClr val="dk1"/>
+          </a:effectRef>
+          <a:fontRef idx="minor">
+            <a:schemeClr val="tx1"/>
+          </a:fontRef>
+        </p:style>
+      </p:cxnSp>
+      <p:cxnSp>
+        <p:nvCxnSpPr>
+          <p:cNvPr id="70" name="Straight Arrow Connector 69"/>
+          <p:cNvCxnSpPr>
+            <a:stCxn id="61" idx="2"/>
+            <a:endCxn id="65" idx="0"/>
+          </p:cNvCxnSpPr>
+          <p:nvPr/>
+        </p:nvCxnSpPr>
+        <p:spPr>
+          <a:xfrm>
+            <a:off x="5461169" y="2383893"/>
+            <a:ext cx="0" cy="295891"/>
+          </a:xfrm>
+          <a:prstGeom prst="straightConnector1">
+            <a:avLst/>
+          </a:prstGeom>
+          <a:ln w="19050">
+            <a:tailEnd type="triangle"/>
+          </a:ln>
+        </p:spPr>
+        <p:style>
+          <a:lnRef idx="1">
+            <a:schemeClr val="dk1"/>
+          </a:lnRef>
+          <a:fillRef idx="0">
+            <a:schemeClr val="dk1"/>
+          </a:fillRef>
+          <a:effectRef idx="0">
+            <a:schemeClr val="dk1"/>
+          </a:effectRef>
+          <a:fontRef idx="minor">
+            <a:schemeClr val="tx1"/>
+          </a:fontRef>
+        </p:style>
+      </p:cxnSp>
+      <p:cxnSp>
+        <p:nvCxnSpPr>
+          <p:cNvPr id="73" name="Straight Arrow Connector 72"/>
+          <p:cNvCxnSpPr>
+            <a:stCxn id="65" idx="2"/>
+            <a:endCxn id="66" idx="0"/>
+          </p:cNvCxnSpPr>
+          <p:nvPr/>
+        </p:nvCxnSpPr>
+        <p:spPr>
+          <a:xfrm>
+            <a:off x="5461169" y="3181350"/>
+            <a:ext cx="0" cy="354579"/>
+          </a:xfrm>
+          <a:prstGeom prst="straightConnector1">
+            <a:avLst/>
+          </a:prstGeom>
+          <a:ln w="19050">
+            <a:tailEnd type="triangle"/>
+          </a:ln>
+        </p:spPr>
+        <p:style>
+          <a:lnRef idx="1">
+            <a:schemeClr val="dk1"/>
+          </a:lnRef>
+          <a:fillRef idx="0">
+            <a:schemeClr val="dk1"/>
+          </a:fillRef>
+          <a:effectRef idx="0">
+            <a:schemeClr val="dk1"/>
+          </a:effectRef>
+          <a:fontRef idx="minor">
+            <a:schemeClr val="tx1"/>
+          </a:fontRef>
+        </p:style>
+      </p:cxnSp>
+      <p:sp>
+        <p:nvSpPr>
+          <p:cNvPr id="76" name="TextBox 75"/>
+          <p:cNvSpPr txBox="1"/>
+          <p:nvPr/>
+        </p:nvSpPr>
+        <p:spPr>
+          <a:xfrm>
+            <a:off x="5461168" y="3181350"/>
+            <a:ext cx="457882" cy="338554"/>
+          </a:xfrm>
+          <a:prstGeom prst="rect">
+            <a:avLst/>
+          </a:prstGeom>
+          <a:noFill/>
+          <a:ln w="19050">
+            <a:noFill/>
+          </a:ln>
+        </p:spPr>
+        <p:txBody>
+          <a:bodyPr wrap="none" rtlCol="0">
+            <a:spAutoFit/>
+          </a:bodyPr>
+          <a:lstStyle/>
+          <a:p>
+            <a:r>
+              <a:rPr lang="en-US" sz="1600" dirty="0" smtClean="0"/>
+              <a:t>yes</a:t>
+            </a:r>
+            <a:endParaRPr lang="en-US" sz="1600" dirty="0"/>
+          </a:p>
+        </p:txBody>
+      </p:sp>
+      <p:cxnSp>
+        <p:nvCxnSpPr>
+          <p:cNvPr id="78" name="Elbow Connector 77"/>
+          <p:cNvCxnSpPr>
+            <a:stCxn id="5" idx="1"/>
+            <a:endCxn id="66" idx="1"/>
+          </p:cNvCxnSpPr>
+          <p:nvPr/>
+        </p:nvCxnSpPr>
+        <p:spPr>
+          <a:xfrm rot="10800000" flipV="1">
+            <a:off x="3740490" y="1527748"/>
+            <a:ext cx="1" cy="2258963"/>
+          </a:xfrm>
+          <a:prstGeom prst="bentConnector3">
+            <a:avLst>
+              <a:gd name="adj1" fmla="val 22860100000"/>
+            </a:avLst>
+          </a:prstGeom>
+          <a:ln w="19050">
+            <a:tailEnd type="triangle"/>
+          </a:ln>
+        </p:spPr>
+        <p:style>
+          <a:lnRef idx="1">
+            <a:schemeClr val="dk1"/>
+          </a:lnRef>
+          <a:fillRef idx="0">
+            <a:schemeClr val="dk1"/>
+          </a:fillRef>
+          <a:effectRef idx="0">
+            <a:schemeClr val="dk1"/>
+          </a:effectRef>
+          <a:fontRef idx="minor">
+            <a:schemeClr val="tx1"/>
+          </a:fontRef>
+        </p:style>
+      </p:cxnSp>
+      <p:sp>
+        <p:nvSpPr>
+          <p:cNvPr id="81" name="TextBox 80"/>
+          <p:cNvSpPr txBox="1"/>
+          <p:nvPr/>
+        </p:nvSpPr>
+        <p:spPr>
+          <a:xfrm rot="16200000">
+            <a:off x="2904353" y="1825059"/>
+            <a:ext cx="1147564" cy="584775"/>
+          </a:xfrm>
+          <a:prstGeom prst="rect">
+            <a:avLst/>
+          </a:prstGeom>
+          <a:noFill/>
+          <a:ln w="19050">
+            <a:noFill/>
+          </a:ln>
+        </p:spPr>
+        <p:txBody>
+          <a:bodyPr wrap="square" rtlCol="0">
+            <a:spAutoFit/>
+          </a:bodyPr>
+          <a:lstStyle/>
+          <a:p>
+            <a:r>
+              <a:rPr lang="en-US" sz="1600" dirty="0" smtClean="0"/>
+              <a:t>    Set of constraints</a:t>
+            </a:r>
+            <a:endParaRPr lang="en-US" sz="1600" dirty="0"/>
+          </a:p>
+        </p:txBody>
+      </p:sp>
+      <p:sp>
+        <p:nvSpPr>
+          <p:cNvPr id="86" name="Rectangle 85"/>
+          <p:cNvSpPr/>
+          <p:nvPr/>
+        </p:nvSpPr>
+        <p:spPr>
+          <a:xfrm>
+            <a:off x="3740489" y="4392074"/>
+            <a:ext cx="3441359" cy="501566"/>
+          </a:xfrm>
+          <a:prstGeom prst="rect">
+            <a:avLst/>
+          </a:prstGeom>
+        </p:spPr>
+        <p:style>
+          <a:lnRef idx="2">
+            <a:schemeClr val="dk1"/>
+          </a:lnRef>
+          <a:fillRef idx="1">
+            <a:schemeClr val="lt1"/>
+          </a:fillRef>
+          <a:effectRef idx="0">
+            <a:schemeClr val="dk1"/>
+          </a:effectRef>
+          <a:fontRef idx="minor">
+            <a:schemeClr val="dk1"/>
+          </a:fontRef>
+        </p:style>
+        <p:txBody>
+          <a:bodyPr rtlCol="0" anchor="ctr"/>
+          <a:lstStyle/>
+          <a:p>
+            <a:pPr algn="ctr"/>
+            <a:r>
+              <a:rPr lang="en-US" dirty="0" smtClean="0"/>
+              <a:t>Instrument the object by modifying its properties</a:t>
+            </a:r>
+            <a:endParaRPr lang="en-US" dirty="0"/>
+          </a:p>
+        </p:txBody>
+      </p:sp>
+      <p:cxnSp>
+        <p:nvCxnSpPr>
+          <p:cNvPr id="88" name="Elbow Connector 87"/>
+          <p:cNvCxnSpPr>
+            <a:stCxn id="65" idx="3"/>
+            <a:endCxn id="86" idx="3"/>
+          </p:cNvCxnSpPr>
+          <p:nvPr/>
+        </p:nvCxnSpPr>
+        <p:spPr>
+          <a:xfrm>
+            <a:off x="7181848" y="2930567"/>
+            <a:ext cx="12700" cy="1712290"/>
+          </a:xfrm>
+          <a:prstGeom prst="bentConnector3">
+            <a:avLst>
+              <a:gd name="adj1" fmla="val 1800000"/>
+            </a:avLst>
+          </a:prstGeom>
+          <a:ln w="19050">
+            <a:tailEnd type="triangle"/>
+          </a:ln>
+        </p:spPr>
+        <p:style>
+          <a:lnRef idx="1">
+            <a:schemeClr val="dk1"/>
+          </a:lnRef>
+          <a:fillRef idx="0">
+            <a:schemeClr val="dk1"/>
+          </a:fillRef>
+          <a:effectRef idx="0">
+            <a:schemeClr val="dk1"/>
+          </a:effectRef>
+          <a:fontRef idx="minor">
+            <a:schemeClr val="tx1"/>
+          </a:fontRef>
+        </p:style>
+      </p:cxnSp>
+      <p:sp>
+        <p:nvSpPr>
+          <p:cNvPr id="89" name="TextBox 88"/>
+          <p:cNvSpPr txBox="1"/>
+          <p:nvPr/>
+        </p:nvSpPr>
+        <p:spPr>
+          <a:xfrm rot="5400000">
+            <a:off x="7336313" y="3150710"/>
+            <a:ext cx="457882" cy="338554"/>
+          </a:xfrm>
+          <a:prstGeom prst="rect">
+            <a:avLst/>
+          </a:prstGeom>
+          <a:noFill/>
+          <a:ln w="19050">
+            <a:noFill/>
+          </a:ln>
+        </p:spPr>
+        <p:txBody>
+          <a:bodyPr wrap="none" rtlCol="0">
+            <a:spAutoFit/>
+          </a:bodyPr>
+          <a:lstStyle/>
+          <a:p>
+            <a:r>
+              <a:rPr lang="en-US" sz="1600" dirty="0" smtClean="0"/>
+              <a:t>yes</a:t>
+            </a:r>
+            <a:endParaRPr lang="en-US" sz="1600" dirty="0"/>
+          </a:p>
+        </p:txBody>
+      </p:sp>
+      <p:sp>
+        <p:nvSpPr>
+          <p:cNvPr id="92" name="Rectangle 91"/>
+          <p:cNvSpPr/>
+          <p:nvPr/>
+        </p:nvSpPr>
+        <p:spPr>
+          <a:xfrm>
+            <a:off x="3740489" y="5248219"/>
+            <a:ext cx="3441359" cy="762056"/>
+          </a:xfrm>
+          <a:prstGeom prst="rect">
+            <a:avLst/>
+          </a:prstGeom>
+        </p:spPr>
+        <p:style>
+          <a:lnRef idx="2">
+            <a:schemeClr val="dk1"/>
+          </a:lnRef>
+          <a:fillRef idx="1">
+            <a:schemeClr val="lt1"/>
+          </a:fillRef>
+          <a:effectRef idx="0">
+            <a:schemeClr val="dk1"/>
+          </a:effectRef>
+          <a:fontRef idx="minor">
+            <a:schemeClr val="dk1"/>
+          </a:fontRef>
+        </p:style>
+        <p:txBody>
+          <a:bodyPr rtlCol="0" anchor="ctr"/>
+          <a:lstStyle/>
+          <a:p>
+            <a:pPr algn="ctr"/>
+            <a:r>
+              <a:rPr lang="en-US" dirty="0" smtClean="0"/>
+              <a:t>Wrap the statement with try-catch block and the patching code in catch block</a:t>
+            </a:r>
+            <a:endParaRPr lang="en-US" dirty="0"/>
+          </a:p>
+        </p:txBody>
+      </p:sp>
+      <p:cxnSp>
+        <p:nvCxnSpPr>
+          <p:cNvPr id="94" name="Elbow Connector 93"/>
+          <p:cNvCxnSpPr>
+            <a:stCxn id="65" idx="1"/>
+            <a:endCxn id="92" idx="1"/>
+          </p:cNvCxnSpPr>
+          <p:nvPr/>
+        </p:nvCxnSpPr>
+        <p:spPr>
+          <a:xfrm rot="10800000" flipV="1">
+            <a:off x="3740489" y="2930567"/>
+            <a:ext cx="12700" cy="2698680"/>
+          </a:xfrm>
+          <a:prstGeom prst="bentConnector3">
+            <a:avLst>
+              <a:gd name="adj1" fmla="val 2550000"/>
+            </a:avLst>
+          </a:prstGeom>
+          <a:ln w="19050">
+            <a:tailEnd type="triangle"/>
+          </a:ln>
+        </p:spPr>
+        <p:style>
+          <a:lnRef idx="1">
+            <a:schemeClr val="dk1"/>
+          </a:lnRef>
+          <a:fillRef idx="0">
+            <a:schemeClr val="dk1"/>
+          </a:fillRef>
+          <a:effectRef idx="0">
+            <a:schemeClr val="dk1"/>
+          </a:effectRef>
+          <a:fontRef idx="minor">
+            <a:schemeClr val="tx1"/>
+          </a:fontRef>
+        </p:style>
+      </p:cxnSp>
+      <p:sp>
+        <p:nvSpPr>
+          <p:cNvPr id="96" name="TextBox 95"/>
+          <p:cNvSpPr txBox="1"/>
+          <p:nvPr/>
+        </p:nvSpPr>
+        <p:spPr>
+          <a:xfrm rot="16200000">
+            <a:off x="2185163" y="4133596"/>
+            <a:ext cx="2243048" cy="338554"/>
+          </a:xfrm>
+          <a:prstGeom prst="rect">
+            <a:avLst/>
+          </a:prstGeom>
+          <a:noFill/>
+          <a:ln w="19050">
+            <a:noFill/>
+          </a:ln>
+        </p:spPr>
+        <p:txBody>
+          <a:bodyPr wrap="square" rtlCol="0">
+            <a:spAutoFit/>
+          </a:bodyPr>
+          <a:lstStyle/>
+          <a:p>
+            <a:r>
+              <a:rPr lang="en-US" sz="1600" dirty="0" smtClean="0"/>
+              <a:t>Runtime Exception type</a:t>
+            </a:r>
+            <a:endParaRPr lang="en-US" sz="1600" dirty="0"/>
+          </a:p>
+        </p:txBody>
+      </p:sp>
+      <p:cxnSp>
+        <p:nvCxnSpPr>
+          <p:cNvPr id="97" name="Straight Arrow Connector 96"/>
+          <p:cNvCxnSpPr>
+            <a:stCxn id="86" idx="2"/>
+            <a:endCxn id="92" idx="0"/>
+          </p:cNvCxnSpPr>
+          <p:nvPr/>
+        </p:nvCxnSpPr>
+        <p:spPr>
+          <a:xfrm>
+            <a:off x="5461169" y="4893640"/>
+            <a:ext cx="0" cy="354579"/>
+          </a:xfrm>
+          <a:prstGeom prst="straightConnector1">
+            <a:avLst/>
+          </a:prstGeom>
+          <a:ln w="19050">
+            <a:tailEnd type="triangle"/>
+          </a:ln>
+        </p:spPr>
+        <p:style>
+          <a:lnRef idx="1">
+            <a:schemeClr val="dk1"/>
+          </a:lnRef>
+          <a:fillRef idx="0">
+            <a:schemeClr val="dk1"/>
+          </a:fillRef>
+          <a:effectRef idx="0">
+            <a:schemeClr val="dk1"/>
+          </a:effectRef>
+          <a:fontRef idx="minor">
+            <a:schemeClr val="tx1"/>
+          </a:fontRef>
+        </p:style>
+      </p:cxnSp>
+      <p:cxnSp>
+        <p:nvCxnSpPr>
+          <p:cNvPr id="101" name="Elbow Connector 100"/>
+          <p:cNvCxnSpPr>
+            <a:stCxn id="66" idx="3"/>
+            <a:endCxn id="92" idx="3"/>
+          </p:cNvCxnSpPr>
+          <p:nvPr/>
+        </p:nvCxnSpPr>
+        <p:spPr>
+          <a:xfrm>
+            <a:off x="7181848" y="3786712"/>
+            <a:ext cx="12700" cy="1842535"/>
+          </a:xfrm>
+          <a:prstGeom prst="bentConnector3">
+            <a:avLst>
+              <a:gd name="adj1" fmla="val 2475000"/>
+            </a:avLst>
+          </a:prstGeom>
+          <a:ln w="19050">
+            <a:solidFill>
+              <a:schemeClr val="tx1"/>
+            </a:solidFill>
+            <a:tailEnd type="triangle"/>
+          </a:ln>
+        </p:spPr>
+        <p:style>
+          <a:lnRef idx="1">
+            <a:schemeClr val="dk1"/>
+          </a:lnRef>
+          <a:fillRef idx="0">
+            <a:schemeClr val="dk1"/>
+          </a:fillRef>
+          <a:effectRef idx="0">
+            <a:schemeClr val="dk1"/>
+          </a:effectRef>
+          <a:fontRef idx="minor">
+            <a:schemeClr val="tx1"/>
+          </a:fontRef>
+        </p:style>
+      </p:cxnSp>
+    </p:spTree>
+    <p:extLst>
+      <p:ext uri="{BB962C8B-B14F-4D97-AF65-F5344CB8AC3E}">
+        <p14:creationId xmlns:p14="http://schemas.microsoft.com/office/powerpoint/2010/main" val="2423475886"/>
       </p:ext>
     </p:extLst>
   </p:cSld>

</xml_diff>

<commit_message>
New Design diagram pdf + new design tex files added
</commit_message>
<xml_diff>
--- a/images/ArrayIndex.pptx
+++ b/images/ArrayIndex.pptx
@@ -6080,7 +6080,7 @@
           <a:graphicData uri="http://schemas.openxmlformats.org/presentationml/2006/ole">
             <mc:AlternateContent xmlns:mc="http://schemas.openxmlformats.org/markup-compatibility/2006">
               <mc:Choice xmlns:v="urn:schemas-microsoft-com:vml" Requires="v">
-                <p:oleObj spid="_x0000_s1058" name="Visio" r:id="rId3" imgW="3752882" imgH="4562496" progId="Visio.Drawing.15">
+                <p:oleObj spid="_x0000_s1065" name="Visio" r:id="rId3" imgW="3752882" imgH="4562496" progId="Visio.Drawing.15">
                   <p:embed/>
                 </p:oleObj>
               </mc:Choice>
@@ -6207,8 +6207,8 @@
         </p:nvSpPr>
         <p:spPr>
           <a:xfrm>
-            <a:off x="2201562" y="2830212"/>
-            <a:ext cx="1713470" cy="782595"/>
+            <a:off x="3229108" y="2830211"/>
+            <a:ext cx="1328762" cy="782595"/>
           </a:xfrm>
           <a:prstGeom prst="rect">
             <a:avLst/>
@@ -6234,10 +6234,10 @@
           <a:p>
             <a:pPr algn="ctr"/>
             <a:r>
-              <a:rPr lang="en-US" dirty="0" smtClean="0"/>
-              <a:t>Taint analysis module</a:t>
-            </a:r>
-            <a:endParaRPr lang="en-US" dirty="0"/>
+              <a:rPr lang="en-US" sz="1600" dirty="0" smtClean="0"/>
+              <a:t>Find program points for patching</a:t>
+            </a:r>
+            <a:endParaRPr lang="en-US" sz="1600" dirty="0"/>
           </a:p>
         </p:txBody>
       </p:sp>
@@ -6249,8 +6249,8 @@
         </p:nvSpPr>
         <p:spPr>
           <a:xfrm>
-            <a:off x="4103739" y="2831499"/>
-            <a:ext cx="1713470" cy="782595"/>
+            <a:off x="4839758" y="2830211"/>
+            <a:ext cx="1288759" cy="782595"/>
           </a:xfrm>
           <a:prstGeom prst="rect">
             <a:avLst/>
@@ -6276,10 +6276,10 @@
           <a:p>
             <a:pPr algn="ctr"/>
             <a:r>
-              <a:rPr lang="en-US" dirty="0" smtClean="0"/>
-              <a:t>Call graph analysis module</a:t>
-            </a:r>
-            <a:endParaRPr lang="en-US" dirty="0"/>
+              <a:rPr lang="en-US" sz="1600" dirty="0" smtClean="0"/>
+              <a:t>Static Constraint Analysis</a:t>
+            </a:r>
+            <a:endParaRPr lang="en-US" sz="1600" dirty="0"/>
           </a:p>
         </p:txBody>
       </p:sp>
@@ -6291,8 +6291,8 @@
         </p:nvSpPr>
         <p:spPr>
           <a:xfrm>
-            <a:off x="5372621" y="2097295"/>
-            <a:ext cx="1084859" cy="395416"/>
+            <a:off x="2031736" y="2927006"/>
+            <a:ext cx="915484" cy="589006"/>
           </a:xfrm>
           <a:prstGeom prst="roundRect">
             <a:avLst/>
@@ -6320,7 +6320,7 @@
             <a:pPr algn="ctr"/>
             <a:r>
               <a:rPr lang="en-US" sz="1400" dirty="0" smtClean="0"/>
-              <a:t>Byte code</a:t>
+              <a:t>Input program</a:t>
             </a:r>
             <a:endParaRPr lang="en-US" sz="1400" dirty="0"/>
           </a:p>
@@ -6328,16 +6328,16 @@
       </p:sp>
       <p:sp>
         <p:nvSpPr>
-          <p:cNvPr id="7" name="Rounded Rectangle 6"/>
+          <p:cNvPr id="38" name="Rectangle 37"/>
           <p:cNvSpPr/>
           <p:nvPr/>
         </p:nvSpPr>
         <p:spPr>
           <a:xfrm>
-            <a:off x="2294512" y="3958797"/>
-            <a:ext cx="1525270" cy="413177"/>
-          </a:xfrm>
-          <a:prstGeom prst="roundRect">
+            <a:off x="6450408" y="2830211"/>
+            <a:ext cx="1035161" cy="782595"/>
+          </a:xfrm>
+          <a:prstGeom prst="rect">
             <a:avLst/>
           </a:prstGeom>
         </p:spPr>
@@ -6361,167 +6361,23 @@
           <a:p>
             <a:pPr algn="ctr"/>
             <a:r>
-              <a:rPr lang="en-US" sz="1400" dirty="0" smtClean="0"/>
-              <a:t>Source and sink information</a:t>
-            </a:r>
-            <a:endParaRPr lang="en-US" sz="1400" dirty="0"/>
-          </a:p>
-        </p:txBody>
-      </p:sp>
-      <p:cxnSp>
-        <p:nvCxnSpPr>
-          <p:cNvPr id="9" name="Straight Arrow Connector 8"/>
-          <p:cNvCxnSpPr>
-            <a:stCxn id="6" idx="2"/>
-            <a:endCxn id="4" idx="0"/>
-          </p:cNvCxnSpPr>
-          <p:nvPr/>
-        </p:nvCxnSpPr>
-        <p:spPr>
-          <a:xfrm flipH="1">
-            <a:off x="3058297" y="2492711"/>
-            <a:ext cx="2856754" cy="337501"/>
-          </a:xfrm>
-          <a:prstGeom prst="straightConnector1">
-            <a:avLst/>
-          </a:prstGeom>
-          <a:ln w="12700">
-            <a:tailEnd type="triangle"/>
-          </a:ln>
-        </p:spPr>
-        <p:style>
-          <a:lnRef idx="1">
-            <a:schemeClr val="dk1"/>
-          </a:lnRef>
-          <a:fillRef idx="0">
-            <a:schemeClr val="dk1"/>
-          </a:fillRef>
-          <a:effectRef idx="0">
-            <a:schemeClr val="dk1"/>
-          </a:effectRef>
-          <a:fontRef idx="minor">
-            <a:schemeClr val="tx1"/>
-          </a:fontRef>
-        </p:style>
-      </p:cxnSp>
-      <p:cxnSp>
-        <p:nvCxnSpPr>
-          <p:cNvPr id="10" name="Straight Arrow Connector 9"/>
-          <p:cNvCxnSpPr>
-            <a:stCxn id="7" idx="0"/>
-            <a:endCxn id="4" idx="2"/>
-          </p:cNvCxnSpPr>
-          <p:nvPr/>
-        </p:nvCxnSpPr>
-        <p:spPr>
-          <a:xfrm flipV="1">
-            <a:off x="3057147" y="3612807"/>
-            <a:ext cx="1150" cy="345990"/>
-          </a:xfrm>
-          <a:prstGeom prst="straightConnector1">
-            <a:avLst/>
-          </a:prstGeom>
-          <a:ln w="12700">
-            <a:tailEnd type="triangle"/>
-          </a:ln>
-        </p:spPr>
-        <p:style>
-          <a:lnRef idx="1">
-            <a:schemeClr val="dk1"/>
-          </a:lnRef>
-          <a:fillRef idx="0">
-            <a:schemeClr val="dk1"/>
-          </a:fillRef>
-          <a:effectRef idx="0">
-            <a:schemeClr val="dk1"/>
-          </a:effectRef>
-          <a:fontRef idx="minor">
-            <a:schemeClr val="tx1"/>
-          </a:fontRef>
-        </p:style>
-      </p:cxnSp>
-      <p:cxnSp>
-        <p:nvCxnSpPr>
-          <p:cNvPr id="24" name="Straight Arrow Connector 23"/>
-          <p:cNvCxnSpPr>
-            <a:stCxn id="4" idx="2"/>
-            <a:endCxn id="47" idx="0"/>
-          </p:cNvCxnSpPr>
-          <p:nvPr/>
-        </p:nvCxnSpPr>
-        <p:spPr>
-          <a:xfrm>
-            <a:off x="3058297" y="3612807"/>
-            <a:ext cx="1909155" cy="334018"/>
-          </a:xfrm>
-          <a:prstGeom prst="straightConnector1">
-            <a:avLst/>
-          </a:prstGeom>
-          <a:ln w="12700">
-            <a:tailEnd type="triangle"/>
-          </a:ln>
-        </p:spPr>
-        <p:style>
-          <a:lnRef idx="1">
-            <a:schemeClr val="dk1"/>
-          </a:lnRef>
-          <a:fillRef idx="0">
-            <a:schemeClr val="dk1"/>
-          </a:fillRef>
-          <a:effectRef idx="0">
-            <a:schemeClr val="dk1"/>
-          </a:effectRef>
-          <a:fontRef idx="minor">
-            <a:schemeClr val="tx1"/>
-          </a:fontRef>
-        </p:style>
-      </p:cxnSp>
-      <p:cxnSp>
-        <p:nvCxnSpPr>
-          <p:cNvPr id="32" name="Straight Arrow Connector 31"/>
-          <p:cNvCxnSpPr>
-            <a:stCxn id="6" idx="2"/>
-            <a:endCxn id="5" idx="0"/>
-          </p:cNvCxnSpPr>
-          <p:nvPr/>
-        </p:nvCxnSpPr>
-        <p:spPr>
-          <a:xfrm flipH="1">
-            <a:off x="4960474" y="2492711"/>
-            <a:ext cx="954577" cy="338788"/>
-          </a:xfrm>
-          <a:prstGeom prst="straightConnector1">
-            <a:avLst/>
-          </a:prstGeom>
-          <a:ln w="12700">
-            <a:tailEnd type="triangle"/>
-          </a:ln>
-        </p:spPr>
-        <p:style>
-          <a:lnRef idx="1">
-            <a:schemeClr val="dk1"/>
-          </a:lnRef>
-          <a:fillRef idx="0">
-            <a:schemeClr val="dk1"/>
-          </a:fillRef>
-          <a:effectRef idx="0">
-            <a:schemeClr val="dk1"/>
-          </a:effectRef>
-          <a:fontRef idx="minor">
-            <a:schemeClr val="tx1"/>
-          </a:fontRef>
-        </p:style>
-      </p:cxnSp>
-      <p:sp>
-        <p:nvSpPr>
-          <p:cNvPr id="38" name="Rectangle 37"/>
+              <a:rPr lang="en-US" sz="1600" dirty="0" smtClean="0"/>
+              <a:t>Patching</a:t>
+            </a:r>
+            <a:endParaRPr lang="en-US" sz="1600" dirty="0"/>
+          </a:p>
+        </p:txBody>
+      </p:sp>
+      <p:sp>
+        <p:nvSpPr>
+          <p:cNvPr id="61" name="Rectangle 60"/>
           <p:cNvSpPr/>
           <p:nvPr/>
         </p:nvSpPr>
         <p:spPr>
           <a:xfrm>
-            <a:off x="6005916" y="2831499"/>
-            <a:ext cx="1713470" cy="782595"/>
+            <a:off x="7186005" y="3783532"/>
+            <a:ext cx="1955745" cy="716692"/>
           </a:xfrm>
           <a:prstGeom prst="rect">
             <a:avLst/>
@@ -6547,317 +6403,10 @@
           <a:p>
             <a:pPr algn="ctr"/>
             <a:r>
-              <a:rPr lang="en-US" dirty="0" smtClean="0"/>
-              <a:t>Constraint analysis module</a:t>
-            </a:r>
-            <a:endParaRPr lang="en-US" dirty="0"/>
-          </a:p>
-        </p:txBody>
-      </p:sp>
-      <p:cxnSp>
-        <p:nvCxnSpPr>
-          <p:cNvPr id="40" name="Straight Arrow Connector 39"/>
-          <p:cNvCxnSpPr>
-            <a:stCxn id="6" idx="2"/>
-            <a:endCxn id="38" idx="0"/>
-          </p:cNvCxnSpPr>
-          <p:nvPr/>
-        </p:nvCxnSpPr>
-        <p:spPr>
-          <a:xfrm>
-            <a:off x="5915051" y="2492711"/>
-            <a:ext cx="947600" cy="338788"/>
-          </a:xfrm>
-          <a:prstGeom prst="straightConnector1">
-            <a:avLst/>
-          </a:prstGeom>
-          <a:ln w="12700">
-            <a:tailEnd type="triangle"/>
-          </a:ln>
-        </p:spPr>
-        <p:style>
-          <a:lnRef idx="1">
-            <a:schemeClr val="dk1"/>
-          </a:lnRef>
-          <a:fillRef idx="0">
-            <a:schemeClr val="dk1"/>
-          </a:fillRef>
-          <a:effectRef idx="0">
-            <a:schemeClr val="dk1"/>
-          </a:effectRef>
-          <a:fontRef idx="minor">
-            <a:schemeClr val="tx1"/>
-          </a:fontRef>
-        </p:style>
-      </p:cxnSp>
-      <p:sp>
-        <p:nvSpPr>
-          <p:cNvPr id="47" name="Rounded Rectangle 46"/>
-          <p:cNvSpPr/>
-          <p:nvPr/>
-        </p:nvSpPr>
-        <p:spPr>
-          <a:xfrm>
-            <a:off x="4425022" y="3946825"/>
-            <a:ext cx="1084859" cy="395416"/>
-          </a:xfrm>
-          <a:prstGeom prst="roundRect">
-            <a:avLst/>
-          </a:prstGeom>
-        </p:spPr>
-        <p:style>
-          <a:lnRef idx="2">
-            <a:schemeClr val="dk1"/>
-          </a:lnRef>
-          <a:fillRef idx="1">
-            <a:schemeClr val="lt1"/>
-          </a:fillRef>
-          <a:effectRef idx="0">
-            <a:schemeClr val="dk1"/>
-          </a:effectRef>
-          <a:fontRef idx="minor">
-            <a:schemeClr val="dk1"/>
-          </a:fontRef>
-        </p:style>
-        <p:txBody>
-          <a:bodyPr rtlCol="0" anchor="ctr"/>
-          <a:lstStyle/>
-          <a:p>
-            <a:pPr algn="ctr"/>
-            <a:r>
-              <a:rPr lang="en-US" sz="1400" dirty="0" smtClean="0"/>
-              <a:t>Safe Units</a:t>
-            </a:r>
-            <a:endParaRPr lang="en-US" sz="1400" dirty="0"/>
-          </a:p>
-        </p:txBody>
-      </p:sp>
-      <p:cxnSp>
-        <p:nvCxnSpPr>
-          <p:cNvPr id="50" name="Straight Arrow Connector 49"/>
-          <p:cNvCxnSpPr>
-            <a:stCxn id="38" idx="2"/>
-            <a:endCxn id="47" idx="0"/>
-          </p:cNvCxnSpPr>
-          <p:nvPr/>
-        </p:nvCxnSpPr>
-        <p:spPr>
-          <a:xfrm flipH="1">
-            <a:off x="4967452" y="3614094"/>
-            <a:ext cx="1895199" cy="332731"/>
-          </a:xfrm>
-          <a:prstGeom prst="straightConnector1">
-            <a:avLst/>
-          </a:prstGeom>
-          <a:ln w="12700">
-            <a:tailEnd type="triangle"/>
-          </a:ln>
-        </p:spPr>
-        <p:style>
-          <a:lnRef idx="1">
-            <a:schemeClr val="dk1"/>
-          </a:lnRef>
-          <a:fillRef idx="0">
-            <a:schemeClr val="dk1"/>
-          </a:fillRef>
-          <a:effectRef idx="0">
-            <a:schemeClr val="dk1"/>
-          </a:effectRef>
-          <a:fontRef idx="minor">
-            <a:schemeClr val="tx1"/>
-          </a:fontRef>
-        </p:style>
-      </p:cxnSp>
-      <p:cxnSp>
-        <p:nvCxnSpPr>
-          <p:cNvPr id="51" name="Straight Arrow Connector 50"/>
-          <p:cNvCxnSpPr>
-            <a:stCxn id="5" idx="2"/>
-            <a:endCxn id="47" idx="0"/>
-          </p:cNvCxnSpPr>
-          <p:nvPr/>
-        </p:nvCxnSpPr>
-        <p:spPr>
-          <a:xfrm>
-            <a:off x="4960474" y="3614094"/>
-            <a:ext cx="6978" cy="332731"/>
-          </a:xfrm>
-          <a:prstGeom prst="straightConnector1">
-            <a:avLst/>
-          </a:prstGeom>
-          <a:ln w="12700">
-            <a:tailEnd type="triangle"/>
-          </a:ln>
-        </p:spPr>
-        <p:style>
-          <a:lnRef idx="1">
-            <a:schemeClr val="dk1"/>
-          </a:lnRef>
-          <a:fillRef idx="0">
-            <a:schemeClr val="dk1"/>
-          </a:fillRef>
-          <a:effectRef idx="0">
-            <a:schemeClr val="dk1"/>
-          </a:effectRef>
-          <a:fontRef idx="minor">
-            <a:schemeClr val="tx1"/>
-          </a:fontRef>
-        </p:style>
-      </p:cxnSp>
-      <p:sp>
-        <p:nvSpPr>
-          <p:cNvPr id="61" name="Rectangle 60"/>
-          <p:cNvSpPr/>
-          <p:nvPr/>
-        </p:nvSpPr>
-        <p:spPr>
-          <a:xfrm>
-            <a:off x="7908093" y="2830212"/>
-            <a:ext cx="2135584" cy="782595"/>
-          </a:xfrm>
-          <a:prstGeom prst="rect">
-            <a:avLst/>
-          </a:prstGeom>
-        </p:spPr>
-        <p:style>
-          <a:lnRef idx="2">
-            <a:schemeClr val="dk1"/>
-          </a:lnRef>
-          <a:fillRef idx="1">
-            <a:schemeClr val="lt1"/>
-          </a:fillRef>
-          <a:effectRef idx="0">
-            <a:schemeClr val="dk1"/>
-          </a:effectRef>
-          <a:fontRef idx="minor">
-            <a:schemeClr val="dk1"/>
-          </a:fontRef>
-        </p:style>
-        <p:txBody>
-          <a:bodyPr rtlCol="0" anchor="ctr"/>
-          <a:lstStyle/>
-          <a:p>
-            <a:pPr algn="ctr"/>
-            <a:r>
-              <a:rPr lang="en-US" dirty="0" smtClean="0"/>
-              <a:t>Repairing + dynamic constraint instrumentation</a:t>
-            </a:r>
-            <a:endParaRPr lang="en-US" dirty="0"/>
-          </a:p>
-        </p:txBody>
-      </p:sp>
-      <p:cxnSp>
-        <p:nvCxnSpPr>
-          <p:cNvPr id="63" name="Elbow Connector 62"/>
-          <p:cNvCxnSpPr>
-            <a:stCxn id="47" idx="3"/>
-            <a:endCxn id="61" idx="2"/>
-          </p:cNvCxnSpPr>
-          <p:nvPr/>
-        </p:nvCxnSpPr>
-        <p:spPr>
-          <a:xfrm flipV="1">
-            <a:off x="5509881" y="3612807"/>
-            <a:ext cx="3466004" cy="531726"/>
-          </a:xfrm>
-          <a:prstGeom prst="bentConnector2">
-            <a:avLst/>
-          </a:prstGeom>
-          <a:ln w="12700">
-            <a:tailEnd type="triangle"/>
-          </a:ln>
-        </p:spPr>
-        <p:style>
-          <a:lnRef idx="1">
-            <a:schemeClr val="dk1"/>
-          </a:lnRef>
-          <a:fillRef idx="0">
-            <a:schemeClr val="dk1"/>
-          </a:fillRef>
-          <a:effectRef idx="0">
-            <a:schemeClr val="dk1"/>
-          </a:effectRef>
-          <a:fontRef idx="minor">
-            <a:schemeClr val="tx1"/>
-          </a:fontRef>
-        </p:style>
-      </p:cxnSp>
-      <p:cxnSp>
-        <p:nvCxnSpPr>
-          <p:cNvPr id="77" name="Straight Arrow Connector 76"/>
-          <p:cNvCxnSpPr>
-            <a:stCxn id="6" idx="2"/>
-            <a:endCxn id="61" idx="0"/>
-          </p:cNvCxnSpPr>
-          <p:nvPr/>
-        </p:nvCxnSpPr>
-        <p:spPr>
-          <a:xfrm>
-            <a:off x="5915051" y="2492711"/>
-            <a:ext cx="3060834" cy="337501"/>
-          </a:xfrm>
-          <a:prstGeom prst="straightConnector1">
-            <a:avLst/>
-          </a:prstGeom>
-          <a:ln w="12700">
-            <a:tailEnd type="triangle"/>
-          </a:ln>
-        </p:spPr>
-        <p:style>
-          <a:lnRef idx="1">
-            <a:schemeClr val="dk1"/>
-          </a:lnRef>
-          <a:fillRef idx="0">
-            <a:schemeClr val="dk1"/>
-          </a:fillRef>
-          <a:effectRef idx="0">
-            <a:schemeClr val="dk1"/>
-          </a:effectRef>
-          <a:fontRef idx="minor">
-            <a:schemeClr val="tx1"/>
-          </a:fontRef>
-        </p:style>
-      </p:cxnSp>
-      <p:sp>
-        <p:nvSpPr>
-          <p:cNvPr id="88" name="Rounded Rectangle 87"/>
-          <p:cNvSpPr/>
-          <p:nvPr/>
-        </p:nvSpPr>
-        <p:spPr>
-          <a:xfrm>
-            <a:off x="8087708" y="2097295"/>
-            <a:ext cx="1776353" cy="395416"/>
-          </a:xfrm>
-          <a:prstGeom prst="roundRect">
-            <a:avLst/>
-          </a:prstGeom>
-          <a:ln w="19050"/>
-        </p:spPr>
-        <p:style>
-          <a:lnRef idx="2">
-            <a:schemeClr val="dk1"/>
-          </a:lnRef>
-          <a:fillRef idx="1">
-            <a:schemeClr val="lt1"/>
-          </a:fillRef>
-          <a:effectRef idx="0">
-            <a:schemeClr val="dk1"/>
-          </a:effectRef>
-          <a:fontRef idx="minor">
-            <a:schemeClr val="dk1"/>
-          </a:fontRef>
-        </p:style>
-        <p:txBody>
-          <a:bodyPr rtlCol="0" anchor="ctr"/>
-          <a:lstStyle/>
-          <a:p>
-            <a:pPr algn="ctr"/>
-            <a:r>
-              <a:rPr lang="en-US" sz="1400" dirty="0" smtClean="0"/>
-              <a:t>Repaired Byte code</a:t>
-            </a:r>
-            <a:endParaRPr lang="en-US" sz="1400" dirty="0"/>
+              <a:rPr lang="en-US" sz="1600" dirty="0" smtClean="0"/>
+              <a:t>Dynamic constraint </a:t>
+            </a:r>
+            <a:endParaRPr lang="en-US" sz="1600" dirty="0"/>
           </a:p>
         </p:txBody>
       </p:sp>
@@ -6865,20 +6414,352 @@
         <p:nvCxnSpPr>
           <p:cNvPr id="89" name="Straight Arrow Connector 88"/>
           <p:cNvCxnSpPr>
-            <a:stCxn id="61" idx="0"/>
-            <a:endCxn id="88" idx="2"/>
+            <a:stCxn id="6" idx="3"/>
+            <a:endCxn id="4" idx="1"/>
           </p:cNvCxnSpPr>
           <p:nvPr/>
         </p:nvCxnSpPr>
         <p:spPr>
+          <a:xfrm>
+            <a:off x="2947220" y="3221509"/>
+            <a:ext cx="281888" cy="0"/>
+          </a:xfrm>
+          <a:prstGeom prst="straightConnector1">
+            <a:avLst/>
+          </a:prstGeom>
+          <a:ln w="12700">
+            <a:tailEnd type="triangle"/>
+          </a:ln>
+        </p:spPr>
+        <p:style>
+          <a:lnRef idx="1">
+            <a:schemeClr val="dk1"/>
+          </a:lnRef>
+          <a:fillRef idx="0">
+            <a:schemeClr val="dk1"/>
+          </a:fillRef>
+          <a:effectRef idx="0">
+            <a:schemeClr val="dk1"/>
+          </a:effectRef>
+          <a:fontRef idx="minor">
+            <a:schemeClr val="tx1"/>
+          </a:fontRef>
+        </p:style>
+      </p:cxnSp>
+      <p:cxnSp>
+        <p:nvCxnSpPr>
+          <p:cNvPr id="27" name="Straight Arrow Connector 26"/>
+          <p:cNvCxnSpPr>
+            <a:stCxn id="4" idx="3"/>
+            <a:endCxn id="5" idx="1"/>
+          </p:cNvCxnSpPr>
+          <p:nvPr/>
+        </p:nvCxnSpPr>
+        <p:spPr>
+          <a:xfrm>
+            <a:off x="4557870" y="3221509"/>
+            <a:ext cx="281888" cy="0"/>
+          </a:xfrm>
+          <a:prstGeom prst="straightConnector1">
+            <a:avLst/>
+          </a:prstGeom>
+          <a:ln w="12700">
+            <a:tailEnd type="triangle"/>
+          </a:ln>
+        </p:spPr>
+        <p:style>
+          <a:lnRef idx="1">
+            <a:schemeClr val="dk1"/>
+          </a:lnRef>
+          <a:fillRef idx="0">
+            <a:schemeClr val="dk1"/>
+          </a:fillRef>
+          <a:effectRef idx="0">
+            <a:schemeClr val="dk1"/>
+          </a:effectRef>
+          <a:fontRef idx="minor">
+            <a:schemeClr val="tx1"/>
+          </a:fontRef>
+        </p:style>
+      </p:cxnSp>
+      <p:cxnSp>
+        <p:nvCxnSpPr>
+          <p:cNvPr id="30" name="Straight Arrow Connector 29"/>
+          <p:cNvCxnSpPr>
+            <a:stCxn id="5" idx="3"/>
+            <a:endCxn id="38" idx="1"/>
+          </p:cNvCxnSpPr>
+          <p:nvPr/>
+        </p:nvCxnSpPr>
+        <p:spPr>
+          <a:xfrm>
+            <a:off x="6128517" y="3221509"/>
+            <a:ext cx="321891" cy="0"/>
+          </a:xfrm>
+          <a:prstGeom prst="straightConnector1">
+            <a:avLst/>
+          </a:prstGeom>
+          <a:ln w="12700">
+            <a:tailEnd type="triangle"/>
+          </a:ln>
+        </p:spPr>
+        <p:style>
+          <a:lnRef idx="1">
+            <a:schemeClr val="dk1"/>
+          </a:lnRef>
+          <a:fillRef idx="0">
+            <a:schemeClr val="dk1"/>
+          </a:fillRef>
+          <a:effectRef idx="0">
+            <a:schemeClr val="dk1"/>
+          </a:effectRef>
+          <a:fontRef idx="minor">
+            <a:schemeClr val="tx1"/>
+          </a:fontRef>
+        </p:style>
+      </p:cxnSp>
+      <p:sp>
+        <p:nvSpPr>
+          <p:cNvPr id="33" name="Rounded Rectangle 32"/>
+          <p:cNvSpPr/>
+          <p:nvPr/>
+        </p:nvSpPr>
+        <p:spPr>
+          <a:xfrm>
+            <a:off x="7733666" y="2927006"/>
+            <a:ext cx="1159987" cy="589006"/>
+          </a:xfrm>
+          <a:prstGeom prst="roundRect">
+            <a:avLst/>
+          </a:prstGeom>
+          <a:ln w="19050"/>
+        </p:spPr>
+        <p:style>
+          <a:lnRef idx="2">
+            <a:schemeClr val="dk1"/>
+          </a:lnRef>
+          <a:fillRef idx="1">
+            <a:schemeClr val="lt1"/>
+          </a:fillRef>
+          <a:effectRef idx="0">
+            <a:schemeClr val="dk1"/>
+          </a:effectRef>
+          <a:fontRef idx="minor">
+            <a:schemeClr val="dk1"/>
+          </a:fontRef>
+        </p:style>
+        <p:txBody>
+          <a:bodyPr rtlCol="0" anchor="ctr"/>
+          <a:lstStyle/>
+          <a:p>
+            <a:pPr algn="ctr"/>
+            <a:r>
+              <a:rPr lang="en-US" sz="1400" dirty="0" smtClean="0"/>
+              <a:t>Repaired program</a:t>
+            </a:r>
+            <a:endParaRPr lang="en-US" sz="1400" dirty="0"/>
+          </a:p>
+        </p:txBody>
+      </p:sp>
+      <p:sp>
+        <p:nvSpPr>
+          <p:cNvPr id="19" name="Oval 18"/>
+          <p:cNvSpPr/>
+          <p:nvPr/>
+        </p:nvSpPr>
+        <p:spPr>
+          <a:xfrm>
+            <a:off x="9141750" y="2861182"/>
+            <a:ext cx="708338" cy="708338"/>
+          </a:xfrm>
+          <a:prstGeom prst="ellipse">
+            <a:avLst/>
+          </a:prstGeom>
+        </p:spPr>
+        <p:style>
+          <a:lnRef idx="2">
+            <a:schemeClr val="dk1"/>
+          </a:lnRef>
+          <a:fillRef idx="1">
+            <a:schemeClr val="lt1"/>
+          </a:fillRef>
+          <a:effectRef idx="0">
+            <a:schemeClr val="dk1"/>
+          </a:effectRef>
+          <a:fontRef idx="minor">
+            <a:schemeClr val="dk1"/>
+          </a:fontRef>
+        </p:style>
+        <p:txBody>
+          <a:bodyPr rtlCol="0" anchor="ctr"/>
+          <a:lstStyle/>
+          <a:p>
+            <a:pPr algn="ctr"/>
+            <a:r>
+              <a:rPr lang="en-US" sz="1400" dirty="0" smtClean="0"/>
+              <a:t>Run</a:t>
+            </a:r>
+            <a:endParaRPr lang="en-US" sz="1400" dirty="0"/>
+          </a:p>
+        </p:txBody>
+      </p:sp>
+      <p:cxnSp>
+        <p:nvCxnSpPr>
+          <p:cNvPr id="35" name="Straight Arrow Connector 34"/>
+          <p:cNvCxnSpPr>
+            <a:stCxn id="38" idx="3"/>
+            <a:endCxn id="33" idx="1"/>
+          </p:cNvCxnSpPr>
+          <p:nvPr/>
+        </p:nvCxnSpPr>
+        <p:spPr>
+          <a:xfrm>
+            <a:off x="7485569" y="3221509"/>
+            <a:ext cx="248097" cy="0"/>
+          </a:xfrm>
+          <a:prstGeom prst="straightConnector1">
+            <a:avLst/>
+          </a:prstGeom>
+          <a:ln w="12700">
+            <a:tailEnd type="triangle"/>
+          </a:ln>
+        </p:spPr>
+        <p:style>
+          <a:lnRef idx="1">
+            <a:schemeClr val="dk1"/>
+          </a:lnRef>
+          <a:fillRef idx="0">
+            <a:schemeClr val="dk1"/>
+          </a:fillRef>
+          <a:effectRef idx="0">
+            <a:schemeClr val="dk1"/>
+          </a:effectRef>
+          <a:fontRef idx="minor">
+            <a:schemeClr val="tx1"/>
+          </a:fontRef>
+        </p:style>
+      </p:cxnSp>
+      <p:cxnSp>
+        <p:nvCxnSpPr>
+          <p:cNvPr id="41" name="Straight Arrow Connector 40"/>
+          <p:cNvCxnSpPr>
+            <a:stCxn id="33" idx="3"/>
+            <a:endCxn id="19" idx="2"/>
+          </p:cNvCxnSpPr>
+          <p:nvPr/>
+        </p:nvCxnSpPr>
+        <p:spPr>
           <a:xfrm flipV="1">
-            <a:off x="8975885" y="2492711"/>
-            <a:ext cx="0" cy="337501"/>
+            <a:off x="8893653" y="3215351"/>
+            <a:ext cx="248097" cy="6158"/>
           </a:xfrm>
           <a:prstGeom prst="straightConnector1">
             <a:avLst/>
           </a:prstGeom>
           <a:ln w="12700">
+            <a:tailEnd type="triangle"/>
+          </a:ln>
+        </p:spPr>
+        <p:style>
+          <a:lnRef idx="1">
+            <a:schemeClr val="dk1"/>
+          </a:lnRef>
+          <a:fillRef idx="0">
+            <a:schemeClr val="dk1"/>
+          </a:fillRef>
+          <a:effectRef idx="0">
+            <a:schemeClr val="dk1"/>
+          </a:effectRef>
+          <a:fontRef idx="minor">
+            <a:schemeClr val="tx1"/>
+          </a:fontRef>
+        </p:style>
+      </p:cxnSp>
+      <p:cxnSp>
+        <p:nvCxnSpPr>
+          <p:cNvPr id="31" name="Elbow Connector 30"/>
+          <p:cNvCxnSpPr>
+            <a:stCxn id="19" idx="4"/>
+            <a:endCxn id="61" idx="3"/>
+          </p:cNvCxnSpPr>
+          <p:nvPr/>
+        </p:nvCxnSpPr>
+        <p:spPr>
+          <a:xfrm rot="5400000">
+            <a:off x="9032656" y="3678615"/>
+            <a:ext cx="572358" cy="354169"/>
+          </a:xfrm>
+          <a:prstGeom prst="bentConnector2">
+            <a:avLst/>
+          </a:prstGeom>
+          <a:ln>
+            <a:tailEnd type="triangle"/>
+          </a:ln>
+        </p:spPr>
+        <p:style>
+          <a:lnRef idx="1">
+            <a:schemeClr val="dk1"/>
+          </a:lnRef>
+          <a:fillRef idx="0">
+            <a:schemeClr val="dk1"/>
+          </a:fillRef>
+          <a:effectRef idx="0">
+            <a:schemeClr val="dk1"/>
+          </a:effectRef>
+          <a:fontRef idx="minor">
+            <a:schemeClr val="tx1"/>
+          </a:fontRef>
+        </p:style>
+      </p:cxnSp>
+      <p:cxnSp>
+        <p:nvCxnSpPr>
+          <p:cNvPr id="43" name="Straight Connector 42"/>
+          <p:cNvCxnSpPr>
+            <a:endCxn id="61" idx="1"/>
+          </p:cNvCxnSpPr>
+          <p:nvPr/>
+        </p:nvCxnSpPr>
+        <p:spPr>
+          <a:xfrm>
+            <a:off x="6269583" y="4141878"/>
+            <a:ext cx="916422" cy="0"/>
+          </a:xfrm>
+          <a:prstGeom prst="line">
+            <a:avLst/>
+          </a:prstGeom>
+        </p:spPr>
+        <p:style>
+          <a:lnRef idx="1">
+            <a:schemeClr val="dk1"/>
+          </a:lnRef>
+          <a:fillRef idx="0">
+            <a:schemeClr val="dk1"/>
+          </a:fillRef>
+          <a:effectRef idx="0">
+            <a:schemeClr val="dk1"/>
+          </a:effectRef>
+          <a:fontRef idx="minor">
+            <a:schemeClr val="tx1"/>
+          </a:fontRef>
+        </p:style>
+      </p:cxnSp>
+      <p:cxnSp>
+        <p:nvCxnSpPr>
+          <p:cNvPr id="56" name="Elbow Connector 55"/>
+          <p:cNvCxnSpPr>
+            <a:endCxn id="38" idx="1"/>
+          </p:cNvCxnSpPr>
+          <p:nvPr/>
+        </p:nvCxnSpPr>
+        <p:spPr>
+          <a:xfrm rot="5400000" flipH="1" flipV="1">
+            <a:off x="5899806" y="3591287"/>
+            <a:ext cx="920379" cy="180825"/>
+          </a:xfrm>
+          <a:prstGeom prst="bentConnector2">
+            <a:avLst/>
+          </a:prstGeom>
+          <a:ln w="9525">
             <a:tailEnd type="triangle"/>
           </a:ln>
         </p:spPr>

</xml_diff>

<commit_message>
Constrint representtion model diagram changed
</commit_message>
<xml_diff>
--- a/images/ArrayIndex.pptx
+++ b/images/ArrayIndex.pptx
@@ -9,10 +9,11 @@
     <p:sldId id="257" r:id="rId3"/>
     <p:sldId id="258" r:id="rId4"/>
     <p:sldId id="259" r:id="rId5"/>
-    <p:sldId id="260" r:id="rId6"/>
-    <p:sldId id="261" r:id="rId7"/>
-    <p:sldId id="262" r:id="rId8"/>
-    <p:sldId id="263" r:id="rId9"/>
+    <p:sldId id="264" r:id="rId6"/>
+    <p:sldId id="260" r:id="rId7"/>
+    <p:sldId id="261" r:id="rId8"/>
+    <p:sldId id="262" r:id="rId9"/>
+    <p:sldId id="263" r:id="rId10"/>
   </p:sldIdLst>
   <p:sldSz cx="12192000" cy="6858000"/>
   <p:notesSz cx="6858000" cy="9144000"/>
@@ -6138,6 +6139,620 @@
           <a:chExt cx="0" cy="0"/>
         </a:xfrm>
       </p:grpSpPr>
+      <p:sp>
+        <p:nvSpPr>
+          <p:cNvPr id="4" name="Oval 3"/>
+          <p:cNvSpPr/>
+          <p:nvPr/>
+        </p:nvSpPr>
+        <p:spPr>
+          <a:xfrm>
+            <a:off x="2477047" y="3141911"/>
+            <a:ext cx="2266205" cy="1339938"/>
+          </a:xfrm>
+          <a:prstGeom prst="ellipse">
+            <a:avLst/>
+          </a:prstGeom>
+          <a:ln w="28575"/>
+        </p:spPr>
+        <p:style>
+          <a:lnRef idx="2">
+            <a:schemeClr val="dk1"/>
+          </a:lnRef>
+          <a:fillRef idx="1">
+            <a:schemeClr val="lt1"/>
+          </a:fillRef>
+          <a:effectRef idx="0">
+            <a:schemeClr val="dk1"/>
+          </a:effectRef>
+          <a:fontRef idx="minor">
+            <a:schemeClr val="dk1"/>
+          </a:fontRef>
+        </p:style>
+        <p:txBody>
+          <a:bodyPr rtlCol="0" anchor="ctr"/>
+          <a:lstStyle/>
+          <a:p>
+            <a:pPr algn="ctr"/>
+            <a:r>
+              <a:rPr lang="en-US" sz="3600" dirty="0" smtClean="0">
+                <a:latin typeface="Consolas" panose="020B0609020204030204" pitchFamily="49" charset="0"/>
+                <a:cs typeface="Consolas" panose="020B0609020204030204" pitchFamily="49" charset="0"/>
+              </a:rPr>
+              <a:t>safe</a:t>
+            </a:r>
+            <a:endParaRPr lang="en-US" sz="2400" dirty="0">
+              <a:latin typeface="Consolas" panose="020B0609020204030204" pitchFamily="49" charset="0"/>
+              <a:cs typeface="Consolas" panose="020B0609020204030204" pitchFamily="49" charset="0"/>
+            </a:endParaRPr>
+          </a:p>
+        </p:txBody>
+      </p:sp>
+      <p:sp>
+        <p:nvSpPr>
+          <p:cNvPr id="5" name="Oval 4"/>
+          <p:cNvSpPr/>
+          <p:nvPr/>
+        </p:nvSpPr>
+        <p:spPr>
+          <a:xfrm>
+            <a:off x="7123481" y="3141911"/>
+            <a:ext cx="2266205" cy="1339938"/>
+          </a:xfrm>
+          <a:prstGeom prst="ellipse">
+            <a:avLst/>
+          </a:prstGeom>
+          <a:ln w="28575"/>
+        </p:spPr>
+        <p:style>
+          <a:lnRef idx="2">
+            <a:schemeClr val="dk1"/>
+          </a:lnRef>
+          <a:fillRef idx="1">
+            <a:schemeClr val="lt1"/>
+          </a:fillRef>
+          <a:effectRef idx="0">
+            <a:schemeClr val="dk1"/>
+          </a:effectRef>
+          <a:fontRef idx="minor">
+            <a:schemeClr val="dk1"/>
+          </a:fontRef>
+        </p:style>
+        <p:txBody>
+          <a:bodyPr rtlCol="0" anchor="ctr"/>
+          <a:lstStyle/>
+          <a:p>
+            <a:pPr algn="ctr"/>
+            <a:r>
+              <a:rPr lang="en-US" sz="3600" dirty="0">
+                <a:latin typeface="Consolas" panose="020B0609020204030204" pitchFamily="49" charset="0"/>
+                <a:cs typeface="Consolas" panose="020B0609020204030204" pitchFamily="49" charset="0"/>
+              </a:rPr>
+              <a:t>e</a:t>
+            </a:r>
+            <a:r>
+              <a:rPr lang="en-US" sz="3600" dirty="0" smtClean="0">
+                <a:latin typeface="Consolas" panose="020B0609020204030204" pitchFamily="49" charset="0"/>
+                <a:cs typeface="Consolas" panose="020B0609020204030204" pitchFamily="49" charset="0"/>
+              </a:rPr>
+              <a:t>rror</a:t>
+            </a:r>
+            <a:endParaRPr lang="en-US" sz="2400" dirty="0">
+              <a:latin typeface="Consolas" panose="020B0609020204030204" pitchFamily="49" charset="0"/>
+              <a:cs typeface="Consolas" panose="020B0609020204030204" pitchFamily="49" charset="0"/>
+            </a:endParaRPr>
+          </a:p>
+        </p:txBody>
+      </p:sp>
+      <p:cxnSp>
+        <p:nvCxnSpPr>
+          <p:cNvPr id="6" name="Curved Connector 5"/>
+          <p:cNvCxnSpPr>
+            <a:stCxn id="4" idx="1"/>
+            <a:endCxn id="4" idx="7"/>
+          </p:cNvCxnSpPr>
+          <p:nvPr/>
+        </p:nvCxnSpPr>
+        <p:spPr>
+          <a:xfrm rot="5400000" flipH="1" flipV="1">
+            <a:off x="3610150" y="2536916"/>
+            <a:ext cx="16648" cy="1602449"/>
+          </a:xfrm>
+          <a:prstGeom prst="curvedConnector3">
+            <a:avLst>
+              <a:gd name="adj1" fmla="val 4001916"/>
+            </a:avLst>
+          </a:prstGeom>
+          <a:ln w="19050">
+            <a:tailEnd type="triangle"/>
+          </a:ln>
+        </p:spPr>
+        <p:style>
+          <a:lnRef idx="1">
+            <a:schemeClr val="dk1"/>
+          </a:lnRef>
+          <a:fillRef idx="0">
+            <a:schemeClr val="dk1"/>
+          </a:fillRef>
+          <a:effectRef idx="0">
+            <a:schemeClr val="dk1"/>
+          </a:effectRef>
+          <a:fontRef idx="minor">
+            <a:schemeClr val="tx1"/>
+          </a:fontRef>
+        </p:style>
+      </p:cxnSp>
+      <mc:AlternateContent xmlns:mc="http://schemas.openxmlformats.org/markup-compatibility/2006">
+        <mc:Choice xmlns:a14="http://schemas.microsoft.com/office/drawing/2010/main" Requires="a14">
+          <p:sp>
+            <p:nvSpPr>
+              <p:cNvPr id="8" name="TextBox 7"/>
+              <p:cNvSpPr txBox="1"/>
+              <p:nvPr/>
+            </p:nvSpPr>
+            <p:spPr>
+              <a:xfrm>
+                <a:off x="2817249" y="2146633"/>
+                <a:ext cx="1602450" cy="584775"/>
+              </a:xfrm>
+              <a:prstGeom prst="rect">
+                <a:avLst/>
+              </a:prstGeom>
+              <a:noFill/>
+            </p:spPr>
+            <p:txBody>
+              <a:bodyPr wrap="square" rtlCol="0">
+                <a:spAutoFit/>
+              </a:bodyPr>
+              <a:lstStyle/>
+              <a:p>
+                <a14:m>
+                  <m:oMathPara xmlns:m="http://schemas.openxmlformats.org/officeDocument/2006/math">
+                    <m:oMathParaPr>
+                      <m:jc m:val="centerGroup"/>
+                    </m:oMathParaPr>
+                    <m:oMath xmlns:m="http://schemas.openxmlformats.org/officeDocument/2006/math">
+                      <m:r>
+                        <a:rPr lang="en-US" sz="3200" b="0" i="1" smtClean="0">
+                          <a:latin typeface="Cambria Math" panose="02040503050406030204" pitchFamily="18" charset="0"/>
+                        </a:rPr>
+                        <m:t>𝜂</m:t>
+                      </m:r>
+                    </m:oMath>
+                  </m:oMathPara>
+                </a14:m>
+                <a:endParaRPr lang="en-US" sz="3200" dirty="0"/>
+              </a:p>
+            </p:txBody>
+          </p:sp>
+        </mc:Choice>
+        <mc:Fallback>
+          <p:sp>
+            <p:nvSpPr>
+              <p:cNvPr id="8" name="TextBox 7"/>
+              <p:cNvSpPr txBox="1">
+                <a:spLocks noRot="1" noChangeAspect="1" noMove="1" noResize="1" noEditPoints="1" noAdjustHandles="1" noChangeArrowheads="1" noChangeShapeType="1" noTextEdit="1"/>
+              </p:cNvSpPr>
+              <p:nvPr/>
+            </p:nvSpPr>
+            <p:spPr>
+              <a:xfrm>
+                <a:off x="2817249" y="2146633"/>
+                <a:ext cx="1602450" cy="584775"/>
+              </a:xfrm>
+              <a:prstGeom prst="rect">
+                <a:avLst/>
+              </a:prstGeom>
+              <a:blipFill rotWithShape="0">
+                <a:blip r:embed="rId2"/>
+                <a:stretch>
+                  <a:fillRect/>
+                </a:stretch>
+              </a:blipFill>
+            </p:spPr>
+            <p:txBody>
+              <a:bodyPr/>
+              <a:lstStyle/>
+              <a:p>
+                <a:r>
+                  <a:rPr lang="en-US">
+                    <a:noFill/>
+                  </a:rPr>
+                  <a:t> </a:t>
+                </a:r>
+              </a:p>
+            </p:txBody>
+          </p:sp>
+        </mc:Fallback>
+      </mc:AlternateContent>
+      <p:sp>
+        <p:nvSpPr>
+          <p:cNvPr id="24" name="Isosceles Triangle 23"/>
+          <p:cNvSpPr/>
+          <p:nvPr/>
+        </p:nvSpPr>
+        <p:spPr>
+          <a:xfrm rot="10616813">
+            <a:off x="4340850" y="3187326"/>
+            <a:ext cx="157699" cy="135353"/>
+          </a:xfrm>
+          <a:prstGeom prst="triangle">
+            <a:avLst/>
+          </a:prstGeom>
+        </p:spPr>
+        <p:style>
+          <a:lnRef idx="2">
+            <a:schemeClr val="dk1">
+              <a:shade val="50000"/>
+            </a:schemeClr>
+          </a:lnRef>
+          <a:fillRef idx="1">
+            <a:schemeClr val="dk1"/>
+          </a:fillRef>
+          <a:effectRef idx="0">
+            <a:schemeClr val="dk1"/>
+          </a:effectRef>
+          <a:fontRef idx="minor">
+            <a:schemeClr val="lt1"/>
+          </a:fontRef>
+        </p:style>
+        <p:txBody>
+          <a:bodyPr rtlCol="0" anchor="ctr"/>
+          <a:lstStyle/>
+          <a:p>
+            <a:pPr algn="ctr"/>
+            <a:endParaRPr lang="en-US"/>
+          </a:p>
+        </p:txBody>
+      </p:sp>
+      <p:cxnSp>
+        <p:nvCxnSpPr>
+          <p:cNvPr id="7" name="Straight Arrow Connector 6"/>
+          <p:cNvCxnSpPr>
+            <a:stCxn id="4" idx="6"/>
+            <a:endCxn id="5" idx="2"/>
+          </p:cNvCxnSpPr>
+          <p:nvPr/>
+        </p:nvCxnSpPr>
+        <p:spPr>
+          <a:xfrm>
+            <a:off x="4743252" y="3811880"/>
+            <a:ext cx="2380229" cy="0"/>
+          </a:xfrm>
+          <a:prstGeom prst="straightConnector1">
+            <a:avLst/>
+          </a:prstGeom>
+          <a:ln>
+            <a:tailEnd type="triangle"/>
+          </a:ln>
+        </p:spPr>
+        <p:style>
+          <a:lnRef idx="2">
+            <a:schemeClr val="dk1"/>
+          </a:lnRef>
+          <a:fillRef idx="0">
+            <a:schemeClr val="dk1"/>
+          </a:fillRef>
+          <a:effectRef idx="1">
+            <a:schemeClr val="dk1"/>
+          </a:effectRef>
+          <a:fontRef idx="minor">
+            <a:schemeClr val="tx1"/>
+          </a:fontRef>
+        </p:style>
+      </p:cxnSp>
+      <p:sp>
+        <p:nvSpPr>
+          <p:cNvPr id="27" name="Isosceles Triangle 26"/>
+          <p:cNvSpPr/>
+          <p:nvPr/>
+        </p:nvSpPr>
+        <p:spPr>
+          <a:xfrm rot="5400000">
+            <a:off x="6964950" y="3744203"/>
+            <a:ext cx="157699" cy="135353"/>
+          </a:xfrm>
+          <a:prstGeom prst="triangle">
+            <a:avLst/>
+          </a:prstGeom>
+        </p:spPr>
+        <p:style>
+          <a:lnRef idx="2">
+            <a:schemeClr val="dk1">
+              <a:shade val="50000"/>
+            </a:schemeClr>
+          </a:lnRef>
+          <a:fillRef idx="1">
+            <a:schemeClr val="dk1"/>
+          </a:fillRef>
+          <a:effectRef idx="0">
+            <a:schemeClr val="dk1"/>
+          </a:effectRef>
+          <a:fontRef idx="minor">
+            <a:schemeClr val="lt1"/>
+          </a:fontRef>
+        </p:style>
+        <p:txBody>
+          <a:bodyPr rtlCol="0" anchor="ctr"/>
+          <a:lstStyle/>
+          <a:p>
+            <a:pPr algn="ctr"/>
+            <a:endParaRPr lang="en-US"/>
+          </a:p>
+        </p:txBody>
+      </p:sp>
+      <p:cxnSp>
+        <p:nvCxnSpPr>
+          <p:cNvPr id="10" name="Curved Connector 9"/>
+          <p:cNvCxnSpPr/>
+          <p:nvPr/>
+        </p:nvCxnSpPr>
+        <p:spPr>
+          <a:xfrm rot="5400000" flipH="1" flipV="1">
+            <a:off x="3601825" y="3474849"/>
+            <a:ext cx="16648" cy="1602449"/>
+          </a:xfrm>
+          <a:prstGeom prst="curvedConnector3">
+            <a:avLst>
+              <a:gd name="adj1" fmla="val -3237716"/>
+            </a:avLst>
+          </a:prstGeom>
+          <a:ln w="19050">
+            <a:prstDash val="sysDash"/>
+            <a:tailEnd type="triangle"/>
+          </a:ln>
+        </p:spPr>
+        <p:style>
+          <a:lnRef idx="1">
+            <a:schemeClr val="dk1"/>
+          </a:lnRef>
+          <a:fillRef idx="0">
+            <a:schemeClr val="dk1"/>
+          </a:fillRef>
+          <a:effectRef idx="0">
+            <a:schemeClr val="dk1"/>
+          </a:effectRef>
+          <a:fontRef idx="minor">
+            <a:schemeClr val="tx1"/>
+          </a:fontRef>
+        </p:style>
+      </p:cxnSp>
+      <p:sp>
+        <p:nvSpPr>
+          <p:cNvPr id="15" name="Isosceles Triangle 14"/>
+          <p:cNvSpPr/>
+          <p:nvPr/>
+        </p:nvSpPr>
+        <p:spPr>
+          <a:xfrm rot="1053482">
+            <a:off x="4327601" y="4288605"/>
+            <a:ext cx="157699" cy="135353"/>
+          </a:xfrm>
+          <a:prstGeom prst="triangle">
+            <a:avLst/>
+          </a:prstGeom>
+        </p:spPr>
+        <p:style>
+          <a:lnRef idx="2">
+            <a:schemeClr val="dk1">
+              <a:shade val="50000"/>
+            </a:schemeClr>
+          </a:lnRef>
+          <a:fillRef idx="1">
+            <a:schemeClr val="dk1"/>
+          </a:fillRef>
+          <a:effectRef idx="0">
+            <a:schemeClr val="dk1"/>
+          </a:effectRef>
+          <a:fontRef idx="minor">
+            <a:schemeClr val="lt1"/>
+          </a:fontRef>
+        </p:style>
+        <p:txBody>
+          <a:bodyPr rtlCol="0" anchor="ctr"/>
+          <a:lstStyle/>
+          <a:p>
+            <a:pPr algn="ctr"/>
+            <a:endParaRPr lang="en-US"/>
+          </a:p>
+        </p:txBody>
+      </p:sp>
+      <mc:AlternateContent xmlns:mc="http://schemas.openxmlformats.org/markup-compatibility/2006">
+        <mc:Choice xmlns:a14="http://schemas.microsoft.com/office/drawing/2010/main" Requires="a14">
+          <p:sp>
+            <p:nvSpPr>
+              <p:cNvPr id="17" name="TextBox 16"/>
+              <p:cNvSpPr txBox="1"/>
+              <p:nvPr/>
+            </p:nvSpPr>
+            <p:spPr>
+              <a:xfrm>
+                <a:off x="2769624" y="4714648"/>
+                <a:ext cx="1602450" cy="584775"/>
+              </a:xfrm>
+              <a:prstGeom prst="rect">
+                <a:avLst/>
+              </a:prstGeom>
+              <a:noFill/>
+            </p:spPr>
+            <p:txBody>
+              <a:bodyPr wrap="square" rtlCol="0">
+                <a:spAutoFit/>
+              </a:bodyPr>
+              <a:lstStyle/>
+              <a:p>
+                <a14:m>
+                  <m:oMathPara xmlns:m="http://schemas.openxmlformats.org/officeDocument/2006/math">
+                    <m:oMathParaPr>
+                      <m:jc m:val="centerGroup"/>
+                    </m:oMathParaPr>
+                    <m:oMath xmlns:m="http://schemas.openxmlformats.org/officeDocument/2006/math">
+                      <m:r>
+                        <a:rPr lang="en-US" sz="3200" b="0" i="1" smtClean="0">
+                          <a:latin typeface="Cambria Math" panose="02040503050406030204" pitchFamily="18" charset="0"/>
+                        </a:rPr>
+                        <m:t>𝜁</m:t>
+                      </m:r>
+                    </m:oMath>
+                  </m:oMathPara>
+                </a14:m>
+                <a:endParaRPr lang="en-US" sz="3200" dirty="0"/>
+              </a:p>
+            </p:txBody>
+          </p:sp>
+        </mc:Choice>
+        <mc:Fallback>
+          <p:sp>
+            <p:nvSpPr>
+              <p:cNvPr id="17" name="TextBox 16"/>
+              <p:cNvSpPr txBox="1">
+                <a:spLocks noRot="1" noChangeAspect="1" noMove="1" noResize="1" noEditPoints="1" noAdjustHandles="1" noChangeArrowheads="1" noChangeShapeType="1" noTextEdit="1"/>
+              </p:cNvSpPr>
+              <p:nvPr/>
+            </p:nvSpPr>
+            <p:spPr>
+              <a:xfrm>
+                <a:off x="2769624" y="4714648"/>
+                <a:ext cx="1602450" cy="584775"/>
+              </a:xfrm>
+              <a:prstGeom prst="rect">
+                <a:avLst/>
+              </a:prstGeom>
+              <a:blipFill rotWithShape="0">
+                <a:blip r:embed="rId3"/>
+                <a:stretch>
+                  <a:fillRect/>
+                </a:stretch>
+              </a:blipFill>
+            </p:spPr>
+            <p:txBody>
+              <a:bodyPr/>
+              <a:lstStyle/>
+              <a:p>
+                <a:r>
+                  <a:rPr lang="en-US">
+                    <a:noFill/>
+                  </a:rPr>
+                  <a:t> </a:t>
+                </a:r>
+              </a:p>
+            </p:txBody>
+          </p:sp>
+        </mc:Fallback>
+      </mc:AlternateContent>
+      <mc:AlternateContent xmlns:mc="http://schemas.openxmlformats.org/markup-compatibility/2006">
+        <mc:Choice xmlns:a14="http://schemas.microsoft.com/office/drawing/2010/main" Requires="a14">
+          <p:sp>
+            <p:nvSpPr>
+              <p:cNvPr id="21" name="TextBox 20"/>
+              <p:cNvSpPr txBox="1"/>
+              <p:nvPr/>
+            </p:nvSpPr>
+            <p:spPr>
+              <a:xfrm>
+                <a:off x="5607692" y="3264695"/>
+                <a:ext cx="651347" cy="584775"/>
+              </a:xfrm>
+              <a:prstGeom prst="rect">
+                <a:avLst/>
+              </a:prstGeom>
+              <a:noFill/>
+            </p:spPr>
+            <p:txBody>
+              <a:bodyPr wrap="square" rtlCol="0">
+                <a:spAutoFit/>
+              </a:bodyPr>
+              <a:lstStyle/>
+              <a:p>
+                <a14:m>
+                  <m:oMathPara xmlns:m="http://schemas.openxmlformats.org/officeDocument/2006/math">
+                    <m:oMathParaPr>
+                      <m:jc m:val="centerGroup"/>
+                    </m:oMathParaPr>
+                    <m:oMath xmlns:m="http://schemas.openxmlformats.org/officeDocument/2006/math">
+                      <m:r>
+                        <a:rPr lang="en-US" sz="3200" b="0" i="1" smtClean="0">
+                          <a:latin typeface="Cambria Math" panose="02040503050406030204" pitchFamily="18" charset="0"/>
+                        </a:rPr>
+                        <m:t>𝜆</m:t>
+                      </m:r>
+                    </m:oMath>
+                  </m:oMathPara>
+                </a14:m>
+                <a:endParaRPr lang="en-US" sz="3200" dirty="0"/>
+              </a:p>
+            </p:txBody>
+          </p:sp>
+        </mc:Choice>
+        <mc:Fallback>
+          <p:sp>
+            <p:nvSpPr>
+              <p:cNvPr id="21" name="TextBox 20"/>
+              <p:cNvSpPr txBox="1">
+                <a:spLocks noRot="1" noChangeAspect="1" noMove="1" noResize="1" noEditPoints="1" noAdjustHandles="1" noChangeArrowheads="1" noChangeShapeType="1" noTextEdit="1"/>
+              </p:cNvSpPr>
+              <p:nvPr/>
+            </p:nvSpPr>
+            <p:spPr>
+              <a:xfrm>
+                <a:off x="5607692" y="3264695"/>
+                <a:ext cx="651347" cy="584775"/>
+              </a:xfrm>
+              <a:prstGeom prst="rect">
+                <a:avLst/>
+              </a:prstGeom>
+              <a:blipFill rotWithShape="0">
+                <a:blip r:embed="rId4"/>
+                <a:stretch>
+                  <a:fillRect/>
+                </a:stretch>
+              </a:blipFill>
+            </p:spPr>
+            <p:txBody>
+              <a:bodyPr/>
+              <a:lstStyle/>
+              <a:p>
+                <a:r>
+                  <a:rPr lang="en-US">
+                    <a:noFill/>
+                  </a:rPr>
+                  <a:t> </a:t>
+                </a:r>
+              </a:p>
+            </p:txBody>
+          </p:sp>
+        </mc:Fallback>
+      </mc:AlternateContent>
+    </p:spTree>
+    <p:extLst>
+      <p:ext uri="{BB962C8B-B14F-4D97-AF65-F5344CB8AC3E}">
+        <p14:creationId xmlns:p14="http://schemas.microsoft.com/office/powerpoint/2010/main" val="2744836178"/>
+      </p:ext>
+    </p:extLst>
+  </p:cSld>
+  <p:clrMapOvr>
+    <a:masterClrMapping/>
+  </p:clrMapOvr>
+</p:sld>
+</file>
+
+<file path=ppt/slides/slide6.xml><?xml version="1.0" encoding="utf-8"?>
+<p:sld xmlns:a="http://schemas.openxmlformats.org/drawingml/2006/main" xmlns:r="http://schemas.openxmlformats.org/officeDocument/2006/relationships" xmlns:p="http://schemas.openxmlformats.org/presentationml/2006/main">
+  <p:cSld>
+    <p:spTree>
+      <p:nvGrpSpPr>
+        <p:cNvPr id="1" name=""/>
+        <p:cNvGrpSpPr/>
+        <p:nvPr/>
+      </p:nvGrpSpPr>
+      <p:grpSpPr>
+        <a:xfrm>
+          <a:off x="0" y="0"/>
+          <a:ext cx="0" cy="0"/>
+          <a:chOff x="0" y="0"/>
+          <a:chExt cx="0" cy="0"/>
+        </a:xfrm>
+      </p:grpSpPr>
       <p:graphicFrame>
         <p:nvGraphicFramePr>
           <p:cNvPr id="6" name="Object 5"/>
@@ -6160,7 +6775,7 @@
           <a:graphicData uri="http://schemas.openxmlformats.org/presentationml/2006/ole">
             <mc:AlternateContent xmlns:mc="http://schemas.openxmlformats.org/markup-compatibility/2006">
               <mc:Choice xmlns:v="urn:schemas-microsoft-com:vml" Requires="v">
-                <p:oleObj spid="_x0000_s1067" name="Visio" r:id="rId3" imgW="3752882" imgH="4562496" progId="Visio.Drawing.15">
+                <p:oleObj spid="_x0000_s1072" name="Visio" r:id="rId3" imgW="3752882" imgH="4562496" progId="Visio.Drawing.15">
                   <p:embed/>
                 </p:oleObj>
               </mc:Choice>
@@ -6208,7 +6823,7 @@
 </p:sld>
 </file>
 
-<file path=ppt/slides/slide6.xml><?xml version="1.0" encoding="utf-8"?>
+<file path=ppt/slides/slide7.xml><?xml version="1.0" encoding="utf-8"?>
 <p:sld xmlns:a="http://schemas.openxmlformats.org/drawingml/2006/main" xmlns:r="http://schemas.openxmlformats.org/officeDocument/2006/relationships" xmlns:p="http://schemas.openxmlformats.org/presentationml/2006/main">
   <p:cSld>
     <p:spTree>
@@ -6262,7 +6877,7 @@
 </p:sld>
 </file>
 
-<file path=ppt/slides/slide7.xml><?xml version="1.0" encoding="utf-8"?>
+<file path=ppt/slides/slide8.xml><?xml version="1.0" encoding="utf-8"?>
 <p:sld xmlns:a="http://schemas.openxmlformats.org/drawingml/2006/main" xmlns:r="http://schemas.openxmlformats.org/officeDocument/2006/relationships" xmlns:p="http://schemas.openxmlformats.org/presentationml/2006/main">
   <p:cSld>
     <p:spTree>
@@ -6891,7 +7506,7 @@
 </p:sld>
 </file>
 
-<file path=ppt/slides/slide8.xml><?xml version="1.0" encoding="utf-8"?>
+<file path=ppt/slides/slide9.xml><?xml version="1.0" encoding="utf-8"?>
 <p:sld xmlns:a="http://schemas.openxmlformats.org/drawingml/2006/main" xmlns:r="http://schemas.openxmlformats.org/officeDocument/2006/relationships" xmlns:p="http://schemas.openxmlformats.org/presentationml/2006/main">
   <p:cSld>
     <p:spTree>

</xml_diff>

<commit_message>
Author ordering fixed in related works + automata with substring diagram
</commit_message>
<xml_diff>
--- a/images/ArrayIndex.pptx
+++ b/images/ArrayIndex.pptx
@@ -10,10 +10,11 @@
     <p:sldId id="258" r:id="rId4"/>
     <p:sldId id="259" r:id="rId5"/>
     <p:sldId id="264" r:id="rId6"/>
-    <p:sldId id="260" r:id="rId7"/>
-    <p:sldId id="261" r:id="rId8"/>
-    <p:sldId id="262" r:id="rId9"/>
-    <p:sldId id="263" r:id="rId10"/>
+    <p:sldId id="265" r:id="rId7"/>
+    <p:sldId id="260" r:id="rId8"/>
+    <p:sldId id="261" r:id="rId9"/>
+    <p:sldId id="262" r:id="rId10"/>
+    <p:sldId id="263" r:id="rId11"/>
   </p:sldIdLst>
   <p:sldSz cx="12192000" cy="6858000"/>
   <p:notesSz cx="6858000" cy="9144000"/>
@@ -3815,6 +3816,1044 @@
 </p:sld>
 </file>
 
+<file path=ppt/slides/slide10.xml><?xml version="1.0" encoding="utf-8"?>
+<p:sld xmlns:a="http://schemas.openxmlformats.org/drawingml/2006/main" xmlns:r="http://schemas.openxmlformats.org/officeDocument/2006/relationships" xmlns:p="http://schemas.openxmlformats.org/presentationml/2006/main">
+  <p:cSld>
+    <p:spTree>
+      <p:nvGrpSpPr>
+        <p:cNvPr id="1" name=""/>
+        <p:cNvGrpSpPr/>
+        <p:nvPr/>
+      </p:nvGrpSpPr>
+      <p:grpSpPr>
+        <a:xfrm>
+          <a:off x="0" y="0"/>
+          <a:ext cx="0" cy="0"/>
+          <a:chOff x="0" y="0"/>
+          <a:chExt cx="0" cy="0"/>
+        </a:xfrm>
+      </p:grpSpPr>
+      <p:sp>
+        <p:nvSpPr>
+          <p:cNvPr id="5" name="Rectangle 4"/>
+          <p:cNvSpPr/>
+          <p:nvPr/>
+        </p:nvSpPr>
+        <p:spPr>
+          <a:xfrm>
+            <a:off x="3740490" y="1109175"/>
+            <a:ext cx="3441359" cy="373503"/>
+          </a:xfrm>
+          <a:prstGeom prst="rect">
+            <a:avLst/>
+          </a:prstGeom>
+        </p:spPr>
+        <p:style>
+          <a:lnRef idx="2">
+            <a:schemeClr val="dk1"/>
+          </a:lnRef>
+          <a:fillRef idx="1">
+            <a:schemeClr val="lt1"/>
+          </a:fillRef>
+          <a:effectRef idx="0">
+            <a:schemeClr val="dk1"/>
+          </a:effectRef>
+          <a:fontRef idx="minor">
+            <a:schemeClr val="dk1"/>
+          </a:fontRef>
+        </p:style>
+        <p:txBody>
+          <a:bodyPr rtlCol="0" anchor="ctr"/>
+          <a:lstStyle/>
+          <a:p>
+            <a:pPr algn="ctr"/>
+            <a:r>
+              <a:rPr lang="en-US" dirty="0" smtClean="0"/>
+              <a:t>Static Constraint analysis</a:t>
+            </a:r>
+            <a:endParaRPr lang="en-US" dirty="0"/>
+          </a:p>
+        </p:txBody>
+      </p:sp>
+      <p:sp>
+        <p:nvSpPr>
+          <p:cNvPr id="6" name="Rounded Rectangle 5"/>
+          <p:cNvSpPr/>
+          <p:nvPr/>
+        </p:nvSpPr>
+        <p:spPr>
+          <a:xfrm>
+            <a:off x="3740489" y="52873"/>
+            <a:ext cx="1256011" cy="573659"/>
+          </a:xfrm>
+          <a:prstGeom prst="roundRect">
+            <a:avLst/>
+          </a:prstGeom>
+        </p:spPr>
+        <p:style>
+          <a:lnRef idx="2">
+            <a:schemeClr val="dk1"/>
+          </a:lnRef>
+          <a:fillRef idx="1">
+            <a:schemeClr val="lt1"/>
+          </a:fillRef>
+          <a:effectRef idx="0">
+            <a:schemeClr val="dk1"/>
+          </a:effectRef>
+          <a:fontRef idx="minor">
+            <a:schemeClr val="dk1"/>
+          </a:fontRef>
+        </p:style>
+        <p:txBody>
+          <a:bodyPr rtlCol="0" anchor="ctr"/>
+          <a:lstStyle/>
+          <a:p>
+            <a:pPr algn="ctr"/>
+            <a:r>
+              <a:rPr lang="en-US" sz="1600" dirty="0" smtClean="0"/>
+              <a:t>Byte code</a:t>
+            </a:r>
+            <a:endParaRPr lang="en-US" sz="1600" dirty="0"/>
+          </a:p>
+        </p:txBody>
+      </p:sp>
+      <p:sp>
+        <p:nvSpPr>
+          <p:cNvPr id="7" name="Rounded Rectangle 6"/>
+          <p:cNvSpPr/>
+          <p:nvPr/>
+        </p:nvSpPr>
+        <p:spPr>
+          <a:xfrm>
+            <a:off x="5925834" y="52873"/>
+            <a:ext cx="1370316" cy="573660"/>
+          </a:xfrm>
+          <a:prstGeom prst="roundRect">
+            <a:avLst/>
+          </a:prstGeom>
+        </p:spPr>
+        <p:style>
+          <a:lnRef idx="2">
+            <a:schemeClr val="dk1"/>
+          </a:lnRef>
+          <a:fillRef idx="1">
+            <a:schemeClr val="lt1"/>
+          </a:fillRef>
+          <a:effectRef idx="0">
+            <a:schemeClr val="dk1"/>
+          </a:effectRef>
+          <a:fontRef idx="minor">
+            <a:schemeClr val="dk1"/>
+          </a:fontRef>
+        </p:style>
+        <p:txBody>
+          <a:bodyPr rtlCol="0" anchor="ctr"/>
+          <a:lstStyle/>
+          <a:p>
+            <a:pPr algn="ctr"/>
+            <a:r>
+              <a:rPr lang="en-US" sz="1600" dirty="0" smtClean="0"/>
+              <a:t>Output from taint analysis</a:t>
+            </a:r>
+            <a:endParaRPr lang="en-US" sz="1600" dirty="0"/>
+          </a:p>
+        </p:txBody>
+      </p:sp>
+      <p:cxnSp>
+        <p:nvCxnSpPr>
+          <p:cNvPr id="9" name="Straight Arrow Connector 8"/>
+          <p:cNvCxnSpPr>
+            <a:endCxn id="5" idx="0"/>
+          </p:cNvCxnSpPr>
+          <p:nvPr/>
+        </p:nvCxnSpPr>
+        <p:spPr>
+          <a:xfrm>
+            <a:off x="4368495" y="626532"/>
+            <a:ext cx="1092675" cy="482643"/>
+          </a:xfrm>
+          <a:prstGeom prst="straightConnector1">
+            <a:avLst/>
+          </a:prstGeom>
+          <a:ln w="19050">
+            <a:tailEnd type="triangle"/>
+          </a:ln>
+        </p:spPr>
+        <p:style>
+          <a:lnRef idx="1">
+            <a:schemeClr val="dk1"/>
+          </a:lnRef>
+          <a:fillRef idx="0">
+            <a:schemeClr val="dk1"/>
+          </a:fillRef>
+          <a:effectRef idx="0">
+            <a:schemeClr val="dk1"/>
+          </a:effectRef>
+          <a:fontRef idx="minor">
+            <a:schemeClr val="tx1"/>
+          </a:fontRef>
+        </p:style>
+      </p:cxnSp>
+      <p:cxnSp>
+        <p:nvCxnSpPr>
+          <p:cNvPr id="12" name="Straight Arrow Connector 11"/>
+          <p:cNvCxnSpPr>
+            <a:endCxn id="5" idx="0"/>
+          </p:cNvCxnSpPr>
+          <p:nvPr/>
+        </p:nvCxnSpPr>
+        <p:spPr>
+          <a:xfrm flipH="1">
+            <a:off x="5461170" y="626533"/>
+            <a:ext cx="1092671" cy="482642"/>
+          </a:xfrm>
+          <a:prstGeom prst="straightConnector1">
+            <a:avLst/>
+          </a:prstGeom>
+          <a:ln w="19050">
+            <a:tailEnd type="triangle"/>
+          </a:ln>
+        </p:spPr>
+        <p:style>
+          <a:lnRef idx="1">
+            <a:schemeClr val="dk1"/>
+          </a:lnRef>
+          <a:fillRef idx="0">
+            <a:schemeClr val="dk1"/>
+          </a:fillRef>
+          <a:effectRef idx="0">
+            <a:schemeClr val="dk1"/>
+          </a:effectRef>
+          <a:fontRef idx="minor">
+            <a:schemeClr val="tx1"/>
+          </a:fontRef>
+        </p:style>
+      </p:cxnSp>
+      <p:sp>
+        <p:nvSpPr>
+          <p:cNvPr id="61" name="Rectangle 60"/>
+          <p:cNvSpPr/>
+          <p:nvPr/>
+        </p:nvSpPr>
+        <p:spPr>
+          <a:xfrm>
+            <a:off x="3740489" y="1778568"/>
+            <a:ext cx="3441359" cy="373503"/>
+          </a:xfrm>
+          <a:prstGeom prst="rect">
+            <a:avLst/>
+          </a:prstGeom>
+        </p:spPr>
+        <p:style>
+          <a:lnRef idx="2">
+            <a:schemeClr val="dk1"/>
+          </a:lnRef>
+          <a:fillRef idx="1">
+            <a:schemeClr val="lt1"/>
+          </a:fillRef>
+          <a:effectRef idx="0">
+            <a:schemeClr val="dk1"/>
+          </a:effectRef>
+          <a:fontRef idx="minor">
+            <a:schemeClr val="dk1"/>
+          </a:fontRef>
+        </p:style>
+        <p:txBody>
+          <a:bodyPr rtlCol="0" anchor="ctr"/>
+          <a:lstStyle/>
+          <a:p>
+            <a:pPr algn="ctr"/>
+            <a:r>
+              <a:rPr lang="en-US" dirty="0" smtClean="0"/>
+              <a:t>Skip the Unit if tagged unsafe</a:t>
+            </a:r>
+            <a:endParaRPr lang="en-US" dirty="0"/>
+          </a:p>
+        </p:txBody>
+      </p:sp>
+      <p:sp>
+        <p:nvSpPr>
+          <p:cNvPr id="65" name="Rectangle 64"/>
+          <p:cNvSpPr/>
+          <p:nvPr/>
+        </p:nvSpPr>
+        <p:spPr>
+          <a:xfrm>
+            <a:off x="3740489" y="2447962"/>
+            <a:ext cx="3441359" cy="501566"/>
+          </a:xfrm>
+          <a:prstGeom prst="rect">
+            <a:avLst/>
+          </a:prstGeom>
+        </p:spPr>
+        <p:style>
+          <a:lnRef idx="2">
+            <a:schemeClr val="dk1"/>
+          </a:lnRef>
+          <a:fillRef idx="1">
+            <a:schemeClr val="lt1"/>
+          </a:fillRef>
+          <a:effectRef idx="0">
+            <a:schemeClr val="dk1"/>
+          </a:effectRef>
+          <a:fontRef idx="minor">
+            <a:schemeClr val="dk1"/>
+          </a:fontRef>
+        </p:style>
+        <p:txBody>
+          <a:bodyPr rtlCol="0" anchor="ctr"/>
+          <a:lstStyle/>
+          <a:p>
+            <a:pPr algn="ctr"/>
+            <a:r>
+              <a:rPr lang="en-US" dirty="0" smtClean="0"/>
+              <a:t>Determine if the Unit can throw runtime exception</a:t>
+            </a:r>
+            <a:endParaRPr lang="en-US" dirty="0"/>
+          </a:p>
+        </p:txBody>
+      </p:sp>
+      <p:sp>
+        <p:nvSpPr>
+          <p:cNvPr id="66" name="Rectangle 65"/>
+          <p:cNvSpPr/>
+          <p:nvPr/>
+        </p:nvSpPr>
+        <p:spPr>
+          <a:xfrm>
+            <a:off x="3740489" y="3304107"/>
+            <a:ext cx="3441359" cy="501566"/>
+          </a:xfrm>
+          <a:prstGeom prst="rect">
+            <a:avLst/>
+          </a:prstGeom>
+        </p:spPr>
+        <p:style>
+          <a:lnRef idx="2">
+            <a:schemeClr val="dk1"/>
+          </a:lnRef>
+          <a:fillRef idx="1">
+            <a:schemeClr val="lt1"/>
+          </a:fillRef>
+          <a:effectRef idx="0">
+            <a:schemeClr val="dk1"/>
+          </a:effectRef>
+          <a:fontRef idx="minor">
+            <a:schemeClr val="dk1"/>
+          </a:fontRef>
+        </p:style>
+        <p:txBody>
+          <a:bodyPr rtlCol="0" anchor="ctr"/>
+          <a:lstStyle/>
+          <a:p>
+            <a:pPr algn="ctr"/>
+            <a:r>
+              <a:rPr lang="en-US" dirty="0" smtClean="0"/>
+              <a:t>Instrument the object by solving the static constraints</a:t>
+            </a:r>
+            <a:endParaRPr lang="en-US" dirty="0"/>
+          </a:p>
+        </p:txBody>
+      </p:sp>
+      <p:cxnSp>
+        <p:nvCxnSpPr>
+          <p:cNvPr id="67" name="Straight Arrow Connector 66"/>
+          <p:cNvCxnSpPr>
+            <a:stCxn id="5" idx="2"/>
+            <a:endCxn id="61" idx="0"/>
+          </p:cNvCxnSpPr>
+          <p:nvPr/>
+        </p:nvCxnSpPr>
+        <p:spPr>
+          <a:xfrm flipH="1">
+            <a:off x="5461169" y="1482678"/>
+            <a:ext cx="1" cy="295890"/>
+          </a:xfrm>
+          <a:prstGeom prst="straightConnector1">
+            <a:avLst/>
+          </a:prstGeom>
+          <a:ln w="19050">
+            <a:tailEnd type="triangle"/>
+          </a:ln>
+        </p:spPr>
+        <p:style>
+          <a:lnRef idx="1">
+            <a:schemeClr val="dk1"/>
+          </a:lnRef>
+          <a:fillRef idx="0">
+            <a:schemeClr val="dk1"/>
+          </a:fillRef>
+          <a:effectRef idx="0">
+            <a:schemeClr val="dk1"/>
+          </a:effectRef>
+          <a:fontRef idx="minor">
+            <a:schemeClr val="tx1"/>
+          </a:fontRef>
+        </p:style>
+      </p:cxnSp>
+      <p:cxnSp>
+        <p:nvCxnSpPr>
+          <p:cNvPr id="70" name="Straight Arrow Connector 69"/>
+          <p:cNvCxnSpPr>
+            <a:stCxn id="61" idx="2"/>
+            <a:endCxn id="65" idx="0"/>
+          </p:cNvCxnSpPr>
+          <p:nvPr/>
+        </p:nvCxnSpPr>
+        <p:spPr>
+          <a:xfrm>
+            <a:off x="5461169" y="2152071"/>
+            <a:ext cx="0" cy="295891"/>
+          </a:xfrm>
+          <a:prstGeom prst="straightConnector1">
+            <a:avLst/>
+          </a:prstGeom>
+          <a:ln w="19050">
+            <a:tailEnd type="triangle"/>
+          </a:ln>
+        </p:spPr>
+        <p:style>
+          <a:lnRef idx="1">
+            <a:schemeClr val="dk1"/>
+          </a:lnRef>
+          <a:fillRef idx="0">
+            <a:schemeClr val="dk1"/>
+          </a:fillRef>
+          <a:effectRef idx="0">
+            <a:schemeClr val="dk1"/>
+          </a:effectRef>
+          <a:fontRef idx="minor">
+            <a:schemeClr val="tx1"/>
+          </a:fontRef>
+        </p:style>
+      </p:cxnSp>
+      <p:cxnSp>
+        <p:nvCxnSpPr>
+          <p:cNvPr id="73" name="Straight Arrow Connector 72"/>
+          <p:cNvCxnSpPr>
+            <a:stCxn id="65" idx="2"/>
+            <a:endCxn id="66" idx="0"/>
+          </p:cNvCxnSpPr>
+          <p:nvPr/>
+        </p:nvCxnSpPr>
+        <p:spPr>
+          <a:xfrm>
+            <a:off x="5461169" y="2949528"/>
+            <a:ext cx="0" cy="354579"/>
+          </a:xfrm>
+          <a:prstGeom prst="straightConnector1">
+            <a:avLst/>
+          </a:prstGeom>
+          <a:ln w="19050">
+            <a:tailEnd type="triangle"/>
+          </a:ln>
+        </p:spPr>
+        <p:style>
+          <a:lnRef idx="1">
+            <a:schemeClr val="dk1"/>
+          </a:lnRef>
+          <a:fillRef idx="0">
+            <a:schemeClr val="dk1"/>
+          </a:fillRef>
+          <a:effectRef idx="0">
+            <a:schemeClr val="dk1"/>
+          </a:effectRef>
+          <a:fontRef idx="minor">
+            <a:schemeClr val="tx1"/>
+          </a:fontRef>
+        </p:style>
+      </p:cxnSp>
+      <p:sp>
+        <p:nvSpPr>
+          <p:cNvPr id="76" name="TextBox 75"/>
+          <p:cNvSpPr txBox="1"/>
+          <p:nvPr/>
+        </p:nvSpPr>
+        <p:spPr>
+          <a:xfrm>
+            <a:off x="5461168" y="2949528"/>
+            <a:ext cx="457882" cy="338554"/>
+          </a:xfrm>
+          <a:prstGeom prst="rect">
+            <a:avLst/>
+          </a:prstGeom>
+          <a:noFill/>
+          <a:ln w="19050">
+            <a:noFill/>
+          </a:ln>
+        </p:spPr>
+        <p:txBody>
+          <a:bodyPr wrap="none" rtlCol="0">
+            <a:spAutoFit/>
+          </a:bodyPr>
+          <a:lstStyle/>
+          <a:p>
+            <a:r>
+              <a:rPr lang="en-US" sz="1600" dirty="0" smtClean="0"/>
+              <a:t>yes</a:t>
+            </a:r>
+            <a:endParaRPr lang="en-US" sz="1600" dirty="0"/>
+          </a:p>
+        </p:txBody>
+      </p:sp>
+      <p:cxnSp>
+        <p:nvCxnSpPr>
+          <p:cNvPr id="78" name="Elbow Connector 77"/>
+          <p:cNvCxnSpPr>
+            <a:stCxn id="5" idx="1"/>
+            <a:endCxn id="66" idx="1"/>
+          </p:cNvCxnSpPr>
+          <p:nvPr/>
+        </p:nvCxnSpPr>
+        <p:spPr>
+          <a:xfrm rot="10800000" flipV="1">
+            <a:off x="3740490" y="1295926"/>
+            <a:ext cx="1" cy="2258963"/>
+          </a:xfrm>
+          <a:prstGeom prst="bentConnector3">
+            <a:avLst>
+              <a:gd name="adj1" fmla="val 22860100000"/>
+            </a:avLst>
+          </a:prstGeom>
+          <a:ln w="19050">
+            <a:tailEnd type="triangle"/>
+          </a:ln>
+        </p:spPr>
+        <p:style>
+          <a:lnRef idx="1">
+            <a:schemeClr val="dk1"/>
+          </a:lnRef>
+          <a:fillRef idx="0">
+            <a:schemeClr val="dk1"/>
+          </a:fillRef>
+          <a:effectRef idx="0">
+            <a:schemeClr val="dk1"/>
+          </a:effectRef>
+          <a:fontRef idx="minor">
+            <a:schemeClr val="tx1"/>
+          </a:fontRef>
+        </p:style>
+      </p:cxnSp>
+      <p:sp>
+        <p:nvSpPr>
+          <p:cNvPr id="81" name="TextBox 80"/>
+          <p:cNvSpPr txBox="1"/>
+          <p:nvPr/>
+        </p:nvSpPr>
+        <p:spPr>
+          <a:xfrm rot="16200000">
+            <a:off x="2904353" y="1593237"/>
+            <a:ext cx="1147564" cy="584775"/>
+          </a:xfrm>
+          <a:prstGeom prst="rect">
+            <a:avLst/>
+          </a:prstGeom>
+          <a:noFill/>
+          <a:ln w="19050">
+            <a:noFill/>
+          </a:ln>
+        </p:spPr>
+        <p:txBody>
+          <a:bodyPr wrap="square" rtlCol="0">
+            <a:spAutoFit/>
+          </a:bodyPr>
+          <a:lstStyle/>
+          <a:p>
+            <a:r>
+              <a:rPr lang="en-US" sz="1600" dirty="0" smtClean="0"/>
+              <a:t>    Set of constraints</a:t>
+            </a:r>
+            <a:endParaRPr lang="en-US" sz="1600" dirty="0"/>
+          </a:p>
+        </p:txBody>
+      </p:sp>
+      <p:sp>
+        <p:nvSpPr>
+          <p:cNvPr id="86" name="Rectangle 85"/>
+          <p:cNvSpPr/>
+          <p:nvPr/>
+        </p:nvSpPr>
+        <p:spPr>
+          <a:xfrm>
+            <a:off x="3740489" y="4160252"/>
+            <a:ext cx="3441359" cy="501566"/>
+          </a:xfrm>
+          <a:prstGeom prst="rect">
+            <a:avLst/>
+          </a:prstGeom>
+        </p:spPr>
+        <p:style>
+          <a:lnRef idx="2">
+            <a:schemeClr val="dk1"/>
+          </a:lnRef>
+          <a:fillRef idx="1">
+            <a:schemeClr val="lt1"/>
+          </a:fillRef>
+          <a:effectRef idx="0">
+            <a:schemeClr val="dk1"/>
+          </a:effectRef>
+          <a:fontRef idx="minor">
+            <a:schemeClr val="dk1"/>
+          </a:fontRef>
+        </p:style>
+        <p:txBody>
+          <a:bodyPr rtlCol="0" anchor="ctr"/>
+          <a:lstStyle/>
+          <a:p>
+            <a:pPr algn="ctr"/>
+            <a:r>
+              <a:rPr lang="en-US" dirty="0" smtClean="0"/>
+              <a:t>Instrument the object by modifying its properties</a:t>
+            </a:r>
+            <a:endParaRPr lang="en-US" dirty="0"/>
+          </a:p>
+        </p:txBody>
+      </p:sp>
+      <p:cxnSp>
+        <p:nvCxnSpPr>
+          <p:cNvPr id="88" name="Elbow Connector 87"/>
+          <p:cNvCxnSpPr>
+            <a:stCxn id="65" idx="3"/>
+            <a:endCxn id="86" idx="3"/>
+          </p:cNvCxnSpPr>
+          <p:nvPr/>
+        </p:nvCxnSpPr>
+        <p:spPr>
+          <a:xfrm>
+            <a:off x="7181848" y="2698745"/>
+            <a:ext cx="12700" cy="1712290"/>
+          </a:xfrm>
+          <a:prstGeom prst="bentConnector3">
+            <a:avLst>
+              <a:gd name="adj1" fmla="val 1800000"/>
+            </a:avLst>
+          </a:prstGeom>
+          <a:ln w="19050">
+            <a:tailEnd type="triangle"/>
+          </a:ln>
+        </p:spPr>
+        <p:style>
+          <a:lnRef idx="1">
+            <a:schemeClr val="dk1"/>
+          </a:lnRef>
+          <a:fillRef idx="0">
+            <a:schemeClr val="dk1"/>
+          </a:fillRef>
+          <a:effectRef idx="0">
+            <a:schemeClr val="dk1"/>
+          </a:effectRef>
+          <a:fontRef idx="minor">
+            <a:schemeClr val="tx1"/>
+          </a:fontRef>
+        </p:style>
+      </p:cxnSp>
+      <p:sp>
+        <p:nvSpPr>
+          <p:cNvPr id="89" name="TextBox 88"/>
+          <p:cNvSpPr txBox="1"/>
+          <p:nvPr/>
+        </p:nvSpPr>
+        <p:spPr>
+          <a:xfrm rot="5400000">
+            <a:off x="7336313" y="2918888"/>
+            <a:ext cx="457882" cy="338554"/>
+          </a:xfrm>
+          <a:prstGeom prst="rect">
+            <a:avLst/>
+          </a:prstGeom>
+          <a:noFill/>
+          <a:ln w="19050">
+            <a:noFill/>
+          </a:ln>
+        </p:spPr>
+        <p:txBody>
+          <a:bodyPr wrap="none" rtlCol="0">
+            <a:spAutoFit/>
+          </a:bodyPr>
+          <a:lstStyle/>
+          <a:p>
+            <a:r>
+              <a:rPr lang="en-US" sz="1600" dirty="0" smtClean="0"/>
+              <a:t>yes</a:t>
+            </a:r>
+            <a:endParaRPr lang="en-US" sz="1600" dirty="0"/>
+          </a:p>
+        </p:txBody>
+      </p:sp>
+      <p:sp>
+        <p:nvSpPr>
+          <p:cNvPr id="92" name="Rectangle 91"/>
+          <p:cNvSpPr/>
+          <p:nvPr/>
+        </p:nvSpPr>
+        <p:spPr>
+          <a:xfrm>
+            <a:off x="3740489" y="5016397"/>
+            <a:ext cx="3441359" cy="762056"/>
+          </a:xfrm>
+          <a:prstGeom prst="rect">
+            <a:avLst/>
+          </a:prstGeom>
+        </p:spPr>
+        <p:style>
+          <a:lnRef idx="2">
+            <a:schemeClr val="dk1"/>
+          </a:lnRef>
+          <a:fillRef idx="1">
+            <a:schemeClr val="lt1"/>
+          </a:fillRef>
+          <a:effectRef idx="0">
+            <a:schemeClr val="dk1"/>
+          </a:effectRef>
+          <a:fontRef idx="minor">
+            <a:schemeClr val="dk1"/>
+          </a:fontRef>
+        </p:style>
+        <p:txBody>
+          <a:bodyPr rtlCol="0" anchor="ctr"/>
+          <a:lstStyle/>
+          <a:p>
+            <a:pPr algn="ctr"/>
+            <a:r>
+              <a:rPr lang="en-US" dirty="0" smtClean="0"/>
+              <a:t>Wrap the statement with try-catch block and the patching code in catch block</a:t>
+            </a:r>
+            <a:endParaRPr lang="en-US" dirty="0"/>
+          </a:p>
+        </p:txBody>
+      </p:sp>
+      <p:cxnSp>
+        <p:nvCxnSpPr>
+          <p:cNvPr id="94" name="Elbow Connector 93"/>
+          <p:cNvCxnSpPr>
+            <a:stCxn id="65" idx="1"/>
+            <a:endCxn id="92" idx="1"/>
+          </p:cNvCxnSpPr>
+          <p:nvPr/>
+        </p:nvCxnSpPr>
+        <p:spPr>
+          <a:xfrm rot="10800000" flipV="1">
+            <a:off x="3740489" y="2698745"/>
+            <a:ext cx="12700" cy="2698680"/>
+          </a:xfrm>
+          <a:prstGeom prst="bentConnector3">
+            <a:avLst>
+              <a:gd name="adj1" fmla="val 2550000"/>
+            </a:avLst>
+          </a:prstGeom>
+          <a:ln w="19050">
+            <a:tailEnd type="triangle"/>
+          </a:ln>
+        </p:spPr>
+        <p:style>
+          <a:lnRef idx="1">
+            <a:schemeClr val="dk1"/>
+          </a:lnRef>
+          <a:fillRef idx="0">
+            <a:schemeClr val="dk1"/>
+          </a:fillRef>
+          <a:effectRef idx="0">
+            <a:schemeClr val="dk1"/>
+          </a:effectRef>
+          <a:fontRef idx="minor">
+            <a:schemeClr val="tx1"/>
+          </a:fontRef>
+        </p:style>
+      </p:cxnSp>
+      <p:sp>
+        <p:nvSpPr>
+          <p:cNvPr id="96" name="TextBox 95"/>
+          <p:cNvSpPr txBox="1"/>
+          <p:nvPr/>
+        </p:nvSpPr>
+        <p:spPr>
+          <a:xfrm rot="16200000">
+            <a:off x="2185163" y="3901774"/>
+            <a:ext cx="2243048" cy="338554"/>
+          </a:xfrm>
+          <a:prstGeom prst="rect">
+            <a:avLst/>
+          </a:prstGeom>
+          <a:noFill/>
+          <a:ln w="19050">
+            <a:noFill/>
+          </a:ln>
+        </p:spPr>
+        <p:txBody>
+          <a:bodyPr wrap="square" rtlCol="0">
+            <a:spAutoFit/>
+          </a:bodyPr>
+          <a:lstStyle/>
+          <a:p>
+            <a:r>
+              <a:rPr lang="en-US" sz="1600" dirty="0" smtClean="0"/>
+              <a:t>Runtime Exception type</a:t>
+            </a:r>
+            <a:endParaRPr lang="en-US" sz="1600" dirty="0"/>
+          </a:p>
+        </p:txBody>
+      </p:sp>
+      <p:cxnSp>
+        <p:nvCxnSpPr>
+          <p:cNvPr id="97" name="Straight Arrow Connector 96"/>
+          <p:cNvCxnSpPr>
+            <a:stCxn id="86" idx="2"/>
+            <a:endCxn id="92" idx="0"/>
+          </p:cNvCxnSpPr>
+          <p:nvPr/>
+        </p:nvCxnSpPr>
+        <p:spPr>
+          <a:xfrm>
+            <a:off x="5461169" y="4661818"/>
+            <a:ext cx="0" cy="354579"/>
+          </a:xfrm>
+          <a:prstGeom prst="straightConnector1">
+            <a:avLst/>
+          </a:prstGeom>
+          <a:ln w="19050">
+            <a:tailEnd type="triangle"/>
+          </a:ln>
+        </p:spPr>
+        <p:style>
+          <a:lnRef idx="1">
+            <a:schemeClr val="dk1"/>
+          </a:lnRef>
+          <a:fillRef idx="0">
+            <a:schemeClr val="dk1"/>
+          </a:fillRef>
+          <a:effectRef idx="0">
+            <a:schemeClr val="dk1"/>
+          </a:effectRef>
+          <a:fontRef idx="minor">
+            <a:schemeClr val="tx1"/>
+          </a:fontRef>
+        </p:style>
+      </p:cxnSp>
+      <p:cxnSp>
+        <p:nvCxnSpPr>
+          <p:cNvPr id="101" name="Elbow Connector 100"/>
+          <p:cNvCxnSpPr>
+            <a:stCxn id="66" idx="3"/>
+            <a:endCxn id="92" idx="3"/>
+          </p:cNvCxnSpPr>
+          <p:nvPr/>
+        </p:nvCxnSpPr>
+        <p:spPr>
+          <a:xfrm>
+            <a:off x="7181848" y="3554890"/>
+            <a:ext cx="12700" cy="1842535"/>
+          </a:xfrm>
+          <a:prstGeom prst="bentConnector3">
+            <a:avLst>
+              <a:gd name="adj1" fmla="val 2475000"/>
+            </a:avLst>
+          </a:prstGeom>
+          <a:ln w="19050">
+            <a:solidFill>
+              <a:schemeClr val="tx1"/>
+            </a:solidFill>
+            <a:tailEnd type="triangle"/>
+          </a:ln>
+        </p:spPr>
+        <p:style>
+          <a:lnRef idx="1">
+            <a:schemeClr val="dk1"/>
+          </a:lnRef>
+          <a:fillRef idx="0">
+            <a:schemeClr val="dk1"/>
+          </a:fillRef>
+          <a:effectRef idx="0">
+            <a:schemeClr val="dk1"/>
+          </a:effectRef>
+          <a:fontRef idx="minor">
+            <a:schemeClr val="tx1"/>
+          </a:fontRef>
+        </p:style>
+      </p:cxnSp>
+      <p:sp>
+        <p:nvSpPr>
+          <p:cNvPr id="27" name="Rectangle 26"/>
+          <p:cNvSpPr/>
+          <p:nvPr/>
+        </p:nvSpPr>
+        <p:spPr>
+          <a:xfrm>
+            <a:off x="3740489" y="6133031"/>
+            <a:ext cx="3441359" cy="631811"/>
+          </a:xfrm>
+          <a:prstGeom prst="rect">
+            <a:avLst/>
+          </a:prstGeom>
+        </p:spPr>
+        <p:style>
+          <a:lnRef idx="2">
+            <a:schemeClr val="dk1"/>
+          </a:lnRef>
+          <a:fillRef idx="1">
+            <a:schemeClr val="lt1"/>
+          </a:fillRef>
+          <a:effectRef idx="0">
+            <a:schemeClr val="dk1"/>
+          </a:effectRef>
+          <a:fontRef idx="minor">
+            <a:schemeClr val="dk1"/>
+          </a:fontRef>
+        </p:style>
+        <p:txBody>
+          <a:bodyPr rtlCol="0" anchor="ctr"/>
+          <a:lstStyle/>
+          <a:p>
+            <a:pPr algn="ctr"/>
+            <a:r>
+              <a:rPr lang="en-US" dirty="0" smtClean="0"/>
+              <a:t>Instrument the statement to collect dynamic constraints</a:t>
+            </a:r>
+            <a:endParaRPr lang="en-US" dirty="0"/>
+          </a:p>
+        </p:txBody>
+      </p:sp>
+      <p:cxnSp>
+        <p:nvCxnSpPr>
+          <p:cNvPr id="28" name="Straight Arrow Connector 27"/>
+          <p:cNvCxnSpPr>
+            <a:stCxn id="92" idx="2"/>
+            <a:endCxn id="27" idx="0"/>
+          </p:cNvCxnSpPr>
+          <p:nvPr/>
+        </p:nvCxnSpPr>
+        <p:spPr>
+          <a:xfrm>
+            <a:off x="5461169" y="5778453"/>
+            <a:ext cx="0" cy="354578"/>
+          </a:xfrm>
+          <a:prstGeom prst="straightConnector1">
+            <a:avLst/>
+          </a:prstGeom>
+          <a:ln w="19050">
+            <a:tailEnd type="triangle"/>
+          </a:ln>
+        </p:spPr>
+        <p:style>
+          <a:lnRef idx="1">
+            <a:schemeClr val="dk1"/>
+          </a:lnRef>
+          <a:fillRef idx="0">
+            <a:schemeClr val="dk1"/>
+          </a:fillRef>
+          <a:effectRef idx="0">
+            <a:schemeClr val="dk1"/>
+          </a:effectRef>
+          <a:fontRef idx="minor">
+            <a:schemeClr val="tx1"/>
+          </a:fontRef>
+        </p:style>
+      </p:cxnSp>
+      <p:cxnSp>
+        <p:nvCxnSpPr>
+          <p:cNvPr id="13" name="Elbow Connector 12"/>
+          <p:cNvCxnSpPr>
+            <a:stCxn id="27" idx="3"/>
+            <a:endCxn id="92" idx="3"/>
+          </p:cNvCxnSpPr>
+          <p:nvPr/>
+        </p:nvCxnSpPr>
+        <p:spPr>
+          <a:xfrm flipV="1">
+            <a:off x="7181848" y="5397425"/>
+            <a:ext cx="12700" cy="1051512"/>
+          </a:xfrm>
+          <a:prstGeom prst="bentConnector3">
+            <a:avLst>
+              <a:gd name="adj1" fmla="val 4436614"/>
+            </a:avLst>
+          </a:prstGeom>
+          <a:ln w="19050">
+            <a:tailEnd type="triangle"/>
+          </a:ln>
+        </p:spPr>
+        <p:style>
+          <a:lnRef idx="1">
+            <a:schemeClr val="dk1"/>
+          </a:lnRef>
+          <a:fillRef idx="0">
+            <a:schemeClr val="dk1"/>
+          </a:fillRef>
+          <a:effectRef idx="0">
+            <a:schemeClr val="dk1"/>
+          </a:effectRef>
+          <a:fontRef idx="minor">
+            <a:schemeClr val="tx1"/>
+          </a:fontRef>
+        </p:style>
+      </p:cxnSp>
+      <p:sp>
+        <p:nvSpPr>
+          <p:cNvPr id="36" name="TextBox 35"/>
+          <p:cNvSpPr txBox="1"/>
+          <p:nvPr/>
+        </p:nvSpPr>
+        <p:spPr>
+          <a:xfrm rot="5400000">
+            <a:off x="7145323" y="5375482"/>
+            <a:ext cx="1250081" cy="1077218"/>
+          </a:xfrm>
+          <a:prstGeom prst="rect">
+            <a:avLst/>
+          </a:prstGeom>
+          <a:noFill/>
+          <a:ln w="19050">
+            <a:noFill/>
+          </a:ln>
+        </p:spPr>
+        <p:txBody>
+          <a:bodyPr wrap="square" rtlCol="0">
+            <a:spAutoFit/>
+          </a:bodyPr>
+          <a:lstStyle/>
+          <a:p>
+            <a:pPr algn="ctr"/>
+            <a:r>
+              <a:rPr lang="en-US" sz="1600" dirty="0" smtClean="0"/>
+              <a:t>Fallback </a:t>
+            </a:r>
+          </a:p>
+          <a:p>
+            <a:pPr algn="ctr"/>
+            <a:r>
+              <a:rPr lang="en-US" sz="1600" dirty="0" smtClean="0"/>
+              <a:t>insufficient </a:t>
+            </a:r>
+          </a:p>
+          <a:p>
+            <a:pPr algn="ctr"/>
+            <a:r>
+              <a:rPr lang="en-US" sz="1600" dirty="0" smtClean="0"/>
+              <a:t>Constraint</a:t>
+            </a:r>
+          </a:p>
+          <a:p>
+            <a:pPr algn="ctr"/>
+            <a:r>
+              <a:rPr lang="en-US" sz="1600" dirty="0" smtClean="0"/>
+              <a:t> information</a:t>
+            </a:r>
+            <a:endParaRPr lang="en-US" sz="1600" dirty="0"/>
+          </a:p>
+        </p:txBody>
+      </p:sp>
+    </p:spTree>
+    <p:extLst>
+      <p:ext uri="{BB962C8B-B14F-4D97-AF65-F5344CB8AC3E}">
+        <p14:creationId xmlns:p14="http://schemas.microsoft.com/office/powerpoint/2010/main" val="2423475886"/>
+      </p:ext>
+    </p:extLst>
+  </p:cSld>
+  <p:clrMapOvr>
+    <a:masterClrMapping/>
+  </p:clrMapOvr>
+</p:sld>
+</file>
+
 <file path=ppt/slides/slide2.xml><?xml version="1.0" encoding="utf-8"?>
 <p:sld xmlns:a="http://schemas.openxmlformats.org/drawingml/2006/main" xmlns:r="http://schemas.openxmlformats.org/officeDocument/2006/relationships" xmlns:p="http://schemas.openxmlformats.org/presentationml/2006/main">
   <p:cSld>
@@ -6898,6 +7937,90 @@
           </a:fontRef>
         </p:style>
       </p:cxnSp>
+      <mc:AlternateContent xmlns:mc="http://schemas.openxmlformats.org/markup-compatibility/2006">
+        <mc:Choice xmlns:a14="http://schemas.microsoft.com/office/drawing/2010/main" Requires="a14">
+          <p:sp>
+            <p:nvSpPr>
+              <p:cNvPr id="30" name="TextBox 29"/>
+              <p:cNvSpPr txBox="1"/>
+              <p:nvPr/>
+            </p:nvSpPr>
+            <p:spPr>
+              <a:xfrm>
+                <a:off x="4812952" y="3353271"/>
+                <a:ext cx="1966506" cy="461665"/>
+              </a:xfrm>
+              <a:prstGeom prst="rect">
+                <a:avLst/>
+              </a:prstGeom>
+              <a:noFill/>
+            </p:spPr>
+            <p:txBody>
+              <a:bodyPr wrap="square" rtlCol="0">
+                <a:spAutoFit/>
+              </a:bodyPr>
+              <a:lstStyle/>
+              <a:p>
+                <a:pPr/>
+                <a14:m>
+                  <m:oMathPara xmlns:m="http://schemas.openxmlformats.org/officeDocument/2006/math">
+                    <m:oMathParaPr>
+                      <m:jc m:val="centerGroup"/>
+                    </m:oMathParaPr>
+                    <m:oMath xmlns:m="http://schemas.openxmlformats.org/officeDocument/2006/math">
+                      <m:r>
+                        <a:rPr lang="en-US" sz="2400" b="0" i="1" smtClean="0">
+                          <a:latin typeface="Cambria Math" panose="02040503050406030204" pitchFamily="18" charset="0"/>
+                        </a:rPr>
+                        <m:t>𝑜𝑡h𝑒𝑟</m:t>
+                      </m:r>
+                    </m:oMath>
+                  </m:oMathPara>
+                </a14:m>
+                <a:endParaRPr lang="en-US" sz="2400" dirty="0"/>
+              </a:p>
+            </p:txBody>
+          </p:sp>
+        </mc:Choice>
+        <mc:Fallback>
+          <p:sp>
+            <p:nvSpPr>
+              <p:cNvPr id="30" name="TextBox 29"/>
+              <p:cNvSpPr txBox="1">
+                <a:spLocks noRot="1" noChangeAspect="1" noMove="1" noResize="1" noEditPoints="1" noAdjustHandles="1" noChangeArrowheads="1" noChangeShapeType="1" noTextEdit="1"/>
+              </p:cNvSpPr>
+              <p:nvPr/>
+            </p:nvSpPr>
+            <p:spPr>
+              <a:xfrm>
+                <a:off x="4812952" y="3353271"/>
+                <a:ext cx="1966506" cy="461665"/>
+              </a:xfrm>
+              <a:prstGeom prst="rect">
+                <a:avLst/>
+              </a:prstGeom>
+              <a:blipFill rotWithShape="0">
+                <a:blip r:embed="rId4"/>
+                <a:stretch>
+                  <a:fillRect/>
+                </a:stretch>
+              </a:blipFill>
+            </p:spPr>
+            <p:txBody>
+              <a:bodyPr/>
+              <a:lstStyle/>
+              <a:p>
+                <a:r>
+                  <a:rPr lang="en-US">
+                    <a:noFill/>
+                  </a:rPr>
+                  <a:t> </a:t>
+                </a:r>
+              </a:p>
+            </p:txBody>
+          </p:sp>
+        </mc:Fallback>
+      </mc:AlternateContent>
     </p:spTree>
     <p:extLst>
       <p:ext uri="{BB962C8B-B14F-4D97-AF65-F5344CB8AC3E}">
@@ -6912,6 +8035,676 @@
 </file>
 
 <file path=ppt/slides/slide6.xml><?xml version="1.0" encoding="utf-8"?>
+<p:sld xmlns:a="http://schemas.openxmlformats.org/drawingml/2006/main" xmlns:r="http://schemas.openxmlformats.org/officeDocument/2006/relationships" xmlns:p="http://schemas.openxmlformats.org/presentationml/2006/main">
+  <p:cSld>
+    <p:spTree>
+      <p:nvGrpSpPr>
+        <p:cNvPr id="1" name=""/>
+        <p:cNvGrpSpPr/>
+        <p:nvPr/>
+      </p:nvGrpSpPr>
+      <p:grpSpPr>
+        <a:xfrm>
+          <a:off x="0" y="0"/>
+          <a:ext cx="0" cy="0"/>
+          <a:chOff x="0" y="0"/>
+          <a:chExt cx="0" cy="0"/>
+        </a:xfrm>
+      </p:grpSpPr>
+      <p:sp>
+        <p:nvSpPr>
+          <p:cNvPr id="4" name="Oval 3"/>
+          <p:cNvSpPr/>
+          <p:nvPr/>
+        </p:nvSpPr>
+        <p:spPr>
+          <a:xfrm>
+            <a:off x="2477047" y="3141911"/>
+            <a:ext cx="2266205" cy="1339938"/>
+          </a:xfrm>
+          <a:prstGeom prst="ellipse">
+            <a:avLst/>
+          </a:prstGeom>
+          <a:ln w="28575"/>
+        </p:spPr>
+        <p:style>
+          <a:lnRef idx="2">
+            <a:schemeClr val="dk1"/>
+          </a:lnRef>
+          <a:fillRef idx="1">
+            <a:schemeClr val="lt1"/>
+          </a:fillRef>
+          <a:effectRef idx="0">
+            <a:schemeClr val="dk1"/>
+          </a:effectRef>
+          <a:fontRef idx="minor">
+            <a:schemeClr val="dk1"/>
+          </a:fontRef>
+        </p:style>
+        <p:txBody>
+          <a:bodyPr rtlCol="0" anchor="ctr"/>
+          <a:lstStyle/>
+          <a:p>
+            <a:pPr algn="ctr"/>
+            <a:r>
+              <a:rPr lang="en-US" sz="3600" dirty="0" smtClean="0">
+                <a:latin typeface="Consolas" panose="020B0609020204030204" pitchFamily="49" charset="0"/>
+                <a:cs typeface="Consolas" panose="020B0609020204030204" pitchFamily="49" charset="0"/>
+              </a:rPr>
+              <a:t>safe</a:t>
+            </a:r>
+            <a:endParaRPr lang="en-US" sz="2400" dirty="0">
+              <a:latin typeface="Consolas" panose="020B0609020204030204" pitchFamily="49" charset="0"/>
+              <a:cs typeface="Consolas" panose="020B0609020204030204" pitchFamily="49" charset="0"/>
+            </a:endParaRPr>
+          </a:p>
+        </p:txBody>
+      </p:sp>
+      <p:sp>
+        <p:nvSpPr>
+          <p:cNvPr id="5" name="Oval 4"/>
+          <p:cNvSpPr/>
+          <p:nvPr/>
+        </p:nvSpPr>
+        <p:spPr>
+          <a:xfrm>
+            <a:off x="7123481" y="3141911"/>
+            <a:ext cx="2266205" cy="1339938"/>
+          </a:xfrm>
+          <a:prstGeom prst="ellipse">
+            <a:avLst/>
+          </a:prstGeom>
+          <a:ln w="28575"/>
+        </p:spPr>
+        <p:style>
+          <a:lnRef idx="2">
+            <a:schemeClr val="dk1"/>
+          </a:lnRef>
+          <a:fillRef idx="1">
+            <a:schemeClr val="lt1"/>
+          </a:fillRef>
+          <a:effectRef idx="0">
+            <a:schemeClr val="dk1"/>
+          </a:effectRef>
+          <a:fontRef idx="minor">
+            <a:schemeClr val="dk1"/>
+          </a:fontRef>
+        </p:style>
+        <p:txBody>
+          <a:bodyPr rtlCol="0" anchor="ctr"/>
+          <a:lstStyle/>
+          <a:p>
+            <a:pPr algn="ctr"/>
+            <a:r>
+              <a:rPr lang="en-US" sz="3600" dirty="0">
+                <a:latin typeface="Consolas" panose="020B0609020204030204" pitchFamily="49" charset="0"/>
+                <a:cs typeface="Consolas" panose="020B0609020204030204" pitchFamily="49" charset="0"/>
+              </a:rPr>
+              <a:t>e</a:t>
+            </a:r>
+            <a:r>
+              <a:rPr lang="en-US" sz="3600" dirty="0" smtClean="0">
+                <a:latin typeface="Consolas" panose="020B0609020204030204" pitchFamily="49" charset="0"/>
+                <a:cs typeface="Consolas" panose="020B0609020204030204" pitchFamily="49" charset="0"/>
+              </a:rPr>
+              <a:t>rror</a:t>
+            </a:r>
+            <a:endParaRPr lang="en-US" sz="2400" dirty="0">
+              <a:latin typeface="Consolas" panose="020B0609020204030204" pitchFamily="49" charset="0"/>
+              <a:cs typeface="Consolas" panose="020B0609020204030204" pitchFamily="49" charset="0"/>
+            </a:endParaRPr>
+          </a:p>
+        </p:txBody>
+      </p:sp>
+      <p:cxnSp>
+        <p:nvCxnSpPr>
+          <p:cNvPr id="6" name="Curved Connector 5"/>
+          <p:cNvCxnSpPr>
+            <a:stCxn id="4" idx="1"/>
+            <a:endCxn id="4" idx="7"/>
+          </p:cNvCxnSpPr>
+          <p:nvPr/>
+        </p:nvCxnSpPr>
+        <p:spPr>
+          <a:xfrm rot="5400000" flipH="1" flipV="1">
+            <a:off x="3610150" y="2536916"/>
+            <a:ext cx="16648" cy="1602449"/>
+          </a:xfrm>
+          <a:prstGeom prst="curvedConnector3">
+            <a:avLst>
+              <a:gd name="adj1" fmla="val 4001916"/>
+            </a:avLst>
+          </a:prstGeom>
+          <a:ln w="19050">
+            <a:tailEnd type="triangle"/>
+          </a:ln>
+        </p:spPr>
+        <p:style>
+          <a:lnRef idx="1">
+            <a:schemeClr val="dk1"/>
+          </a:lnRef>
+          <a:fillRef idx="0">
+            <a:schemeClr val="dk1"/>
+          </a:fillRef>
+          <a:effectRef idx="0">
+            <a:schemeClr val="dk1"/>
+          </a:effectRef>
+          <a:fontRef idx="minor">
+            <a:schemeClr val="tx1"/>
+          </a:fontRef>
+        </p:style>
+      </p:cxnSp>
+      <p:sp>
+        <p:nvSpPr>
+          <p:cNvPr id="24" name="Isosceles Triangle 23"/>
+          <p:cNvSpPr/>
+          <p:nvPr/>
+        </p:nvSpPr>
+        <p:spPr>
+          <a:xfrm rot="10616813">
+            <a:off x="4340850" y="3187326"/>
+            <a:ext cx="157699" cy="135353"/>
+          </a:xfrm>
+          <a:prstGeom prst="triangle">
+            <a:avLst/>
+          </a:prstGeom>
+        </p:spPr>
+        <p:style>
+          <a:lnRef idx="2">
+            <a:schemeClr val="dk1">
+              <a:shade val="50000"/>
+            </a:schemeClr>
+          </a:lnRef>
+          <a:fillRef idx="1">
+            <a:schemeClr val="dk1"/>
+          </a:fillRef>
+          <a:effectRef idx="0">
+            <a:schemeClr val="dk1"/>
+          </a:effectRef>
+          <a:fontRef idx="minor">
+            <a:schemeClr val="lt1"/>
+          </a:fontRef>
+        </p:style>
+        <p:txBody>
+          <a:bodyPr rtlCol="0" anchor="ctr"/>
+          <a:lstStyle/>
+          <a:p>
+            <a:pPr algn="ctr"/>
+            <a:endParaRPr lang="en-US"/>
+          </a:p>
+        </p:txBody>
+      </p:sp>
+      <p:cxnSp>
+        <p:nvCxnSpPr>
+          <p:cNvPr id="7" name="Straight Arrow Connector 6"/>
+          <p:cNvCxnSpPr>
+            <a:stCxn id="4" idx="6"/>
+            <a:endCxn id="5" idx="2"/>
+          </p:cNvCxnSpPr>
+          <p:nvPr/>
+        </p:nvCxnSpPr>
+        <p:spPr>
+          <a:xfrm>
+            <a:off x="4743252" y="3811880"/>
+            <a:ext cx="2380229" cy="0"/>
+          </a:xfrm>
+          <a:prstGeom prst="straightConnector1">
+            <a:avLst/>
+          </a:prstGeom>
+          <a:ln>
+            <a:tailEnd type="triangle"/>
+          </a:ln>
+        </p:spPr>
+        <p:style>
+          <a:lnRef idx="2">
+            <a:schemeClr val="dk1"/>
+          </a:lnRef>
+          <a:fillRef idx="0">
+            <a:schemeClr val="dk1"/>
+          </a:fillRef>
+          <a:effectRef idx="1">
+            <a:schemeClr val="dk1"/>
+          </a:effectRef>
+          <a:fontRef idx="minor">
+            <a:schemeClr val="tx1"/>
+          </a:fontRef>
+        </p:style>
+      </p:cxnSp>
+      <p:sp>
+        <p:nvSpPr>
+          <p:cNvPr id="27" name="Isosceles Triangle 26"/>
+          <p:cNvSpPr/>
+          <p:nvPr/>
+        </p:nvSpPr>
+        <p:spPr>
+          <a:xfrm rot="5400000">
+            <a:off x="6964950" y="3744203"/>
+            <a:ext cx="157699" cy="135353"/>
+          </a:xfrm>
+          <a:prstGeom prst="triangle">
+            <a:avLst/>
+          </a:prstGeom>
+        </p:spPr>
+        <p:style>
+          <a:lnRef idx="2">
+            <a:schemeClr val="dk1">
+              <a:shade val="50000"/>
+            </a:schemeClr>
+          </a:lnRef>
+          <a:fillRef idx="1">
+            <a:schemeClr val="dk1"/>
+          </a:fillRef>
+          <a:effectRef idx="0">
+            <a:schemeClr val="dk1"/>
+          </a:effectRef>
+          <a:fontRef idx="minor">
+            <a:schemeClr val="lt1"/>
+          </a:fontRef>
+        </p:style>
+        <p:txBody>
+          <a:bodyPr rtlCol="0" anchor="ctr"/>
+          <a:lstStyle/>
+          <a:p>
+            <a:pPr algn="ctr"/>
+            <a:endParaRPr lang="en-US"/>
+          </a:p>
+        </p:txBody>
+      </p:sp>
+      <mc:AlternateContent xmlns:mc="http://schemas.openxmlformats.org/markup-compatibility/2006">
+        <mc:Choice xmlns:a14="http://schemas.microsoft.com/office/drawing/2010/main" Requires="a14">
+          <p:sp>
+            <p:nvSpPr>
+              <p:cNvPr id="21" name="TextBox 20"/>
+              <p:cNvSpPr txBox="1"/>
+              <p:nvPr/>
+            </p:nvSpPr>
+            <p:spPr>
+              <a:xfrm>
+                <a:off x="2641333" y="1527806"/>
+                <a:ext cx="2265518" cy="1200329"/>
+              </a:xfrm>
+              <a:prstGeom prst="rect">
+                <a:avLst/>
+              </a:prstGeom>
+              <a:noFill/>
+            </p:spPr>
+            <p:txBody>
+              <a:bodyPr wrap="square" rtlCol="0">
+                <a:spAutoFit/>
+              </a:bodyPr>
+              <a:lstStyle/>
+              <a:p>
+                <a:pPr/>
+                <a14:m>
+                  <m:oMathPara xmlns:m="http://schemas.openxmlformats.org/officeDocument/2006/math">
+                    <m:oMathParaPr>
+                      <m:jc m:val="centerGroup"/>
+                    </m:oMathParaPr>
+                    <m:oMath xmlns:m="http://schemas.openxmlformats.org/officeDocument/2006/math">
+                      <m:r>
+                        <a:rPr lang="en-US" sz="2400" b="0" i="1" smtClean="0">
+                          <a:latin typeface="Cambria Math" panose="02040503050406030204" pitchFamily="18" charset="0"/>
+                        </a:rPr>
+                        <m:t>(</m:t>
+                      </m:r>
+                      <m:r>
+                        <a:rPr lang="en-US" sz="2400" b="0" i="1" smtClean="0">
+                          <a:latin typeface="Cambria Math" panose="02040503050406030204" pitchFamily="18" charset="0"/>
+                        </a:rPr>
+                        <m:t>𝑠𝑢𝑏𝑠𝑡𝑟𝑖𝑛𝑔</m:t>
+                      </m:r>
+                      <m:r>
+                        <a:rPr lang="en-US" sz="2400" b="0" i="1" smtClean="0">
+                          <a:latin typeface="Cambria Math" panose="02040503050406030204" pitchFamily="18" charset="0"/>
+                        </a:rPr>
+                        <m:t>(</m:t>
+                      </m:r>
+                      <m:r>
+                        <a:rPr lang="en-US" sz="2400" b="0" i="1" smtClean="0">
+                          <a:latin typeface="Cambria Math" panose="02040503050406030204" pitchFamily="18" charset="0"/>
+                        </a:rPr>
+                        <m:t>𝑖</m:t>
+                      </m:r>
+                      <m:r>
+                        <a:rPr lang="en-US" sz="2400" b="0" i="1" smtClean="0">
+                          <a:latin typeface="Cambria Math" panose="02040503050406030204" pitchFamily="18" charset="0"/>
+                        </a:rPr>
+                        <m:t>,</m:t>
+                      </m:r>
+                      <m:r>
+                        <a:rPr lang="en-US" sz="2400" b="0" i="1" smtClean="0">
+                          <a:latin typeface="Cambria Math" panose="02040503050406030204" pitchFamily="18" charset="0"/>
+                        </a:rPr>
+                        <m:t>𝑗</m:t>
+                      </m:r>
+                      <m:r>
+                        <a:rPr lang="en-US" sz="2400" b="0" i="1" smtClean="0">
+                          <a:latin typeface="Cambria Math" panose="02040503050406030204" pitchFamily="18" charset="0"/>
+                        </a:rPr>
+                        <m:t>),</m:t>
+                      </m:r>
+                    </m:oMath>
+                  </m:oMathPara>
+                </a14:m>
+                <a:endParaRPr lang="en-US" sz="2400" b="0" i="1" dirty="0" smtClean="0">
+                  <a:latin typeface="Cambria Math" panose="02040503050406030204" pitchFamily="18" charset="0"/>
+                </a:endParaRPr>
+              </a:p>
+              <a:p>
+                <a:pPr/>
+                <a14:m>
+                  <m:oMathPara xmlns:m="http://schemas.openxmlformats.org/officeDocument/2006/math">
+                    <m:oMathParaPr>
+                      <m:jc m:val="centerGroup"/>
+                    </m:oMathParaPr>
+                    <m:oMath xmlns:m="http://schemas.openxmlformats.org/officeDocument/2006/math">
+                      <m:r>
+                        <a:rPr lang="en-US" sz="2400" b="0" i="1" smtClean="0">
+                          <a:latin typeface="Cambria Math" panose="02040503050406030204" pitchFamily="18" charset="0"/>
+                        </a:rPr>
+                        <m:t>𝐼𝑛𝑑𝑒𝑥𝑂𝑢𝑡𝑂𝑓𝐵𝑜𝑢𝑛𝑑𝐸𝑥𝑐𝑒𝑝𝑡𝑖𝑜𝑛</m:t>
+                      </m:r>
+                      <m:r>
+                        <a:rPr lang="en-US" sz="2400" b="0" i="1" smtClean="0">
+                          <a:latin typeface="Cambria Math" panose="02040503050406030204" pitchFamily="18" charset="0"/>
+                        </a:rPr>
+                        <m:t>,</m:t>
+                      </m:r>
+                      <m:r>
+                        <a:rPr lang="en-US" sz="2400" b="0" i="1" smtClean="0">
+                          <a:latin typeface="Cambria Math" panose="02040503050406030204" pitchFamily="18" charset="0"/>
+                        </a:rPr>
+                        <m:t> </m:t>
+                      </m:r>
+                    </m:oMath>
+                  </m:oMathPara>
+                </a14:m>
+                <a:endParaRPr lang="en-US" sz="2400" b="0" i="1" dirty="0" smtClean="0">
+                  <a:latin typeface="Cambria Math" panose="02040503050406030204" pitchFamily="18" charset="0"/>
+                </a:endParaRPr>
+              </a:p>
+              <a:p>
+                <a:pPr/>
+                <a14:m>
+                  <m:oMathPara xmlns:m="http://schemas.openxmlformats.org/officeDocument/2006/math">
+                    <m:oMathParaPr>
+                      <m:jc m:val="centerGroup"/>
+                    </m:oMathParaPr>
+                    <m:oMath xmlns:m="http://schemas.openxmlformats.org/officeDocument/2006/math">
+                      <m:r>
+                        <a:rPr lang="en-US" sz="2400" b="0" i="1" smtClean="0">
+                          <a:latin typeface="Cambria Math" panose="02040503050406030204" pitchFamily="18" charset="0"/>
+                        </a:rPr>
+                        <m:t>{</m:t>
+                      </m:r>
+                      <m:r>
+                        <a:rPr lang="en-US" sz="2400" b="0" i="1" smtClean="0">
+                          <a:latin typeface="Cambria Math" panose="02040503050406030204" pitchFamily="18" charset="0"/>
+                        </a:rPr>
+                        <m:t>𝑖</m:t>
+                      </m:r>
+                      <m:r>
+                        <a:rPr lang="en-US" sz="2400" b="0" i="1" smtClean="0">
+                          <a:latin typeface="Cambria Math" panose="02040503050406030204" pitchFamily="18" charset="0"/>
+                        </a:rPr>
+                        <m:t>,</m:t>
+                      </m:r>
+                      <m:r>
+                        <a:rPr lang="en-US" sz="2400" b="0" i="1" smtClean="0">
+                          <a:latin typeface="Cambria Math" panose="02040503050406030204" pitchFamily="18" charset="0"/>
+                        </a:rPr>
+                        <m:t>𝑗</m:t>
+                      </m:r>
+                      <m:r>
+                        <a:rPr lang="en-US" sz="2400" b="0" i="1" smtClean="0">
+                          <a:latin typeface="Cambria Math" panose="02040503050406030204" pitchFamily="18" charset="0"/>
+                        </a:rPr>
+                        <m:t>≥0, </m:t>
+                      </m:r>
+                      <m:r>
+                        <a:rPr lang="en-US" sz="2400" b="0" i="1" smtClean="0">
+                          <a:latin typeface="Cambria Math" panose="02040503050406030204" pitchFamily="18" charset="0"/>
+                        </a:rPr>
+                        <m:t>𝑖</m:t>
+                      </m:r>
+                      <m:r>
+                        <a:rPr lang="en-US" sz="2400" b="0" i="1" smtClean="0">
+                          <a:latin typeface="Cambria Math" panose="02040503050406030204" pitchFamily="18" charset="0"/>
+                        </a:rPr>
+                        <m:t>≤</m:t>
+                      </m:r>
+                      <m:r>
+                        <a:rPr lang="en-US" sz="2400" b="0" i="1" smtClean="0">
+                          <a:latin typeface="Cambria Math" panose="02040503050406030204" pitchFamily="18" charset="0"/>
+                        </a:rPr>
+                        <m:t>𝑗</m:t>
+                      </m:r>
+                      <m:r>
+                        <a:rPr lang="en-US" sz="2400" b="0" i="1" smtClean="0">
+                          <a:latin typeface="Cambria Math" panose="02040503050406030204" pitchFamily="18" charset="0"/>
+                        </a:rPr>
+                        <m:t>})</m:t>
+                      </m:r>
+                    </m:oMath>
+                  </m:oMathPara>
+                </a14:m>
+                <a:endParaRPr lang="en-US" sz="2400" dirty="0"/>
+              </a:p>
+            </p:txBody>
+          </p:sp>
+        </mc:Choice>
+        <mc:Fallback>
+          <p:sp>
+            <p:nvSpPr>
+              <p:cNvPr id="21" name="TextBox 20"/>
+              <p:cNvSpPr txBox="1">
+                <a:spLocks noRot="1" noChangeAspect="1" noMove="1" noResize="1" noEditPoints="1" noAdjustHandles="1" noChangeArrowheads="1" noChangeShapeType="1" noTextEdit="1"/>
+              </p:cNvSpPr>
+              <p:nvPr/>
+            </p:nvSpPr>
+            <p:spPr>
+              <a:xfrm>
+                <a:off x="2641333" y="1527806"/>
+                <a:ext cx="2265518" cy="1200329"/>
+              </a:xfrm>
+              <a:prstGeom prst="rect">
+                <a:avLst/>
+              </a:prstGeom>
+              <a:blipFill rotWithShape="0">
+                <a:blip r:embed="rId2"/>
+                <a:stretch>
+                  <a:fillRect l="-2151" r="-83065" b="-6091"/>
+                </a:stretch>
+              </a:blipFill>
+            </p:spPr>
+            <p:txBody>
+              <a:bodyPr/>
+              <a:lstStyle/>
+              <a:p>
+                <a:r>
+                  <a:rPr lang="en-US">
+                    <a:noFill/>
+                  </a:rPr>
+                  <a:t> </a:t>
+                </a:r>
+              </a:p>
+            </p:txBody>
+          </p:sp>
+        </mc:Fallback>
+      </mc:AlternateContent>
+      <p:cxnSp>
+        <p:nvCxnSpPr>
+          <p:cNvPr id="3" name="Straight Arrow Connector 2"/>
+          <p:cNvCxnSpPr>
+            <a:endCxn id="4" idx="2"/>
+          </p:cNvCxnSpPr>
+          <p:nvPr/>
+        </p:nvCxnSpPr>
+        <p:spPr>
+          <a:xfrm>
+            <a:off x="2203450" y="3811880"/>
+            <a:ext cx="273597" cy="0"/>
+          </a:xfrm>
+          <a:prstGeom prst="straightConnector1">
+            <a:avLst/>
+          </a:prstGeom>
+          <a:ln w="19050">
+            <a:tailEnd type="triangle"/>
+          </a:ln>
+        </p:spPr>
+        <p:style>
+          <a:lnRef idx="1">
+            <a:schemeClr val="dk1"/>
+          </a:lnRef>
+          <a:fillRef idx="0">
+            <a:schemeClr val="dk1"/>
+          </a:fillRef>
+          <a:effectRef idx="0">
+            <a:schemeClr val="dk1"/>
+          </a:effectRef>
+          <a:fontRef idx="minor">
+            <a:schemeClr val="tx1"/>
+          </a:fontRef>
+        </p:style>
+      </p:cxnSp>
+      <p:sp>
+        <p:nvSpPr>
+          <p:cNvPr id="16" name="Isosceles Triangle 15"/>
+          <p:cNvSpPr/>
+          <p:nvPr/>
+        </p:nvSpPr>
+        <p:spPr>
+          <a:xfrm rot="5400000">
+            <a:off x="2317943" y="3744202"/>
+            <a:ext cx="157699" cy="135353"/>
+          </a:xfrm>
+          <a:prstGeom prst="triangle">
+            <a:avLst/>
+          </a:prstGeom>
+        </p:spPr>
+        <p:style>
+          <a:lnRef idx="2">
+            <a:schemeClr val="dk1">
+              <a:shade val="50000"/>
+            </a:schemeClr>
+          </a:lnRef>
+          <a:fillRef idx="1">
+            <a:schemeClr val="dk1"/>
+          </a:fillRef>
+          <a:effectRef idx="0">
+            <a:schemeClr val="dk1"/>
+          </a:effectRef>
+          <a:fontRef idx="minor">
+            <a:schemeClr val="lt1"/>
+          </a:fontRef>
+        </p:style>
+        <p:txBody>
+          <a:bodyPr rtlCol="0" anchor="ctr"/>
+          <a:lstStyle/>
+          <a:p>
+            <a:pPr algn="ctr"/>
+            <a:endParaRPr lang="en-US"/>
+          </a:p>
+        </p:txBody>
+      </p:sp>
+      <mc:AlternateContent xmlns:mc="http://schemas.openxmlformats.org/markup-compatibility/2006">
+        <mc:Choice xmlns:a14="http://schemas.microsoft.com/office/drawing/2010/main" Requires="a14">
+          <p:sp>
+            <p:nvSpPr>
+              <p:cNvPr id="30" name="TextBox 29"/>
+              <p:cNvSpPr txBox="1"/>
+              <p:nvPr/>
+            </p:nvSpPr>
+            <p:spPr>
+              <a:xfrm>
+                <a:off x="4812952" y="3353271"/>
+                <a:ext cx="1966506" cy="461665"/>
+              </a:xfrm>
+              <a:prstGeom prst="rect">
+                <a:avLst/>
+              </a:prstGeom>
+              <a:noFill/>
+            </p:spPr>
+            <p:txBody>
+              <a:bodyPr wrap="square" rtlCol="0">
+                <a:spAutoFit/>
+              </a:bodyPr>
+              <a:lstStyle/>
+              <a:p>
+                <a:pPr/>
+                <a14:m>
+                  <m:oMathPara xmlns:m="http://schemas.openxmlformats.org/officeDocument/2006/math">
+                    <m:oMathParaPr>
+                      <m:jc m:val="centerGroup"/>
+                    </m:oMathParaPr>
+                    <m:oMath xmlns:m="http://schemas.openxmlformats.org/officeDocument/2006/math">
+                      <m:r>
+                        <a:rPr lang="en-US" sz="2400" b="0" i="1" smtClean="0">
+                          <a:latin typeface="Cambria Math" panose="02040503050406030204" pitchFamily="18" charset="0"/>
+                        </a:rPr>
+                        <m:t>𝑜𝑡h𝑒𝑟</m:t>
+                      </m:r>
+                    </m:oMath>
+                  </m:oMathPara>
+                </a14:m>
+                <a:endParaRPr lang="en-US" sz="2400" dirty="0"/>
+              </a:p>
+            </p:txBody>
+          </p:sp>
+        </mc:Choice>
+        <mc:Fallback>
+          <p:sp>
+            <p:nvSpPr>
+              <p:cNvPr id="30" name="TextBox 29"/>
+              <p:cNvSpPr txBox="1">
+                <a:spLocks noRot="1" noChangeAspect="1" noMove="1" noResize="1" noEditPoints="1" noAdjustHandles="1" noChangeArrowheads="1" noChangeShapeType="1" noTextEdit="1"/>
+              </p:cNvSpPr>
+              <p:nvPr/>
+            </p:nvSpPr>
+            <p:spPr>
+              <a:xfrm>
+                <a:off x="4812952" y="3353271"/>
+                <a:ext cx="1966506" cy="461665"/>
+              </a:xfrm>
+              <a:prstGeom prst="rect">
+                <a:avLst/>
+              </a:prstGeom>
+              <a:blipFill rotWithShape="0">
+                <a:blip r:embed="rId3"/>
+                <a:stretch>
+                  <a:fillRect/>
+                </a:stretch>
+              </a:blipFill>
+            </p:spPr>
+            <p:txBody>
+              <a:bodyPr/>
+              <a:lstStyle/>
+              <a:p>
+                <a:r>
+                  <a:rPr lang="en-US">
+                    <a:noFill/>
+                  </a:rPr>
+                  <a:t> </a:t>
+                </a:r>
+              </a:p>
+            </p:txBody>
+          </p:sp>
+        </mc:Fallback>
+      </mc:AlternateContent>
+    </p:spTree>
+    <p:extLst>
+      <p:ext uri="{BB962C8B-B14F-4D97-AF65-F5344CB8AC3E}">
+        <p14:creationId xmlns:p14="http://schemas.microsoft.com/office/powerpoint/2010/main" val="22946444"/>
+      </p:ext>
+    </p:extLst>
+  </p:cSld>
+  <p:clrMapOvr>
+    <a:masterClrMapping/>
+  </p:clrMapOvr>
+</p:sld>
+</file>
+
+<file path=ppt/slides/slide7.xml><?xml version="1.0" encoding="utf-8"?>
 <p:sld xmlns:a="http://schemas.openxmlformats.org/drawingml/2006/main" xmlns:r="http://schemas.openxmlformats.org/officeDocument/2006/relationships" xmlns:p="http://schemas.openxmlformats.org/presentationml/2006/main">
   <p:cSld>
     <p:spTree>
@@ -6950,7 +8743,7 @@
           <a:graphicData uri="http://schemas.openxmlformats.org/presentationml/2006/ole">
             <mc:AlternateContent xmlns:mc="http://schemas.openxmlformats.org/markup-compatibility/2006">
               <mc:Choice xmlns:v="urn:schemas-microsoft-com:vml" Requires="v">
-                <p:oleObj spid="_x0000_s1078" name="Visio" r:id="rId3" imgW="3752882" imgH="4562496" progId="Visio.Drawing.15">
+                <p:oleObj spid="_x0000_s1080" name="Visio" r:id="rId3" imgW="3752882" imgH="4562496" progId="Visio.Drawing.15">
                   <p:embed/>
                 </p:oleObj>
               </mc:Choice>
@@ -6998,7 +8791,7 @@
 </p:sld>
 </file>
 
-<file path=ppt/slides/slide7.xml><?xml version="1.0" encoding="utf-8"?>
+<file path=ppt/slides/slide8.xml><?xml version="1.0" encoding="utf-8"?>
 <p:sld xmlns:a="http://schemas.openxmlformats.org/drawingml/2006/main" xmlns:r="http://schemas.openxmlformats.org/officeDocument/2006/relationships" xmlns:p="http://schemas.openxmlformats.org/presentationml/2006/main">
   <p:cSld>
     <p:spTree>
@@ -7043,631 +8836,6 @@
     <p:extLst>
       <p:ext uri="{BB962C8B-B14F-4D97-AF65-F5344CB8AC3E}">
         <p14:creationId xmlns:p14="http://schemas.microsoft.com/office/powerpoint/2010/main" val="1140815350"/>
-      </p:ext>
-    </p:extLst>
-  </p:cSld>
-  <p:clrMapOvr>
-    <a:masterClrMapping/>
-  </p:clrMapOvr>
-</p:sld>
-</file>
-
-<file path=ppt/slides/slide8.xml><?xml version="1.0" encoding="utf-8"?>
-<p:sld xmlns:a="http://schemas.openxmlformats.org/drawingml/2006/main" xmlns:r="http://schemas.openxmlformats.org/officeDocument/2006/relationships" xmlns:p="http://schemas.openxmlformats.org/presentationml/2006/main">
-  <p:cSld>
-    <p:spTree>
-      <p:nvGrpSpPr>
-        <p:cNvPr id="1" name=""/>
-        <p:cNvGrpSpPr/>
-        <p:nvPr/>
-      </p:nvGrpSpPr>
-      <p:grpSpPr>
-        <a:xfrm>
-          <a:off x="0" y="0"/>
-          <a:ext cx="0" cy="0"/>
-          <a:chOff x="0" y="0"/>
-          <a:chExt cx="0" cy="0"/>
-        </a:xfrm>
-      </p:grpSpPr>
-      <p:sp>
-        <p:nvSpPr>
-          <p:cNvPr id="4" name="Rectangle 3"/>
-          <p:cNvSpPr/>
-          <p:nvPr/>
-        </p:nvSpPr>
-        <p:spPr>
-          <a:xfrm>
-            <a:off x="3229108" y="2830211"/>
-            <a:ext cx="1328762" cy="782595"/>
-          </a:xfrm>
-          <a:prstGeom prst="rect">
-            <a:avLst/>
-          </a:prstGeom>
-        </p:spPr>
-        <p:style>
-          <a:lnRef idx="2">
-            <a:schemeClr val="dk1"/>
-          </a:lnRef>
-          <a:fillRef idx="1">
-            <a:schemeClr val="lt1"/>
-          </a:fillRef>
-          <a:effectRef idx="0">
-            <a:schemeClr val="dk1"/>
-          </a:effectRef>
-          <a:fontRef idx="minor">
-            <a:schemeClr val="dk1"/>
-          </a:fontRef>
-        </p:style>
-        <p:txBody>
-          <a:bodyPr rtlCol="0" anchor="ctr"/>
-          <a:lstStyle/>
-          <a:p>
-            <a:pPr algn="ctr"/>
-            <a:r>
-              <a:rPr lang="en-US" sz="1600" dirty="0" smtClean="0"/>
-              <a:t>Find program points for patching</a:t>
-            </a:r>
-            <a:endParaRPr lang="en-US" sz="1600" dirty="0"/>
-          </a:p>
-        </p:txBody>
-      </p:sp>
-      <p:sp>
-        <p:nvSpPr>
-          <p:cNvPr id="5" name="Rectangle 4"/>
-          <p:cNvSpPr/>
-          <p:nvPr/>
-        </p:nvSpPr>
-        <p:spPr>
-          <a:xfrm>
-            <a:off x="4839758" y="2830211"/>
-            <a:ext cx="1288759" cy="782595"/>
-          </a:xfrm>
-          <a:prstGeom prst="rect">
-            <a:avLst/>
-          </a:prstGeom>
-        </p:spPr>
-        <p:style>
-          <a:lnRef idx="2">
-            <a:schemeClr val="dk1"/>
-          </a:lnRef>
-          <a:fillRef idx="1">
-            <a:schemeClr val="lt1"/>
-          </a:fillRef>
-          <a:effectRef idx="0">
-            <a:schemeClr val="dk1"/>
-          </a:effectRef>
-          <a:fontRef idx="minor">
-            <a:schemeClr val="dk1"/>
-          </a:fontRef>
-        </p:style>
-        <p:txBody>
-          <a:bodyPr rtlCol="0" anchor="ctr"/>
-          <a:lstStyle/>
-          <a:p>
-            <a:pPr algn="ctr"/>
-            <a:r>
-              <a:rPr lang="en-US" sz="1600" dirty="0" smtClean="0"/>
-              <a:t>Static </a:t>
-            </a:r>
-            <a:r>
-              <a:rPr lang="en-US" sz="1600" dirty="0"/>
-              <a:t>c</a:t>
-            </a:r>
-            <a:r>
-              <a:rPr lang="en-US" sz="1600" dirty="0" smtClean="0"/>
-              <a:t>onstraint </a:t>
-            </a:r>
-            <a:r>
-              <a:rPr lang="en-US" sz="1600" dirty="0"/>
-              <a:t>a</a:t>
-            </a:r>
-            <a:r>
-              <a:rPr lang="en-US" sz="1600" dirty="0" smtClean="0"/>
-              <a:t>nalysis</a:t>
-            </a:r>
-            <a:endParaRPr lang="en-US" sz="1600" dirty="0"/>
-          </a:p>
-        </p:txBody>
-      </p:sp>
-      <p:sp>
-        <p:nvSpPr>
-          <p:cNvPr id="6" name="Rounded Rectangle 5"/>
-          <p:cNvSpPr/>
-          <p:nvPr/>
-        </p:nvSpPr>
-        <p:spPr>
-          <a:xfrm>
-            <a:off x="2031736" y="2927006"/>
-            <a:ext cx="915484" cy="589006"/>
-          </a:xfrm>
-          <a:prstGeom prst="roundRect">
-            <a:avLst/>
-          </a:prstGeom>
-          <a:ln w="19050"/>
-        </p:spPr>
-        <p:style>
-          <a:lnRef idx="2">
-            <a:schemeClr val="dk1"/>
-          </a:lnRef>
-          <a:fillRef idx="1">
-            <a:schemeClr val="lt1"/>
-          </a:fillRef>
-          <a:effectRef idx="0">
-            <a:schemeClr val="dk1"/>
-          </a:effectRef>
-          <a:fontRef idx="minor">
-            <a:schemeClr val="dk1"/>
-          </a:fontRef>
-        </p:style>
-        <p:txBody>
-          <a:bodyPr rtlCol="0" anchor="ctr"/>
-          <a:lstStyle/>
-          <a:p>
-            <a:pPr algn="ctr"/>
-            <a:r>
-              <a:rPr lang="en-US" sz="1400" dirty="0" smtClean="0"/>
-              <a:t>Input program</a:t>
-            </a:r>
-            <a:endParaRPr lang="en-US" sz="1400" dirty="0"/>
-          </a:p>
-        </p:txBody>
-      </p:sp>
-      <p:sp>
-        <p:nvSpPr>
-          <p:cNvPr id="38" name="Rectangle 37"/>
-          <p:cNvSpPr/>
-          <p:nvPr/>
-        </p:nvSpPr>
-        <p:spPr>
-          <a:xfrm>
-            <a:off x="6450408" y="2830211"/>
-            <a:ext cx="1035161" cy="782595"/>
-          </a:xfrm>
-          <a:prstGeom prst="rect">
-            <a:avLst/>
-          </a:prstGeom>
-        </p:spPr>
-        <p:style>
-          <a:lnRef idx="2">
-            <a:schemeClr val="dk1"/>
-          </a:lnRef>
-          <a:fillRef idx="1">
-            <a:schemeClr val="lt1"/>
-          </a:fillRef>
-          <a:effectRef idx="0">
-            <a:schemeClr val="dk1"/>
-          </a:effectRef>
-          <a:fontRef idx="minor">
-            <a:schemeClr val="dk1"/>
-          </a:fontRef>
-        </p:style>
-        <p:txBody>
-          <a:bodyPr rtlCol="0" anchor="ctr"/>
-          <a:lstStyle/>
-          <a:p>
-            <a:pPr algn="ctr"/>
-            <a:r>
-              <a:rPr lang="en-US" sz="1600" dirty="0" smtClean="0"/>
-              <a:t>Patching</a:t>
-            </a:r>
-            <a:endParaRPr lang="en-US" sz="1600" dirty="0"/>
-          </a:p>
-        </p:txBody>
-      </p:sp>
-      <p:sp>
-        <p:nvSpPr>
-          <p:cNvPr id="61" name="Rectangle 60"/>
-          <p:cNvSpPr/>
-          <p:nvPr/>
-        </p:nvSpPr>
-        <p:spPr>
-          <a:xfrm>
-            <a:off x="7186005" y="3783532"/>
-            <a:ext cx="1955745" cy="716692"/>
-          </a:xfrm>
-          <a:prstGeom prst="rect">
-            <a:avLst/>
-          </a:prstGeom>
-        </p:spPr>
-        <p:style>
-          <a:lnRef idx="2">
-            <a:schemeClr val="dk1"/>
-          </a:lnRef>
-          <a:fillRef idx="1">
-            <a:schemeClr val="lt1"/>
-          </a:fillRef>
-          <a:effectRef idx="0">
-            <a:schemeClr val="dk1"/>
-          </a:effectRef>
-          <a:fontRef idx="minor">
-            <a:schemeClr val="dk1"/>
-          </a:fontRef>
-        </p:style>
-        <p:txBody>
-          <a:bodyPr rtlCol="0" anchor="ctr"/>
-          <a:lstStyle/>
-          <a:p>
-            <a:pPr algn="ctr"/>
-            <a:r>
-              <a:rPr lang="en-US" sz="1600" dirty="0" smtClean="0"/>
-              <a:t>Dynamic constraint analysis </a:t>
-            </a:r>
-            <a:endParaRPr lang="en-US" sz="1600" dirty="0"/>
-          </a:p>
-        </p:txBody>
-      </p:sp>
-      <p:cxnSp>
-        <p:nvCxnSpPr>
-          <p:cNvPr id="89" name="Straight Arrow Connector 88"/>
-          <p:cNvCxnSpPr>
-            <a:stCxn id="6" idx="3"/>
-            <a:endCxn id="4" idx="1"/>
-          </p:cNvCxnSpPr>
-          <p:nvPr/>
-        </p:nvCxnSpPr>
-        <p:spPr>
-          <a:xfrm>
-            <a:off x="2947220" y="3221509"/>
-            <a:ext cx="281888" cy="0"/>
-          </a:xfrm>
-          <a:prstGeom prst="straightConnector1">
-            <a:avLst/>
-          </a:prstGeom>
-          <a:ln w="12700">
-            <a:tailEnd type="triangle"/>
-          </a:ln>
-        </p:spPr>
-        <p:style>
-          <a:lnRef idx="1">
-            <a:schemeClr val="dk1"/>
-          </a:lnRef>
-          <a:fillRef idx="0">
-            <a:schemeClr val="dk1"/>
-          </a:fillRef>
-          <a:effectRef idx="0">
-            <a:schemeClr val="dk1"/>
-          </a:effectRef>
-          <a:fontRef idx="minor">
-            <a:schemeClr val="tx1"/>
-          </a:fontRef>
-        </p:style>
-      </p:cxnSp>
-      <p:cxnSp>
-        <p:nvCxnSpPr>
-          <p:cNvPr id="27" name="Straight Arrow Connector 26"/>
-          <p:cNvCxnSpPr>
-            <a:stCxn id="4" idx="3"/>
-            <a:endCxn id="5" idx="1"/>
-          </p:cNvCxnSpPr>
-          <p:nvPr/>
-        </p:nvCxnSpPr>
-        <p:spPr>
-          <a:xfrm>
-            <a:off x="4557870" y="3221509"/>
-            <a:ext cx="281888" cy="0"/>
-          </a:xfrm>
-          <a:prstGeom prst="straightConnector1">
-            <a:avLst/>
-          </a:prstGeom>
-          <a:ln w="12700">
-            <a:tailEnd type="triangle"/>
-          </a:ln>
-        </p:spPr>
-        <p:style>
-          <a:lnRef idx="1">
-            <a:schemeClr val="dk1"/>
-          </a:lnRef>
-          <a:fillRef idx="0">
-            <a:schemeClr val="dk1"/>
-          </a:fillRef>
-          <a:effectRef idx="0">
-            <a:schemeClr val="dk1"/>
-          </a:effectRef>
-          <a:fontRef idx="minor">
-            <a:schemeClr val="tx1"/>
-          </a:fontRef>
-        </p:style>
-      </p:cxnSp>
-      <p:cxnSp>
-        <p:nvCxnSpPr>
-          <p:cNvPr id="30" name="Straight Arrow Connector 29"/>
-          <p:cNvCxnSpPr>
-            <a:stCxn id="5" idx="3"/>
-            <a:endCxn id="38" idx="1"/>
-          </p:cNvCxnSpPr>
-          <p:nvPr/>
-        </p:nvCxnSpPr>
-        <p:spPr>
-          <a:xfrm>
-            <a:off x="6128517" y="3221509"/>
-            <a:ext cx="321891" cy="0"/>
-          </a:xfrm>
-          <a:prstGeom prst="straightConnector1">
-            <a:avLst/>
-          </a:prstGeom>
-          <a:ln w="12700">
-            <a:tailEnd type="triangle"/>
-          </a:ln>
-        </p:spPr>
-        <p:style>
-          <a:lnRef idx="1">
-            <a:schemeClr val="dk1"/>
-          </a:lnRef>
-          <a:fillRef idx="0">
-            <a:schemeClr val="dk1"/>
-          </a:fillRef>
-          <a:effectRef idx="0">
-            <a:schemeClr val="dk1"/>
-          </a:effectRef>
-          <a:fontRef idx="minor">
-            <a:schemeClr val="tx1"/>
-          </a:fontRef>
-        </p:style>
-      </p:cxnSp>
-      <p:sp>
-        <p:nvSpPr>
-          <p:cNvPr id="33" name="Rounded Rectangle 32"/>
-          <p:cNvSpPr/>
-          <p:nvPr/>
-        </p:nvSpPr>
-        <p:spPr>
-          <a:xfrm>
-            <a:off x="7733666" y="2927006"/>
-            <a:ext cx="1159987" cy="589006"/>
-          </a:xfrm>
-          <a:prstGeom prst="roundRect">
-            <a:avLst/>
-          </a:prstGeom>
-          <a:ln w="19050"/>
-        </p:spPr>
-        <p:style>
-          <a:lnRef idx="2">
-            <a:schemeClr val="dk1"/>
-          </a:lnRef>
-          <a:fillRef idx="1">
-            <a:schemeClr val="lt1"/>
-          </a:fillRef>
-          <a:effectRef idx="0">
-            <a:schemeClr val="dk1"/>
-          </a:effectRef>
-          <a:fontRef idx="minor">
-            <a:schemeClr val="dk1"/>
-          </a:fontRef>
-        </p:style>
-        <p:txBody>
-          <a:bodyPr rtlCol="0" anchor="ctr"/>
-          <a:lstStyle/>
-          <a:p>
-            <a:pPr algn="ctr"/>
-            <a:r>
-              <a:rPr lang="en-US" sz="1400" dirty="0" smtClean="0"/>
-              <a:t>Repaired program</a:t>
-            </a:r>
-            <a:endParaRPr lang="en-US" sz="1400" dirty="0"/>
-          </a:p>
-        </p:txBody>
-      </p:sp>
-      <p:sp>
-        <p:nvSpPr>
-          <p:cNvPr id="19" name="Oval 18"/>
-          <p:cNvSpPr/>
-          <p:nvPr/>
-        </p:nvSpPr>
-        <p:spPr>
-          <a:xfrm>
-            <a:off x="9141750" y="2861182"/>
-            <a:ext cx="708338" cy="708338"/>
-          </a:xfrm>
-          <a:prstGeom prst="ellipse">
-            <a:avLst/>
-          </a:prstGeom>
-        </p:spPr>
-        <p:style>
-          <a:lnRef idx="2">
-            <a:schemeClr val="dk1"/>
-          </a:lnRef>
-          <a:fillRef idx="1">
-            <a:schemeClr val="lt1"/>
-          </a:fillRef>
-          <a:effectRef idx="0">
-            <a:schemeClr val="dk1"/>
-          </a:effectRef>
-          <a:fontRef idx="minor">
-            <a:schemeClr val="dk1"/>
-          </a:fontRef>
-        </p:style>
-        <p:txBody>
-          <a:bodyPr rtlCol="0" anchor="ctr"/>
-          <a:lstStyle/>
-          <a:p>
-            <a:pPr algn="ctr"/>
-            <a:r>
-              <a:rPr lang="en-US" sz="1400" dirty="0" smtClean="0"/>
-              <a:t>Run</a:t>
-            </a:r>
-            <a:endParaRPr lang="en-US" sz="1400" dirty="0"/>
-          </a:p>
-        </p:txBody>
-      </p:sp>
-      <p:cxnSp>
-        <p:nvCxnSpPr>
-          <p:cNvPr id="35" name="Straight Arrow Connector 34"/>
-          <p:cNvCxnSpPr>
-            <a:stCxn id="38" idx="3"/>
-            <a:endCxn id="33" idx="1"/>
-          </p:cNvCxnSpPr>
-          <p:nvPr/>
-        </p:nvCxnSpPr>
-        <p:spPr>
-          <a:xfrm>
-            <a:off x="7485569" y="3221509"/>
-            <a:ext cx="248097" cy="0"/>
-          </a:xfrm>
-          <a:prstGeom prst="straightConnector1">
-            <a:avLst/>
-          </a:prstGeom>
-          <a:ln w="12700">
-            <a:tailEnd type="triangle"/>
-          </a:ln>
-        </p:spPr>
-        <p:style>
-          <a:lnRef idx="1">
-            <a:schemeClr val="dk1"/>
-          </a:lnRef>
-          <a:fillRef idx="0">
-            <a:schemeClr val="dk1"/>
-          </a:fillRef>
-          <a:effectRef idx="0">
-            <a:schemeClr val="dk1"/>
-          </a:effectRef>
-          <a:fontRef idx="minor">
-            <a:schemeClr val="tx1"/>
-          </a:fontRef>
-        </p:style>
-      </p:cxnSp>
-      <p:cxnSp>
-        <p:nvCxnSpPr>
-          <p:cNvPr id="41" name="Straight Arrow Connector 40"/>
-          <p:cNvCxnSpPr>
-            <a:stCxn id="33" idx="3"/>
-            <a:endCxn id="19" idx="2"/>
-          </p:cNvCxnSpPr>
-          <p:nvPr/>
-        </p:nvCxnSpPr>
-        <p:spPr>
-          <a:xfrm flipV="1">
-            <a:off x="8893653" y="3215351"/>
-            <a:ext cx="248097" cy="6158"/>
-          </a:xfrm>
-          <a:prstGeom prst="straightConnector1">
-            <a:avLst/>
-          </a:prstGeom>
-          <a:ln w="12700">
-            <a:tailEnd type="triangle"/>
-          </a:ln>
-        </p:spPr>
-        <p:style>
-          <a:lnRef idx="1">
-            <a:schemeClr val="dk1"/>
-          </a:lnRef>
-          <a:fillRef idx="0">
-            <a:schemeClr val="dk1"/>
-          </a:fillRef>
-          <a:effectRef idx="0">
-            <a:schemeClr val="dk1"/>
-          </a:effectRef>
-          <a:fontRef idx="minor">
-            <a:schemeClr val="tx1"/>
-          </a:fontRef>
-        </p:style>
-      </p:cxnSp>
-      <p:cxnSp>
-        <p:nvCxnSpPr>
-          <p:cNvPr id="31" name="Elbow Connector 30"/>
-          <p:cNvCxnSpPr>
-            <a:stCxn id="19" idx="4"/>
-            <a:endCxn id="61" idx="3"/>
-          </p:cNvCxnSpPr>
-          <p:nvPr/>
-        </p:nvCxnSpPr>
-        <p:spPr>
-          <a:xfrm rot="5400000">
-            <a:off x="9032656" y="3678615"/>
-            <a:ext cx="572358" cy="354169"/>
-          </a:xfrm>
-          <a:prstGeom prst="bentConnector2">
-            <a:avLst/>
-          </a:prstGeom>
-          <a:ln>
-            <a:tailEnd type="triangle"/>
-          </a:ln>
-        </p:spPr>
-        <p:style>
-          <a:lnRef idx="1">
-            <a:schemeClr val="dk1"/>
-          </a:lnRef>
-          <a:fillRef idx="0">
-            <a:schemeClr val="dk1"/>
-          </a:fillRef>
-          <a:effectRef idx="0">
-            <a:schemeClr val="dk1"/>
-          </a:effectRef>
-          <a:fontRef idx="minor">
-            <a:schemeClr val="tx1"/>
-          </a:fontRef>
-        </p:style>
-      </p:cxnSp>
-      <p:cxnSp>
-        <p:nvCxnSpPr>
-          <p:cNvPr id="43" name="Straight Connector 42"/>
-          <p:cNvCxnSpPr>
-            <a:endCxn id="61" idx="1"/>
-          </p:cNvCxnSpPr>
-          <p:nvPr/>
-        </p:nvCxnSpPr>
-        <p:spPr>
-          <a:xfrm>
-            <a:off x="6269583" y="4141878"/>
-            <a:ext cx="916422" cy="0"/>
-          </a:xfrm>
-          <a:prstGeom prst="line">
-            <a:avLst/>
-          </a:prstGeom>
-        </p:spPr>
-        <p:style>
-          <a:lnRef idx="1">
-            <a:schemeClr val="dk1"/>
-          </a:lnRef>
-          <a:fillRef idx="0">
-            <a:schemeClr val="dk1"/>
-          </a:fillRef>
-          <a:effectRef idx="0">
-            <a:schemeClr val="dk1"/>
-          </a:effectRef>
-          <a:fontRef idx="minor">
-            <a:schemeClr val="tx1"/>
-          </a:fontRef>
-        </p:style>
-      </p:cxnSp>
-      <p:cxnSp>
-        <p:nvCxnSpPr>
-          <p:cNvPr id="56" name="Elbow Connector 55"/>
-          <p:cNvCxnSpPr>
-            <a:endCxn id="38" idx="1"/>
-          </p:cNvCxnSpPr>
-          <p:nvPr/>
-        </p:nvCxnSpPr>
-        <p:spPr>
-          <a:xfrm rot="5400000" flipH="1" flipV="1">
-            <a:off x="5899806" y="3591287"/>
-            <a:ext cx="920379" cy="180825"/>
-          </a:xfrm>
-          <a:prstGeom prst="bentConnector2">
-            <a:avLst/>
-          </a:prstGeom>
-          <a:ln w="9525">
-            <a:tailEnd type="triangle"/>
-          </a:ln>
-        </p:spPr>
-        <p:style>
-          <a:lnRef idx="1">
-            <a:schemeClr val="dk1"/>
-          </a:lnRef>
-          <a:fillRef idx="0">
-            <a:schemeClr val="dk1"/>
-          </a:fillRef>
-          <a:effectRef idx="0">
-            <a:schemeClr val="dk1"/>
-          </a:effectRef>
-          <a:fontRef idx="minor">
-            <a:schemeClr val="tx1"/>
-          </a:fontRef>
-        </p:style>
-      </p:cxnSp>
-    </p:spTree>
-    <p:extLst>
-      <p:ext uri="{BB962C8B-B14F-4D97-AF65-F5344CB8AC3E}">
-        <p14:creationId xmlns:p14="http://schemas.microsoft.com/office/powerpoint/2010/main" val="201351828"/>
       </p:ext>
     </p:extLst>
   </p:cSld>
@@ -7696,14 +8864,56 @@
       </p:grpSpPr>
       <p:sp>
         <p:nvSpPr>
+          <p:cNvPr id="4" name="Rectangle 3"/>
+          <p:cNvSpPr/>
+          <p:nvPr/>
+        </p:nvSpPr>
+        <p:spPr>
+          <a:xfrm>
+            <a:off x="3229108" y="2830211"/>
+            <a:ext cx="1328762" cy="782595"/>
+          </a:xfrm>
+          <a:prstGeom prst="rect">
+            <a:avLst/>
+          </a:prstGeom>
+        </p:spPr>
+        <p:style>
+          <a:lnRef idx="2">
+            <a:schemeClr val="dk1"/>
+          </a:lnRef>
+          <a:fillRef idx="1">
+            <a:schemeClr val="lt1"/>
+          </a:fillRef>
+          <a:effectRef idx="0">
+            <a:schemeClr val="dk1"/>
+          </a:effectRef>
+          <a:fontRef idx="minor">
+            <a:schemeClr val="dk1"/>
+          </a:fontRef>
+        </p:style>
+        <p:txBody>
+          <a:bodyPr rtlCol="0" anchor="ctr"/>
+          <a:lstStyle/>
+          <a:p>
+            <a:pPr algn="ctr"/>
+            <a:r>
+              <a:rPr lang="en-US" sz="1600" dirty="0" smtClean="0"/>
+              <a:t>Find program points for patching</a:t>
+            </a:r>
+            <a:endParaRPr lang="en-US" sz="1600" dirty="0"/>
+          </a:p>
+        </p:txBody>
+      </p:sp>
+      <p:sp>
+        <p:nvSpPr>
           <p:cNvPr id="5" name="Rectangle 4"/>
           <p:cNvSpPr/>
           <p:nvPr/>
         </p:nvSpPr>
         <p:spPr>
           <a:xfrm>
-            <a:off x="3740490" y="1109175"/>
-            <a:ext cx="3441359" cy="373503"/>
+            <a:off x="4839758" y="2830211"/>
+            <a:ext cx="1288759" cy="782595"/>
           </a:xfrm>
           <a:prstGeom prst="rect">
             <a:avLst/>
@@ -7729,10 +8939,26 @@
           <a:p>
             <a:pPr algn="ctr"/>
             <a:r>
-              <a:rPr lang="en-US" dirty="0" smtClean="0"/>
-              <a:t>Static Constraint analysis</a:t>
-            </a:r>
-            <a:endParaRPr lang="en-US" dirty="0"/>
+              <a:rPr lang="en-US" sz="1600" dirty="0" smtClean="0"/>
+              <a:t>Static </a:t>
+            </a:r>
+            <a:r>
+              <a:rPr lang="en-US" sz="1600" dirty="0"/>
+              <a:t>c</a:t>
+            </a:r>
+            <a:r>
+              <a:rPr lang="en-US" sz="1600" dirty="0" smtClean="0"/>
+              <a:t>onstraint </a:t>
+            </a:r>
+            <a:r>
+              <a:rPr lang="en-US" sz="1600" dirty="0"/>
+              <a:t>a</a:t>
+            </a:r>
+            <a:r>
+              <a:rPr lang="en-US" sz="1600" dirty="0" smtClean="0"/>
+              <a:t>nalysis</a:t>
+            </a:r>
+            <a:endParaRPr lang="en-US" sz="1600" dirty="0"/>
           </a:p>
         </p:txBody>
       </p:sp>
@@ -7744,12 +8970,13 @@
         </p:nvSpPr>
         <p:spPr>
           <a:xfrm>
-            <a:off x="3740489" y="52873"/>
-            <a:ext cx="1256011" cy="573659"/>
+            <a:off x="2031736" y="2927006"/>
+            <a:ext cx="915484" cy="589006"/>
           </a:xfrm>
           <a:prstGeom prst="roundRect">
             <a:avLst/>
           </a:prstGeom>
+          <a:ln w="19050"/>
         </p:spPr>
         <p:style>
           <a:lnRef idx="2">
@@ -7771,25 +8998,25 @@
           <a:p>
             <a:pPr algn="ctr"/>
             <a:r>
-              <a:rPr lang="en-US" sz="1600" dirty="0" smtClean="0"/>
-              <a:t>Byte code</a:t>
-            </a:r>
-            <a:endParaRPr lang="en-US" sz="1600" dirty="0"/>
-          </a:p>
-        </p:txBody>
-      </p:sp>
-      <p:sp>
-        <p:nvSpPr>
-          <p:cNvPr id="7" name="Rounded Rectangle 6"/>
+              <a:rPr lang="en-US" sz="1400" dirty="0" smtClean="0"/>
+              <a:t>Input program</a:t>
+            </a:r>
+            <a:endParaRPr lang="en-US" sz="1400" dirty="0"/>
+          </a:p>
+        </p:txBody>
+      </p:sp>
+      <p:sp>
+        <p:nvSpPr>
+          <p:cNvPr id="38" name="Rectangle 37"/>
           <p:cNvSpPr/>
           <p:nvPr/>
         </p:nvSpPr>
         <p:spPr>
           <a:xfrm>
-            <a:off x="5925834" y="52873"/>
-            <a:ext cx="1370316" cy="573660"/>
-          </a:xfrm>
-          <a:prstGeom prst="roundRect">
+            <a:off x="6450408" y="2830211"/>
+            <a:ext cx="1035161" cy="782595"/>
+          </a:xfrm>
+          <a:prstGeom prst="rect">
             <a:avLst/>
           </a:prstGeom>
         </p:spPr>
@@ -7814,7 +9041,49 @@
             <a:pPr algn="ctr"/>
             <a:r>
               <a:rPr lang="en-US" sz="1600" dirty="0" smtClean="0"/>
-              <a:t>Output from taint analysis</a:t>
+              <a:t>Patching</a:t>
+            </a:r>
+            <a:endParaRPr lang="en-US" sz="1600" dirty="0"/>
+          </a:p>
+        </p:txBody>
+      </p:sp>
+      <p:sp>
+        <p:nvSpPr>
+          <p:cNvPr id="61" name="Rectangle 60"/>
+          <p:cNvSpPr/>
+          <p:nvPr/>
+        </p:nvSpPr>
+        <p:spPr>
+          <a:xfrm>
+            <a:off x="7186005" y="3783532"/>
+            <a:ext cx="1955745" cy="716692"/>
+          </a:xfrm>
+          <a:prstGeom prst="rect">
+            <a:avLst/>
+          </a:prstGeom>
+        </p:spPr>
+        <p:style>
+          <a:lnRef idx="2">
+            <a:schemeClr val="dk1"/>
+          </a:lnRef>
+          <a:fillRef idx="1">
+            <a:schemeClr val="lt1"/>
+          </a:fillRef>
+          <a:effectRef idx="0">
+            <a:schemeClr val="dk1"/>
+          </a:effectRef>
+          <a:fontRef idx="minor">
+            <a:schemeClr val="dk1"/>
+          </a:fontRef>
+        </p:style>
+        <p:txBody>
+          <a:bodyPr rtlCol="0" anchor="ctr"/>
+          <a:lstStyle/>
+          <a:p>
+            <a:pPr algn="ctr"/>
+            <a:r>
+              <a:rPr lang="en-US" sz="1600" dirty="0" smtClean="0"/>
+              <a:t>Dynamic constraint analysis </a:t>
             </a:r>
             <a:endParaRPr lang="en-US" sz="1600" dirty="0"/>
           </a:p>
@@ -7822,21 +9091,22 @@
       </p:sp>
       <p:cxnSp>
         <p:nvCxnSpPr>
-          <p:cNvPr id="9" name="Straight Arrow Connector 8"/>
+          <p:cNvPr id="89" name="Straight Arrow Connector 88"/>
           <p:cNvCxnSpPr>
-            <a:endCxn id="5" idx="0"/>
+            <a:stCxn id="6" idx="3"/>
+            <a:endCxn id="4" idx="1"/>
           </p:cNvCxnSpPr>
           <p:nvPr/>
         </p:nvCxnSpPr>
         <p:spPr>
           <a:xfrm>
-            <a:off x="4368495" y="626532"/>
-            <a:ext cx="1092675" cy="482643"/>
+            <a:off x="2947220" y="3221509"/>
+            <a:ext cx="281888" cy="0"/>
           </a:xfrm>
           <a:prstGeom prst="straightConnector1">
             <a:avLst/>
           </a:prstGeom>
-          <a:ln w="19050">
+          <a:ln w="12700">
             <a:tailEnd type="triangle"/>
           </a:ln>
         </p:spPr>
@@ -7857,183 +9127,22 @@
       </p:cxnSp>
       <p:cxnSp>
         <p:nvCxnSpPr>
-          <p:cNvPr id="12" name="Straight Arrow Connector 11"/>
+          <p:cNvPr id="27" name="Straight Arrow Connector 26"/>
           <p:cNvCxnSpPr>
-            <a:endCxn id="5" idx="0"/>
+            <a:stCxn id="4" idx="3"/>
+            <a:endCxn id="5" idx="1"/>
           </p:cNvCxnSpPr>
           <p:nvPr/>
         </p:nvCxnSpPr>
         <p:spPr>
-          <a:xfrm flipH="1">
-            <a:off x="5461170" y="626533"/>
-            <a:ext cx="1092671" cy="482642"/>
+          <a:xfrm>
+            <a:off x="4557870" y="3221509"/>
+            <a:ext cx="281888" cy="0"/>
           </a:xfrm>
           <a:prstGeom prst="straightConnector1">
             <a:avLst/>
           </a:prstGeom>
-          <a:ln w="19050">
-            <a:tailEnd type="triangle"/>
-          </a:ln>
-        </p:spPr>
-        <p:style>
-          <a:lnRef idx="1">
-            <a:schemeClr val="dk1"/>
-          </a:lnRef>
-          <a:fillRef idx="0">
-            <a:schemeClr val="dk1"/>
-          </a:fillRef>
-          <a:effectRef idx="0">
-            <a:schemeClr val="dk1"/>
-          </a:effectRef>
-          <a:fontRef idx="minor">
-            <a:schemeClr val="tx1"/>
-          </a:fontRef>
-        </p:style>
-      </p:cxnSp>
-      <p:sp>
-        <p:nvSpPr>
-          <p:cNvPr id="61" name="Rectangle 60"/>
-          <p:cNvSpPr/>
-          <p:nvPr/>
-        </p:nvSpPr>
-        <p:spPr>
-          <a:xfrm>
-            <a:off x="3740489" y="1778568"/>
-            <a:ext cx="3441359" cy="373503"/>
-          </a:xfrm>
-          <a:prstGeom prst="rect">
-            <a:avLst/>
-          </a:prstGeom>
-        </p:spPr>
-        <p:style>
-          <a:lnRef idx="2">
-            <a:schemeClr val="dk1"/>
-          </a:lnRef>
-          <a:fillRef idx="1">
-            <a:schemeClr val="lt1"/>
-          </a:fillRef>
-          <a:effectRef idx="0">
-            <a:schemeClr val="dk1"/>
-          </a:effectRef>
-          <a:fontRef idx="minor">
-            <a:schemeClr val="dk1"/>
-          </a:fontRef>
-        </p:style>
-        <p:txBody>
-          <a:bodyPr rtlCol="0" anchor="ctr"/>
-          <a:lstStyle/>
-          <a:p>
-            <a:pPr algn="ctr"/>
-            <a:r>
-              <a:rPr lang="en-US" dirty="0" smtClean="0"/>
-              <a:t>Skip the Unit if tagged unsafe</a:t>
-            </a:r>
-            <a:endParaRPr lang="en-US" dirty="0"/>
-          </a:p>
-        </p:txBody>
-      </p:sp>
-      <p:sp>
-        <p:nvSpPr>
-          <p:cNvPr id="65" name="Rectangle 64"/>
-          <p:cNvSpPr/>
-          <p:nvPr/>
-        </p:nvSpPr>
-        <p:spPr>
-          <a:xfrm>
-            <a:off x="3740489" y="2447962"/>
-            <a:ext cx="3441359" cy="501566"/>
-          </a:xfrm>
-          <a:prstGeom prst="rect">
-            <a:avLst/>
-          </a:prstGeom>
-        </p:spPr>
-        <p:style>
-          <a:lnRef idx="2">
-            <a:schemeClr val="dk1"/>
-          </a:lnRef>
-          <a:fillRef idx="1">
-            <a:schemeClr val="lt1"/>
-          </a:fillRef>
-          <a:effectRef idx="0">
-            <a:schemeClr val="dk1"/>
-          </a:effectRef>
-          <a:fontRef idx="minor">
-            <a:schemeClr val="dk1"/>
-          </a:fontRef>
-        </p:style>
-        <p:txBody>
-          <a:bodyPr rtlCol="0" anchor="ctr"/>
-          <a:lstStyle/>
-          <a:p>
-            <a:pPr algn="ctr"/>
-            <a:r>
-              <a:rPr lang="en-US" dirty="0" smtClean="0"/>
-              <a:t>Determine if the Unit can throw runtime exception</a:t>
-            </a:r>
-            <a:endParaRPr lang="en-US" dirty="0"/>
-          </a:p>
-        </p:txBody>
-      </p:sp>
-      <p:sp>
-        <p:nvSpPr>
-          <p:cNvPr id="66" name="Rectangle 65"/>
-          <p:cNvSpPr/>
-          <p:nvPr/>
-        </p:nvSpPr>
-        <p:spPr>
-          <a:xfrm>
-            <a:off x="3740489" y="3304107"/>
-            <a:ext cx="3441359" cy="501566"/>
-          </a:xfrm>
-          <a:prstGeom prst="rect">
-            <a:avLst/>
-          </a:prstGeom>
-        </p:spPr>
-        <p:style>
-          <a:lnRef idx="2">
-            <a:schemeClr val="dk1"/>
-          </a:lnRef>
-          <a:fillRef idx="1">
-            <a:schemeClr val="lt1"/>
-          </a:fillRef>
-          <a:effectRef idx="0">
-            <a:schemeClr val="dk1"/>
-          </a:effectRef>
-          <a:fontRef idx="minor">
-            <a:schemeClr val="dk1"/>
-          </a:fontRef>
-        </p:style>
-        <p:txBody>
-          <a:bodyPr rtlCol="0" anchor="ctr"/>
-          <a:lstStyle/>
-          <a:p>
-            <a:pPr algn="ctr"/>
-            <a:r>
-              <a:rPr lang="en-US" dirty="0" smtClean="0"/>
-              <a:t>Instrument the object by solving the static constraints</a:t>
-            </a:r>
-            <a:endParaRPr lang="en-US" dirty="0"/>
-          </a:p>
-        </p:txBody>
-      </p:sp>
-      <p:cxnSp>
-        <p:nvCxnSpPr>
-          <p:cNvPr id="67" name="Straight Arrow Connector 66"/>
-          <p:cNvCxnSpPr>
-            <a:stCxn id="5" idx="2"/>
-            <a:endCxn id="61" idx="0"/>
-          </p:cNvCxnSpPr>
-          <p:nvPr/>
-        </p:nvCxnSpPr>
-        <p:spPr>
-          <a:xfrm flipH="1">
-            <a:off x="5461169" y="1482678"/>
-            <a:ext cx="1" cy="295890"/>
-          </a:xfrm>
-          <a:prstGeom prst="straightConnector1">
-            <a:avLst/>
-          </a:prstGeom>
-          <a:ln w="19050">
+          <a:ln w="12700">
             <a:tailEnd type="triangle"/>
           </a:ln>
         </p:spPr>
@@ -8054,22 +9163,143 @@
       </p:cxnSp>
       <p:cxnSp>
         <p:nvCxnSpPr>
-          <p:cNvPr id="70" name="Straight Arrow Connector 69"/>
+          <p:cNvPr id="30" name="Straight Arrow Connector 29"/>
           <p:cNvCxnSpPr>
-            <a:stCxn id="61" idx="2"/>
-            <a:endCxn id="65" idx="0"/>
+            <a:stCxn id="5" idx="3"/>
+            <a:endCxn id="38" idx="1"/>
           </p:cNvCxnSpPr>
           <p:nvPr/>
         </p:nvCxnSpPr>
         <p:spPr>
           <a:xfrm>
-            <a:off x="5461169" y="2152071"/>
-            <a:ext cx="0" cy="295891"/>
+            <a:off x="6128517" y="3221509"/>
+            <a:ext cx="321891" cy="0"/>
           </a:xfrm>
           <a:prstGeom prst="straightConnector1">
             <a:avLst/>
           </a:prstGeom>
-          <a:ln w="19050">
+          <a:ln w="12700">
+            <a:tailEnd type="triangle"/>
+          </a:ln>
+        </p:spPr>
+        <p:style>
+          <a:lnRef idx="1">
+            <a:schemeClr val="dk1"/>
+          </a:lnRef>
+          <a:fillRef idx="0">
+            <a:schemeClr val="dk1"/>
+          </a:fillRef>
+          <a:effectRef idx="0">
+            <a:schemeClr val="dk1"/>
+          </a:effectRef>
+          <a:fontRef idx="minor">
+            <a:schemeClr val="tx1"/>
+          </a:fontRef>
+        </p:style>
+      </p:cxnSp>
+      <p:sp>
+        <p:nvSpPr>
+          <p:cNvPr id="33" name="Rounded Rectangle 32"/>
+          <p:cNvSpPr/>
+          <p:nvPr/>
+        </p:nvSpPr>
+        <p:spPr>
+          <a:xfrm>
+            <a:off x="7733666" y="2927006"/>
+            <a:ext cx="1159987" cy="589006"/>
+          </a:xfrm>
+          <a:prstGeom prst="roundRect">
+            <a:avLst/>
+          </a:prstGeom>
+          <a:ln w="19050"/>
+        </p:spPr>
+        <p:style>
+          <a:lnRef idx="2">
+            <a:schemeClr val="dk1"/>
+          </a:lnRef>
+          <a:fillRef idx="1">
+            <a:schemeClr val="lt1"/>
+          </a:fillRef>
+          <a:effectRef idx="0">
+            <a:schemeClr val="dk1"/>
+          </a:effectRef>
+          <a:fontRef idx="minor">
+            <a:schemeClr val="dk1"/>
+          </a:fontRef>
+        </p:style>
+        <p:txBody>
+          <a:bodyPr rtlCol="0" anchor="ctr"/>
+          <a:lstStyle/>
+          <a:p>
+            <a:pPr algn="ctr"/>
+            <a:r>
+              <a:rPr lang="en-US" sz="1400" dirty="0" smtClean="0"/>
+              <a:t>Repaired program</a:t>
+            </a:r>
+            <a:endParaRPr lang="en-US" sz="1400" dirty="0"/>
+          </a:p>
+        </p:txBody>
+      </p:sp>
+      <p:sp>
+        <p:nvSpPr>
+          <p:cNvPr id="19" name="Oval 18"/>
+          <p:cNvSpPr/>
+          <p:nvPr/>
+        </p:nvSpPr>
+        <p:spPr>
+          <a:xfrm>
+            <a:off x="9141750" y="2861182"/>
+            <a:ext cx="708338" cy="708338"/>
+          </a:xfrm>
+          <a:prstGeom prst="ellipse">
+            <a:avLst/>
+          </a:prstGeom>
+        </p:spPr>
+        <p:style>
+          <a:lnRef idx="2">
+            <a:schemeClr val="dk1"/>
+          </a:lnRef>
+          <a:fillRef idx="1">
+            <a:schemeClr val="lt1"/>
+          </a:fillRef>
+          <a:effectRef idx="0">
+            <a:schemeClr val="dk1"/>
+          </a:effectRef>
+          <a:fontRef idx="minor">
+            <a:schemeClr val="dk1"/>
+          </a:fontRef>
+        </p:style>
+        <p:txBody>
+          <a:bodyPr rtlCol="0" anchor="ctr"/>
+          <a:lstStyle/>
+          <a:p>
+            <a:pPr algn="ctr"/>
+            <a:r>
+              <a:rPr lang="en-US" sz="1400" dirty="0" smtClean="0"/>
+              <a:t>Run</a:t>
+            </a:r>
+            <a:endParaRPr lang="en-US" sz="1400" dirty="0"/>
+          </a:p>
+        </p:txBody>
+      </p:sp>
+      <p:cxnSp>
+        <p:nvCxnSpPr>
+          <p:cNvPr id="35" name="Straight Arrow Connector 34"/>
+          <p:cNvCxnSpPr>
+            <a:stCxn id="38" idx="3"/>
+            <a:endCxn id="33" idx="1"/>
+          </p:cNvCxnSpPr>
+          <p:nvPr/>
+        </p:nvCxnSpPr>
+        <p:spPr>
+          <a:xfrm>
+            <a:off x="7485569" y="3221509"/>
+            <a:ext cx="248097" cy="0"/>
+          </a:xfrm>
+          <a:prstGeom prst="straightConnector1">
+            <a:avLst/>
+          </a:prstGeom>
+          <a:ln w="12700">
             <a:tailEnd type="triangle"/>
           </a:ln>
         </p:spPr>
@@ -8090,388 +9320,22 @@
       </p:cxnSp>
       <p:cxnSp>
         <p:nvCxnSpPr>
-          <p:cNvPr id="73" name="Straight Arrow Connector 72"/>
+          <p:cNvPr id="41" name="Straight Arrow Connector 40"/>
           <p:cNvCxnSpPr>
-            <a:stCxn id="65" idx="2"/>
-            <a:endCxn id="66" idx="0"/>
+            <a:stCxn id="33" idx="3"/>
+            <a:endCxn id="19" idx="2"/>
           </p:cNvCxnSpPr>
           <p:nvPr/>
         </p:nvCxnSpPr>
         <p:spPr>
-          <a:xfrm>
-            <a:off x="5461169" y="2949528"/>
-            <a:ext cx="0" cy="354579"/>
+          <a:xfrm flipV="1">
+            <a:off x="8893653" y="3215351"/>
+            <a:ext cx="248097" cy="6158"/>
           </a:xfrm>
           <a:prstGeom prst="straightConnector1">
             <a:avLst/>
           </a:prstGeom>
-          <a:ln w="19050">
-            <a:tailEnd type="triangle"/>
-          </a:ln>
-        </p:spPr>
-        <p:style>
-          <a:lnRef idx="1">
-            <a:schemeClr val="dk1"/>
-          </a:lnRef>
-          <a:fillRef idx="0">
-            <a:schemeClr val="dk1"/>
-          </a:fillRef>
-          <a:effectRef idx="0">
-            <a:schemeClr val="dk1"/>
-          </a:effectRef>
-          <a:fontRef idx="minor">
-            <a:schemeClr val="tx1"/>
-          </a:fontRef>
-        </p:style>
-      </p:cxnSp>
-      <p:sp>
-        <p:nvSpPr>
-          <p:cNvPr id="76" name="TextBox 75"/>
-          <p:cNvSpPr txBox="1"/>
-          <p:nvPr/>
-        </p:nvSpPr>
-        <p:spPr>
-          <a:xfrm>
-            <a:off x="5461168" y="2949528"/>
-            <a:ext cx="457882" cy="338554"/>
-          </a:xfrm>
-          <a:prstGeom prst="rect">
-            <a:avLst/>
-          </a:prstGeom>
-          <a:noFill/>
-          <a:ln w="19050">
-            <a:noFill/>
-          </a:ln>
-        </p:spPr>
-        <p:txBody>
-          <a:bodyPr wrap="none" rtlCol="0">
-            <a:spAutoFit/>
-          </a:bodyPr>
-          <a:lstStyle/>
-          <a:p>
-            <a:r>
-              <a:rPr lang="en-US" sz="1600" dirty="0" smtClean="0"/>
-              <a:t>yes</a:t>
-            </a:r>
-            <a:endParaRPr lang="en-US" sz="1600" dirty="0"/>
-          </a:p>
-        </p:txBody>
-      </p:sp>
-      <p:cxnSp>
-        <p:nvCxnSpPr>
-          <p:cNvPr id="78" name="Elbow Connector 77"/>
-          <p:cNvCxnSpPr>
-            <a:stCxn id="5" idx="1"/>
-            <a:endCxn id="66" idx="1"/>
-          </p:cNvCxnSpPr>
-          <p:nvPr/>
-        </p:nvCxnSpPr>
-        <p:spPr>
-          <a:xfrm rot="10800000" flipV="1">
-            <a:off x="3740490" y="1295926"/>
-            <a:ext cx="1" cy="2258963"/>
-          </a:xfrm>
-          <a:prstGeom prst="bentConnector3">
-            <a:avLst>
-              <a:gd name="adj1" fmla="val 22860100000"/>
-            </a:avLst>
-          </a:prstGeom>
-          <a:ln w="19050">
-            <a:tailEnd type="triangle"/>
-          </a:ln>
-        </p:spPr>
-        <p:style>
-          <a:lnRef idx="1">
-            <a:schemeClr val="dk1"/>
-          </a:lnRef>
-          <a:fillRef idx="0">
-            <a:schemeClr val="dk1"/>
-          </a:fillRef>
-          <a:effectRef idx="0">
-            <a:schemeClr val="dk1"/>
-          </a:effectRef>
-          <a:fontRef idx="minor">
-            <a:schemeClr val="tx1"/>
-          </a:fontRef>
-        </p:style>
-      </p:cxnSp>
-      <p:sp>
-        <p:nvSpPr>
-          <p:cNvPr id="81" name="TextBox 80"/>
-          <p:cNvSpPr txBox="1"/>
-          <p:nvPr/>
-        </p:nvSpPr>
-        <p:spPr>
-          <a:xfrm rot="16200000">
-            <a:off x="2904353" y="1593237"/>
-            <a:ext cx="1147564" cy="584775"/>
-          </a:xfrm>
-          <a:prstGeom prst="rect">
-            <a:avLst/>
-          </a:prstGeom>
-          <a:noFill/>
-          <a:ln w="19050">
-            <a:noFill/>
-          </a:ln>
-        </p:spPr>
-        <p:txBody>
-          <a:bodyPr wrap="square" rtlCol="0">
-            <a:spAutoFit/>
-          </a:bodyPr>
-          <a:lstStyle/>
-          <a:p>
-            <a:r>
-              <a:rPr lang="en-US" sz="1600" dirty="0" smtClean="0"/>
-              <a:t>    Set of constraints</a:t>
-            </a:r>
-            <a:endParaRPr lang="en-US" sz="1600" dirty="0"/>
-          </a:p>
-        </p:txBody>
-      </p:sp>
-      <p:sp>
-        <p:nvSpPr>
-          <p:cNvPr id="86" name="Rectangle 85"/>
-          <p:cNvSpPr/>
-          <p:nvPr/>
-        </p:nvSpPr>
-        <p:spPr>
-          <a:xfrm>
-            <a:off x="3740489" y="4160252"/>
-            <a:ext cx="3441359" cy="501566"/>
-          </a:xfrm>
-          <a:prstGeom prst="rect">
-            <a:avLst/>
-          </a:prstGeom>
-        </p:spPr>
-        <p:style>
-          <a:lnRef idx="2">
-            <a:schemeClr val="dk1"/>
-          </a:lnRef>
-          <a:fillRef idx="1">
-            <a:schemeClr val="lt1"/>
-          </a:fillRef>
-          <a:effectRef idx="0">
-            <a:schemeClr val="dk1"/>
-          </a:effectRef>
-          <a:fontRef idx="minor">
-            <a:schemeClr val="dk1"/>
-          </a:fontRef>
-        </p:style>
-        <p:txBody>
-          <a:bodyPr rtlCol="0" anchor="ctr"/>
-          <a:lstStyle/>
-          <a:p>
-            <a:pPr algn="ctr"/>
-            <a:r>
-              <a:rPr lang="en-US" dirty="0" smtClean="0"/>
-              <a:t>Instrument the object by modifying its properties</a:t>
-            </a:r>
-            <a:endParaRPr lang="en-US" dirty="0"/>
-          </a:p>
-        </p:txBody>
-      </p:sp>
-      <p:cxnSp>
-        <p:nvCxnSpPr>
-          <p:cNvPr id="88" name="Elbow Connector 87"/>
-          <p:cNvCxnSpPr>
-            <a:stCxn id="65" idx="3"/>
-            <a:endCxn id="86" idx="3"/>
-          </p:cNvCxnSpPr>
-          <p:nvPr/>
-        </p:nvCxnSpPr>
-        <p:spPr>
-          <a:xfrm>
-            <a:off x="7181848" y="2698745"/>
-            <a:ext cx="12700" cy="1712290"/>
-          </a:xfrm>
-          <a:prstGeom prst="bentConnector3">
-            <a:avLst>
-              <a:gd name="adj1" fmla="val 1800000"/>
-            </a:avLst>
-          </a:prstGeom>
-          <a:ln w="19050">
-            <a:tailEnd type="triangle"/>
-          </a:ln>
-        </p:spPr>
-        <p:style>
-          <a:lnRef idx="1">
-            <a:schemeClr val="dk1"/>
-          </a:lnRef>
-          <a:fillRef idx="0">
-            <a:schemeClr val="dk1"/>
-          </a:fillRef>
-          <a:effectRef idx="0">
-            <a:schemeClr val="dk1"/>
-          </a:effectRef>
-          <a:fontRef idx="minor">
-            <a:schemeClr val="tx1"/>
-          </a:fontRef>
-        </p:style>
-      </p:cxnSp>
-      <p:sp>
-        <p:nvSpPr>
-          <p:cNvPr id="89" name="TextBox 88"/>
-          <p:cNvSpPr txBox="1"/>
-          <p:nvPr/>
-        </p:nvSpPr>
-        <p:spPr>
-          <a:xfrm rot="5400000">
-            <a:off x="7336313" y="2918888"/>
-            <a:ext cx="457882" cy="338554"/>
-          </a:xfrm>
-          <a:prstGeom prst="rect">
-            <a:avLst/>
-          </a:prstGeom>
-          <a:noFill/>
-          <a:ln w="19050">
-            <a:noFill/>
-          </a:ln>
-        </p:spPr>
-        <p:txBody>
-          <a:bodyPr wrap="none" rtlCol="0">
-            <a:spAutoFit/>
-          </a:bodyPr>
-          <a:lstStyle/>
-          <a:p>
-            <a:r>
-              <a:rPr lang="en-US" sz="1600" dirty="0" smtClean="0"/>
-              <a:t>yes</a:t>
-            </a:r>
-            <a:endParaRPr lang="en-US" sz="1600" dirty="0"/>
-          </a:p>
-        </p:txBody>
-      </p:sp>
-      <p:sp>
-        <p:nvSpPr>
-          <p:cNvPr id="92" name="Rectangle 91"/>
-          <p:cNvSpPr/>
-          <p:nvPr/>
-        </p:nvSpPr>
-        <p:spPr>
-          <a:xfrm>
-            <a:off x="3740489" y="5016397"/>
-            <a:ext cx="3441359" cy="762056"/>
-          </a:xfrm>
-          <a:prstGeom prst="rect">
-            <a:avLst/>
-          </a:prstGeom>
-        </p:spPr>
-        <p:style>
-          <a:lnRef idx="2">
-            <a:schemeClr val="dk1"/>
-          </a:lnRef>
-          <a:fillRef idx="1">
-            <a:schemeClr val="lt1"/>
-          </a:fillRef>
-          <a:effectRef idx="0">
-            <a:schemeClr val="dk1"/>
-          </a:effectRef>
-          <a:fontRef idx="minor">
-            <a:schemeClr val="dk1"/>
-          </a:fontRef>
-        </p:style>
-        <p:txBody>
-          <a:bodyPr rtlCol="0" anchor="ctr"/>
-          <a:lstStyle/>
-          <a:p>
-            <a:pPr algn="ctr"/>
-            <a:r>
-              <a:rPr lang="en-US" dirty="0" smtClean="0"/>
-              <a:t>Wrap the statement with try-catch block and the patching code in catch block</a:t>
-            </a:r>
-            <a:endParaRPr lang="en-US" dirty="0"/>
-          </a:p>
-        </p:txBody>
-      </p:sp>
-      <p:cxnSp>
-        <p:nvCxnSpPr>
-          <p:cNvPr id="94" name="Elbow Connector 93"/>
-          <p:cNvCxnSpPr>
-            <a:stCxn id="65" idx="1"/>
-            <a:endCxn id="92" idx="1"/>
-          </p:cNvCxnSpPr>
-          <p:nvPr/>
-        </p:nvCxnSpPr>
-        <p:spPr>
-          <a:xfrm rot="10800000" flipV="1">
-            <a:off x="3740489" y="2698745"/>
-            <a:ext cx="12700" cy="2698680"/>
-          </a:xfrm>
-          <a:prstGeom prst="bentConnector3">
-            <a:avLst>
-              <a:gd name="adj1" fmla="val 2550000"/>
-            </a:avLst>
-          </a:prstGeom>
-          <a:ln w="19050">
-            <a:tailEnd type="triangle"/>
-          </a:ln>
-        </p:spPr>
-        <p:style>
-          <a:lnRef idx="1">
-            <a:schemeClr val="dk1"/>
-          </a:lnRef>
-          <a:fillRef idx="0">
-            <a:schemeClr val="dk1"/>
-          </a:fillRef>
-          <a:effectRef idx="0">
-            <a:schemeClr val="dk1"/>
-          </a:effectRef>
-          <a:fontRef idx="minor">
-            <a:schemeClr val="tx1"/>
-          </a:fontRef>
-        </p:style>
-      </p:cxnSp>
-      <p:sp>
-        <p:nvSpPr>
-          <p:cNvPr id="96" name="TextBox 95"/>
-          <p:cNvSpPr txBox="1"/>
-          <p:nvPr/>
-        </p:nvSpPr>
-        <p:spPr>
-          <a:xfrm rot="16200000">
-            <a:off x="2185163" y="3901774"/>
-            <a:ext cx="2243048" cy="338554"/>
-          </a:xfrm>
-          <a:prstGeom prst="rect">
-            <a:avLst/>
-          </a:prstGeom>
-          <a:noFill/>
-          <a:ln w="19050">
-            <a:noFill/>
-          </a:ln>
-        </p:spPr>
-        <p:txBody>
-          <a:bodyPr wrap="square" rtlCol="0">
-            <a:spAutoFit/>
-          </a:bodyPr>
-          <a:lstStyle/>
-          <a:p>
-            <a:r>
-              <a:rPr lang="en-US" sz="1600" dirty="0" smtClean="0"/>
-              <a:t>Runtime Exception type</a:t>
-            </a:r>
-            <a:endParaRPr lang="en-US" sz="1600" dirty="0"/>
-          </a:p>
-        </p:txBody>
-      </p:sp>
-      <p:cxnSp>
-        <p:nvCxnSpPr>
-          <p:cNvPr id="97" name="Straight Arrow Connector 96"/>
-          <p:cNvCxnSpPr>
-            <a:stCxn id="86" idx="2"/>
-            <a:endCxn id="92" idx="0"/>
-          </p:cNvCxnSpPr>
-          <p:nvPr/>
-        </p:nvCxnSpPr>
-        <p:spPr>
-          <a:xfrm>
-            <a:off x="5461169" y="4661818"/>
-            <a:ext cx="0" cy="354579"/>
-          </a:xfrm>
-          <a:prstGeom prst="straightConnector1">
-            <a:avLst/>
-          </a:prstGeom>
-          <a:ln w="19050">
+          <a:ln w="12700">
             <a:tailEnd type="triangle"/>
           </a:ln>
         </p:spPr>
@@ -8492,105 +9356,22 @@
       </p:cxnSp>
       <p:cxnSp>
         <p:nvCxnSpPr>
-          <p:cNvPr id="101" name="Elbow Connector 100"/>
+          <p:cNvPr id="31" name="Elbow Connector 30"/>
           <p:cNvCxnSpPr>
-            <a:stCxn id="66" idx="3"/>
-            <a:endCxn id="92" idx="3"/>
+            <a:stCxn id="19" idx="4"/>
+            <a:endCxn id="61" idx="3"/>
           </p:cNvCxnSpPr>
           <p:nvPr/>
         </p:nvCxnSpPr>
         <p:spPr>
-          <a:xfrm>
-            <a:off x="7181848" y="3554890"/>
-            <a:ext cx="12700" cy="1842535"/>
-          </a:xfrm>
-          <a:prstGeom prst="bentConnector3">
-            <a:avLst>
-              <a:gd name="adj1" fmla="val 2475000"/>
-            </a:avLst>
-          </a:prstGeom>
-          <a:ln w="19050">
-            <a:solidFill>
-              <a:schemeClr val="tx1"/>
-            </a:solidFill>
-            <a:tailEnd type="triangle"/>
-          </a:ln>
-        </p:spPr>
-        <p:style>
-          <a:lnRef idx="1">
-            <a:schemeClr val="dk1"/>
-          </a:lnRef>
-          <a:fillRef idx="0">
-            <a:schemeClr val="dk1"/>
-          </a:fillRef>
-          <a:effectRef idx="0">
-            <a:schemeClr val="dk1"/>
-          </a:effectRef>
-          <a:fontRef idx="minor">
-            <a:schemeClr val="tx1"/>
-          </a:fontRef>
-        </p:style>
-      </p:cxnSp>
-      <p:sp>
-        <p:nvSpPr>
-          <p:cNvPr id="27" name="Rectangle 26"/>
-          <p:cNvSpPr/>
-          <p:nvPr/>
-        </p:nvSpPr>
-        <p:spPr>
-          <a:xfrm>
-            <a:off x="3740489" y="6133031"/>
-            <a:ext cx="3441359" cy="631811"/>
-          </a:xfrm>
-          <a:prstGeom prst="rect">
-            <a:avLst/>
-          </a:prstGeom>
-        </p:spPr>
-        <p:style>
-          <a:lnRef idx="2">
-            <a:schemeClr val="dk1"/>
-          </a:lnRef>
-          <a:fillRef idx="1">
-            <a:schemeClr val="lt1"/>
-          </a:fillRef>
-          <a:effectRef idx="0">
-            <a:schemeClr val="dk1"/>
-          </a:effectRef>
-          <a:fontRef idx="minor">
-            <a:schemeClr val="dk1"/>
-          </a:fontRef>
-        </p:style>
-        <p:txBody>
-          <a:bodyPr rtlCol="0" anchor="ctr"/>
-          <a:lstStyle/>
-          <a:p>
-            <a:pPr algn="ctr"/>
-            <a:r>
-              <a:rPr lang="en-US" dirty="0" smtClean="0"/>
-              <a:t>Instrument the statement to collect dynamic constraints</a:t>
-            </a:r>
-            <a:endParaRPr lang="en-US" dirty="0"/>
-          </a:p>
-        </p:txBody>
-      </p:sp>
-      <p:cxnSp>
-        <p:nvCxnSpPr>
-          <p:cNvPr id="28" name="Straight Arrow Connector 27"/>
-          <p:cNvCxnSpPr>
-            <a:stCxn id="92" idx="2"/>
-            <a:endCxn id="27" idx="0"/>
-          </p:cNvCxnSpPr>
-          <p:nvPr/>
-        </p:nvCxnSpPr>
-        <p:spPr>
-          <a:xfrm>
-            <a:off x="5461169" y="5778453"/>
-            <a:ext cx="0" cy="354578"/>
-          </a:xfrm>
-          <a:prstGeom prst="straightConnector1">
-            <a:avLst/>
-          </a:prstGeom>
-          <a:ln w="19050">
+          <a:xfrm rot="5400000">
+            <a:off x="9032656" y="3678615"/>
+            <a:ext cx="572358" cy="354169"/>
+          </a:xfrm>
+          <a:prstGeom prst="bentConnector2">
+            <a:avLst/>
+          </a:prstGeom>
+          <a:ln>
             <a:tailEnd type="triangle"/>
           </a:ln>
         </p:spPr>
@@ -8611,24 +9392,53 @@
       </p:cxnSp>
       <p:cxnSp>
         <p:nvCxnSpPr>
-          <p:cNvPr id="13" name="Elbow Connector 12"/>
+          <p:cNvPr id="43" name="Straight Connector 42"/>
           <p:cNvCxnSpPr>
-            <a:stCxn id="27" idx="3"/>
-            <a:endCxn id="92" idx="3"/>
+            <a:endCxn id="61" idx="1"/>
           </p:cNvCxnSpPr>
           <p:nvPr/>
         </p:nvCxnSpPr>
         <p:spPr>
-          <a:xfrm flipV="1">
-            <a:off x="7181848" y="5397425"/>
-            <a:ext cx="12700" cy="1051512"/>
-          </a:xfrm>
-          <a:prstGeom prst="bentConnector3">
-            <a:avLst>
-              <a:gd name="adj1" fmla="val 4436614"/>
-            </a:avLst>
-          </a:prstGeom>
-          <a:ln w="19050">
+          <a:xfrm>
+            <a:off x="6269583" y="4141878"/>
+            <a:ext cx="916422" cy="0"/>
+          </a:xfrm>
+          <a:prstGeom prst="line">
+            <a:avLst/>
+          </a:prstGeom>
+        </p:spPr>
+        <p:style>
+          <a:lnRef idx="1">
+            <a:schemeClr val="dk1"/>
+          </a:lnRef>
+          <a:fillRef idx="0">
+            <a:schemeClr val="dk1"/>
+          </a:fillRef>
+          <a:effectRef idx="0">
+            <a:schemeClr val="dk1"/>
+          </a:effectRef>
+          <a:fontRef idx="minor">
+            <a:schemeClr val="tx1"/>
+          </a:fontRef>
+        </p:style>
+      </p:cxnSp>
+      <p:cxnSp>
+        <p:nvCxnSpPr>
+          <p:cNvPr id="56" name="Elbow Connector 55"/>
+          <p:cNvCxnSpPr>
+            <a:endCxn id="38" idx="1"/>
+          </p:cNvCxnSpPr>
+          <p:nvPr/>
+        </p:nvCxnSpPr>
+        <p:spPr>
+          <a:xfrm rot="5400000" flipH="1" flipV="1">
+            <a:off x="5899806" y="3591287"/>
+            <a:ext cx="920379" cy="180825"/>
+          </a:xfrm>
+          <a:prstGeom prst="bentConnector2">
+            <a:avLst/>
+          </a:prstGeom>
+          <a:ln w="9525">
             <a:tailEnd type="triangle"/>
           </a:ln>
         </p:spPr>
@@ -8647,65 +9457,10 @@
           </a:fontRef>
         </p:style>
       </p:cxnSp>
-      <p:sp>
-        <p:nvSpPr>
-          <p:cNvPr id="36" name="TextBox 35"/>
-          <p:cNvSpPr txBox="1"/>
-          <p:nvPr/>
-        </p:nvSpPr>
-        <p:spPr>
-          <a:xfrm rot="5400000">
-            <a:off x="7145323" y="5375482"/>
-            <a:ext cx="1250081" cy="1077218"/>
-          </a:xfrm>
-          <a:prstGeom prst="rect">
-            <a:avLst/>
-          </a:prstGeom>
-          <a:noFill/>
-          <a:ln w="19050">
-            <a:noFill/>
-          </a:ln>
-        </p:spPr>
-        <p:txBody>
-          <a:bodyPr wrap="square" rtlCol="0">
-            <a:spAutoFit/>
-          </a:bodyPr>
-          <a:lstStyle/>
-          <a:p>
-            <a:pPr algn="ctr"/>
-            <a:r>
-              <a:rPr lang="en-US" sz="1600" dirty="0" smtClean="0"/>
-              <a:t>Fallback </a:t>
-            </a:r>
-          </a:p>
-          <a:p>
-            <a:pPr algn="ctr"/>
-            <a:r>
-              <a:rPr lang="en-US" sz="1600" dirty="0" smtClean="0"/>
-              <a:t>insufficient </a:t>
-            </a:r>
-          </a:p>
-          <a:p>
-            <a:pPr algn="ctr"/>
-            <a:r>
-              <a:rPr lang="en-US" sz="1600" dirty="0" smtClean="0"/>
-              <a:t>Constraint</a:t>
-            </a:r>
-          </a:p>
-          <a:p>
-            <a:pPr algn="ctr"/>
-            <a:r>
-              <a:rPr lang="en-US" sz="1600" dirty="0" smtClean="0"/>
-              <a:t> information</a:t>
-            </a:r>
-            <a:endParaRPr lang="en-US" sz="1600" dirty="0"/>
-          </a:p>
-        </p:txBody>
-      </p:sp>
     </p:spTree>
     <p:extLst>
       <p:ext uri="{BB962C8B-B14F-4D97-AF65-F5344CB8AC3E}">
-        <p14:creationId xmlns:p14="http://schemas.microsoft.com/office/powerpoint/2010/main" val="2423475886"/>
+        <p14:creationId xmlns:p14="http://schemas.microsoft.com/office/powerpoint/2010/main" val="201351828"/>
       </p:ext>
     </p:extLst>
   </p:cSld>

</xml_diff>

<commit_message>
Minor fix in automata string diagram
</commit_message>
<xml_diff>
--- a/images/ArrayIndex.pptx
+++ b/images/ArrayIndex.pptx
@@ -8320,8 +8320,8 @@
             </p:nvSpPr>
             <p:spPr>
               <a:xfrm>
-                <a:off x="2641333" y="1527806"/>
-                <a:ext cx="2265518" cy="1200329"/>
+                <a:off x="1993984" y="1547499"/>
+                <a:ext cx="4686746" cy="1200329"/>
               </a:xfrm>
               <a:prstGeom prst="rect">
                 <a:avLst/>
@@ -8441,6 +8441,30 @@
                         <a:rPr lang="en-US" sz="2400" b="0" i="1" smtClean="0">
                           <a:latin typeface="Cambria Math" panose="02040503050406030204" pitchFamily="18" charset="0"/>
                         </a:rPr>
+                        <m:t>𝑠𝑡𝑟𝑖𝑛𝑔</m:t>
+                      </m:r>
+                      <m:r>
+                        <a:rPr lang="en-US" sz="2400" b="0" i="1" smtClean="0">
+                          <a:latin typeface="Cambria Math" panose="02040503050406030204" pitchFamily="18" charset="0"/>
+                        </a:rPr>
+                        <m:t> </m:t>
+                      </m:r>
+                      <m:r>
+                        <a:rPr lang="en-US" sz="2400" b="0" i="1" smtClean="0">
+                          <a:latin typeface="Cambria Math" panose="02040503050406030204" pitchFamily="18" charset="0"/>
+                        </a:rPr>
+                        <m:t>𝑙𝑒𝑛𝑔𝑡h</m:t>
+                      </m:r>
+                      <m:r>
+                        <a:rPr lang="en-US" sz="2400" b="0" i="1" smtClean="0">
+                          <a:latin typeface="Cambria Math" panose="02040503050406030204" pitchFamily="18" charset="0"/>
+                        </a:rPr>
+                        <m:t>&gt;</m:t>
+                      </m:r>
+                      <m:r>
+                        <a:rPr lang="en-US" sz="2400" b="0" i="1" smtClean="0">
+                          <a:latin typeface="Cambria Math" panose="02040503050406030204" pitchFamily="18" charset="0"/>
+                        </a:rPr>
                         <m:t>𝑖</m:t>
                       </m:r>
                       <m:r>
@@ -8504,8 +8528,8 @@
             </p:nvSpPr>
             <p:spPr>
               <a:xfrm>
-                <a:off x="2641333" y="1527806"/>
-                <a:ext cx="2265518" cy="1200329"/>
+                <a:off x="1993984" y="1547499"/>
+                <a:ext cx="4686746" cy="1200329"/>
               </a:xfrm>
               <a:prstGeom prst="rect">
                 <a:avLst/>
@@ -8513,7 +8537,7 @@
               <a:blipFill rotWithShape="0">
                 <a:blip r:embed="rId2"/>
                 <a:stretch>
-                  <a:fillRect l="-2151" r="-83065" b="-6091"/>
+                  <a:fillRect b="-6091"/>
                 </a:stretch>
               </a:blipFill>
             </p:spPr>
@@ -8743,7 +8767,7 @@
           <a:graphicData uri="http://schemas.openxmlformats.org/presentationml/2006/ole">
             <mc:AlternateContent xmlns:mc="http://schemas.openxmlformats.org/markup-compatibility/2006">
               <mc:Choice xmlns:v="urn:schemas-microsoft-com:vml" Requires="v">
-                <p:oleObj spid="_x0000_s1080" name="Visio" r:id="rId3" imgW="3752882" imgH="4562496" progId="Visio.Drawing.15">
+                <p:oleObj spid="_x0000_s1083" name="Visio" r:id="rId3" imgW="3752882" imgH="4562496" progId="Visio.Drawing.15">
                   <p:embed/>
                 </p:oleObj>
               </mc:Choice>

</xml_diff>

<commit_message>
added example + image
</commit_message>
<xml_diff>
--- a/images/ArrayIndex.pptx
+++ b/images/ArrayIndex.pptx
@@ -15,6 +15,7 @@
     <p:sldId id="261" r:id="rId9"/>
     <p:sldId id="262" r:id="rId10"/>
     <p:sldId id="263" r:id="rId11"/>
+    <p:sldId id="266" r:id="rId12"/>
   </p:sldIdLst>
   <p:sldSz cx="12192000" cy="6858000"/>
   <p:notesSz cx="6858000" cy="9144000"/>
@@ -252,7 +253,7 @@
           <a:p>
             <a:fld id="{6E95F330-DC13-4D7E-9BB4-97CFBD9A349B}" type="datetimeFigureOut">
               <a:rPr lang="en-US" smtClean="0"/>
-              <a:t>13-Nov-14</a:t>
+              <a:t>6/22/2015</a:t>
             </a:fld>
             <a:endParaRPr lang="en-US"/>
           </a:p>
@@ -422,7 +423,7 @@
           <a:p>
             <a:fld id="{6E95F330-DC13-4D7E-9BB4-97CFBD9A349B}" type="datetimeFigureOut">
               <a:rPr lang="en-US" smtClean="0"/>
-              <a:t>13-Nov-14</a:t>
+              <a:t>6/22/2015</a:t>
             </a:fld>
             <a:endParaRPr lang="en-US"/>
           </a:p>
@@ -602,7 +603,7 @@
           <a:p>
             <a:fld id="{6E95F330-DC13-4D7E-9BB4-97CFBD9A349B}" type="datetimeFigureOut">
               <a:rPr lang="en-US" smtClean="0"/>
-              <a:t>13-Nov-14</a:t>
+              <a:t>6/22/2015</a:t>
             </a:fld>
             <a:endParaRPr lang="en-US"/>
           </a:p>
@@ -772,7 +773,7 @@
           <a:p>
             <a:fld id="{6E95F330-DC13-4D7E-9BB4-97CFBD9A349B}" type="datetimeFigureOut">
               <a:rPr lang="en-US" smtClean="0"/>
-              <a:t>13-Nov-14</a:t>
+              <a:t>6/22/2015</a:t>
             </a:fld>
             <a:endParaRPr lang="en-US"/>
           </a:p>
@@ -1018,7 +1019,7 @@
           <a:p>
             <a:fld id="{6E95F330-DC13-4D7E-9BB4-97CFBD9A349B}" type="datetimeFigureOut">
               <a:rPr lang="en-US" smtClean="0"/>
-              <a:t>13-Nov-14</a:t>
+              <a:t>6/22/2015</a:t>
             </a:fld>
             <a:endParaRPr lang="en-US"/>
           </a:p>
@@ -1250,7 +1251,7 @@
           <a:p>
             <a:fld id="{6E95F330-DC13-4D7E-9BB4-97CFBD9A349B}" type="datetimeFigureOut">
               <a:rPr lang="en-US" smtClean="0"/>
-              <a:t>13-Nov-14</a:t>
+              <a:t>6/22/2015</a:t>
             </a:fld>
             <a:endParaRPr lang="en-US"/>
           </a:p>
@@ -1617,7 +1618,7 @@
           <a:p>
             <a:fld id="{6E95F330-DC13-4D7E-9BB4-97CFBD9A349B}" type="datetimeFigureOut">
               <a:rPr lang="en-US" smtClean="0"/>
-              <a:t>13-Nov-14</a:t>
+              <a:t>6/22/2015</a:t>
             </a:fld>
             <a:endParaRPr lang="en-US"/>
           </a:p>
@@ -1735,7 +1736,7 @@
           <a:p>
             <a:fld id="{6E95F330-DC13-4D7E-9BB4-97CFBD9A349B}" type="datetimeFigureOut">
               <a:rPr lang="en-US" smtClean="0"/>
-              <a:t>13-Nov-14</a:t>
+              <a:t>6/22/2015</a:t>
             </a:fld>
             <a:endParaRPr lang="en-US"/>
           </a:p>
@@ -1830,7 +1831,7 @@
           <a:p>
             <a:fld id="{6E95F330-DC13-4D7E-9BB4-97CFBD9A349B}" type="datetimeFigureOut">
               <a:rPr lang="en-US" smtClean="0"/>
-              <a:t>13-Nov-14</a:t>
+              <a:t>6/22/2015</a:t>
             </a:fld>
             <a:endParaRPr lang="en-US"/>
           </a:p>
@@ -2107,7 +2108,7 @@
           <a:p>
             <a:fld id="{6E95F330-DC13-4D7E-9BB4-97CFBD9A349B}" type="datetimeFigureOut">
               <a:rPr lang="en-US" smtClean="0"/>
-              <a:t>13-Nov-14</a:t>
+              <a:t>6/22/2015</a:t>
             </a:fld>
             <a:endParaRPr lang="en-US"/>
           </a:p>
@@ -2360,7 +2361,7 @@
           <a:p>
             <a:fld id="{6E95F330-DC13-4D7E-9BB4-97CFBD9A349B}" type="datetimeFigureOut">
               <a:rPr lang="en-US" smtClean="0"/>
-              <a:t>13-Nov-14</a:t>
+              <a:t>6/22/2015</a:t>
             </a:fld>
             <a:endParaRPr lang="en-US"/>
           </a:p>
@@ -2573,7 +2574,7 @@
           <a:p>
             <a:fld id="{6E95F330-DC13-4D7E-9BB4-97CFBD9A349B}" type="datetimeFigureOut">
               <a:rPr lang="en-US" smtClean="0"/>
-              <a:t>13-Nov-14</a:t>
+              <a:t>6/22/2015</a:t>
             </a:fld>
             <a:endParaRPr lang="en-US"/>
           </a:p>
@@ -4854,6 +4855,730 @@
 </p:sld>
 </file>
 
+<file path=ppt/slides/slide11.xml><?xml version="1.0" encoding="utf-8"?>
+<p:sld xmlns:a="http://schemas.openxmlformats.org/drawingml/2006/main" xmlns:r="http://schemas.openxmlformats.org/officeDocument/2006/relationships" xmlns:p="http://schemas.openxmlformats.org/presentationml/2006/main">
+  <p:cSld>
+    <p:spTree>
+      <p:nvGrpSpPr>
+        <p:cNvPr id="1" name=""/>
+        <p:cNvGrpSpPr/>
+        <p:nvPr/>
+      </p:nvGrpSpPr>
+      <p:grpSpPr>
+        <a:xfrm>
+          <a:off x="0" y="0"/>
+          <a:ext cx="0" cy="0"/>
+          <a:chOff x="0" y="0"/>
+          <a:chExt cx="0" cy="0"/>
+        </a:xfrm>
+      </p:grpSpPr>
+      <mc:AlternateContent xmlns:mc="http://schemas.openxmlformats.org/markup-compatibility/2006">
+        <mc:Choice xmlns:a14="http://schemas.microsoft.com/office/drawing/2010/main" Requires="a14">
+          <p:sp>
+            <p:nvSpPr>
+              <p:cNvPr id="4" name="Rectangle 3"/>
+              <p:cNvSpPr/>
+              <p:nvPr/>
+            </p:nvSpPr>
+            <p:spPr>
+              <a:xfrm>
+                <a:off x="3377514" y="2026508"/>
+                <a:ext cx="700217" cy="453081"/>
+              </a:xfrm>
+              <a:prstGeom prst="rect">
+                <a:avLst/>
+              </a:prstGeom>
+            </p:spPr>
+            <p:style>
+              <a:lnRef idx="2">
+                <a:schemeClr val="dk1"/>
+              </a:lnRef>
+              <a:fillRef idx="1">
+                <a:schemeClr val="lt1"/>
+              </a:fillRef>
+              <a:effectRef idx="0">
+                <a:schemeClr val="dk1"/>
+              </a:effectRef>
+              <a:fontRef idx="minor">
+                <a:schemeClr val="dk1"/>
+              </a:fontRef>
+            </p:style>
+            <p:txBody>
+              <a:bodyPr rtlCol="0" anchor="ctr"/>
+              <a:lstStyle/>
+              <a:p>
+                <a:pPr algn="ctr"/>
+                <a14:m>
+                  <m:oMathPara xmlns:m="http://schemas.openxmlformats.org/officeDocument/2006/math">
+                    <m:oMathParaPr>
+                      <m:jc m:val="centerGroup"/>
+                    </m:oMathParaPr>
+                    <m:oMath xmlns:m="http://schemas.openxmlformats.org/officeDocument/2006/math">
+                      <m:r>
+                        <a:rPr lang="en-US" i="1" dirty="0" smtClean="0">
+                          <a:latin typeface="Cambria Math" panose="02040503050406030204" pitchFamily="18" charset="0"/>
+                        </a:rPr>
+                        <m:t>10</m:t>
+                      </m:r>
+                    </m:oMath>
+                  </m:oMathPara>
+                </a14:m>
+                <a:endParaRPr lang="en-US" dirty="0"/>
+              </a:p>
+            </p:txBody>
+          </p:sp>
+        </mc:Choice>
+        <mc:Fallback>
+          <p:sp>
+            <p:nvSpPr>
+              <p:cNvPr id="4" name="Rectangle 3"/>
+              <p:cNvSpPr>
+                <a:spLocks noRot="1" noChangeAspect="1" noMove="1" noResize="1" noEditPoints="1" noAdjustHandles="1" noChangeArrowheads="1" noChangeShapeType="1" noTextEdit="1"/>
+              </p:cNvSpPr>
+              <p:nvPr/>
+            </p:nvSpPr>
+            <p:spPr>
+              <a:xfrm>
+                <a:off x="3377514" y="2026508"/>
+                <a:ext cx="700217" cy="453081"/>
+              </a:xfrm>
+              <a:prstGeom prst="rect">
+                <a:avLst/>
+              </a:prstGeom>
+              <a:blipFill rotWithShape="0">
+                <a:blip r:embed="rId2"/>
+                <a:stretch>
+                  <a:fillRect/>
+                </a:stretch>
+              </a:blipFill>
+            </p:spPr>
+            <p:txBody>
+              <a:bodyPr/>
+              <a:lstStyle/>
+              <a:p>
+                <a:r>
+                  <a:rPr lang="en-US">
+                    <a:noFill/>
+                  </a:rPr>
+                  <a:t> </a:t>
+                </a:r>
+              </a:p>
+            </p:txBody>
+          </p:sp>
+        </mc:Fallback>
+      </mc:AlternateContent>
+      <mc:AlternateContent xmlns:mc="http://schemas.openxmlformats.org/markup-compatibility/2006">
+        <mc:Choice xmlns:a14="http://schemas.microsoft.com/office/drawing/2010/main" Requires="a14">
+          <p:sp>
+            <p:nvSpPr>
+              <p:cNvPr id="5" name="Rectangle 4"/>
+              <p:cNvSpPr/>
+              <p:nvPr/>
+            </p:nvSpPr>
+            <p:spPr>
+              <a:xfrm>
+                <a:off x="4077731" y="2026507"/>
+                <a:ext cx="700217" cy="453081"/>
+              </a:xfrm>
+              <a:prstGeom prst="rect">
+                <a:avLst/>
+              </a:prstGeom>
+            </p:spPr>
+            <p:style>
+              <a:lnRef idx="2">
+                <a:schemeClr val="dk1"/>
+              </a:lnRef>
+              <a:fillRef idx="1">
+                <a:schemeClr val="lt1"/>
+              </a:fillRef>
+              <a:effectRef idx="0">
+                <a:schemeClr val="dk1"/>
+              </a:effectRef>
+              <a:fontRef idx="minor">
+                <a:schemeClr val="dk1"/>
+              </a:fontRef>
+            </p:style>
+            <p:txBody>
+              <a:bodyPr rtlCol="0" anchor="ctr"/>
+              <a:lstStyle/>
+              <a:p>
+                <a:pPr algn="ctr"/>
+                <a14:m>
+                  <m:oMathPara xmlns:m="http://schemas.openxmlformats.org/officeDocument/2006/math">
+                    <m:oMathParaPr>
+                      <m:jc m:val="centerGroup"/>
+                    </m:oMathParaPr>
+                    <m:oMath xmlns:m="http://schemas.openxmlformats.org/officeDocument/2006/math">
+                      <m:r>
+                        <a:rPr lang="en-US" i="1" dirty="0" smtClean="0">
+                          <a:latin typeface="Cambria Math" panose="02040503050406030204" pitchFamily="18" charset="0"/>
+                        </a:rPr>
+                        <m:t>10</m:t>
+                      </m:r>
+                    </m:oMath>
+                  </m:oMathPara>
+                </a14:m>
+                <a:endParaRPr lang="en-US" dirty="0"/>
+              </a:p>
+            </p:txBody>
+          </p:sp>
+        </mc:Choice>
+        <mc:Fallback>
+          <p:sp>
+            <p:nvSpPr>
+              <p:cNvPr id="5" name="Rectangle 4"/>
+              <p:cNvSpPr>
+                <a:spLocks noRot="1" noChangeAspect="1" noMove="1" noResize="1" noEditPoints="1" noAdjustHandles="1" noChangeArrowheads="1" noChangeShapeType="1" noTextEdit="1"/>
+              </p:cNvSpPr>
+              <p:nvPr/>
+            </p:nvSpPr>
+            <p:spPr>
+              <a:xfrm>
+                <a:off x="4077731" y="2026507"/>
+                <a:ext cx="700217" cy="453081"/>
+              </a:xfrm>
+              <a:prstGeom prst="rect">
+                <a:avLst/>
+              </a:prstGeom>
+              <a:blipFill rotWithShape="0">
+                <a:blip r:embed="rId3"/>
+                <a:stretch>
+                  <a:fillRect/>
+                </a:stretch>
+              </a:blipFill>
+            </p:spPr>
+            <p:txBody>
+              <a:bodyPr/>
+              <a:lstStyle/>
+              <a:p>
+                <a:r>
+                  <a:rPr lang="en-US">
+                    <a:noFill/>
+                  </a:rPr>
+                  <a:t> </a:t>
+                </a:r>
+              </a:p>
+            </p:txBody>
+          </p:sp>
+        </mc:Fallback>
+      </mc:AlternateContent>
+      <mc:AlternateContent xmlns:mc="http://schemas.openxmlformats.org/markup-compatibility/2006">
+        <mc:Choice xmlns:a14="http://schemas.microsoft.com/office/drawing/2010/main" Requires="a14">
+          <p:sp>
+            <p:nvSpPr>
+              <p:cNvPr id="6" name="Rectangle 5"/>
+              <p:cNvSpPr/>
+              <p:nvPr/>
+            </p:nvSpPr>
+            <p:spPr>
+              <a:xfrm>
+                <a:off x="4777948" y="2026508"/>
+                <a:ext cx="700217" cy="453080"/>
+              </a:xfrm>
+              <a:prstGeom prst="rect">
+                <a:avLst/>
+              </a:prstGeom>
+            </p:spPr>
+            <p:style>
+              <a:lnRef idx="2">
+                <a:schemeClr val="dk1"/>
+              </a:lnRef>
+              <a:fillRef idx="1">
+                <a:schemeClr val="lt1"/>
+              </a:fillRef>
+              <a:effectRef idx="0">
+                <a:schemeClr val="dk1"/>
+              </a:effectRef>
+              <a:fontRef idx="minor">
+                <a:schemeClr val="dk1"/>
+              </a:fontRef>
+            </p:style>
+            <p:txBody>
+              <a:bodyPr rtlCol="0" anchor="ctr"/>
+              <a:lstStyle/>
+              <a:p>
+                <a:pPr algn="ctr"/>
+                <a14:m>
+                  <m:oMathPara xmlns:m="http://schemas.openxmlformats.org/officeDocument/2006/math">
+                    <m:oMathParaPr>
+                      <m:jc m:val="centerGroup"/>
+                    </m:oMathParaPr>
+                    <m:oMath xmlns:m="http://schemas.openxmlformats.org/officeDocument/2006/math">
+                      <m:r>
+                        <a:rPr lang="en-US" i="1" dirty="0" smtClean="0">
+                          <a:latin typeface="Cambria Math" panose="02040503050406030204" pitchFamily="18" charset="0"/>
+                        </a:rPr>
+                        <m:t>𝑎𝑏</m:t>
+                      </m:r>
+                    </m:oMath>
+                  </m:oMathPara>
+                </a14:m>
+                <a:endParaRPr lang="en-US" dirty="0"/>
+              </a:p>
+            </p:txBody>
+          </p:sp>
+        </mc:Choice>
+        <mc:Fallback>
+          <p:sp>
+            <p:nvSpPr>
+              <p:cNvPr id="6" name="Rectangle 5"/>
+              <p:cNvSpPr>
+                <a:spLocks noRot="1" noChangeAspect="1" noMove="1" noResize="1" noEditPoints="1" noAdjustHandles="1" noChangeArrowheads="1" noChangeShapeType="1" noTextEdit="1"/>
+              </p:cNvSpPr>
+              <p:nvPr/>
+            </p:nvSpPr>
+            <p:spPr>
+              <a:xfrm>
+                <a:off x="4777948" y="2026508"/>
+                <a:ext cx="700217" cy="453080"/>
+              </a:xfrm>
+              <a:prstGeom prst="rect">
+                <a:avLst/>
+              </a:prstGeom>
+              <a:blipFill rotWithShape="0">
+                <a:blip r:embed="rId4"/>
+                <a:stretch>
+                  <a:fillRect/>
+                </a:stretch>
+              </a:blipFill>
+            </p:spPr>
+            <p:txBody>
+              <a:bodyPr/>
+              <a:lstStyle/>
+              <a:p>
+                <a:r>
+                  <a:rPr lang="en-US">
+                    <a:noFill/>
+                  </a:rPr>
+                  <a:t> </a:t>
+                </a:r>
+              </a:p>
+            </p:txBody>
+          </p:sp>
+        </mc:Fallback>
+      </mc:AlternateContent>
+      <mc:AlternateContent xmlns:mc="http://schemas.openxmlformats.org/markup-compatibility/2006">
+        <mc:Choice xmlns:a14="http://schemas.microsoft.com/office/drawing/2010/main" Requires="a14">
+          <p:sp>
+            <p:nvSpPr>
+              <p:cNvPr id="7" name="Rectangle 6"/>
+              <p:cNvSpPr/>
+              <p:nvPr/>
+            </p:nvSpPr>
+            <p:spPr>
+              <a:xfrm>
+                <a:off x="5478165" y="2026507"/>
+                <a:ext cx="700217" cy="453081"/>
+              </a:xfrm>
+              <a:prstGeom prst="rect">
+                <a:avLst/>
+              </a:prstGeom>
+            </p:spPr>
+            <p:style>
+              <a:lnRef idx="2">
+                <a:schemeClr val="dk1"/>
+              </a:lnRef>
+              <a:fillRef idx="1">
+                <a:schemeClr val="lt1"/>
+              </a:fillRef>
+              <a:effectRef idx="0">
+                <a:schemeClr val="dk1"/>
+              </a:effectRef>
+              <a:fontRef idx="minor">
+                <a:schemeClr val="dk1"/>
+              </a:fontRef>
+            </p:style>
+            <p:txBody>
+              <a:bodyPr rtlCol="0" anchor="ctr"/>
+              <a:lstStyle/>
+              <a:p>
+                <a:pPr algn="ctr"/>
+                <a14:m>
+                  <m:oMathPara xmlns:m="http://schemas.openxmlformats.org/officeDocument/2006/math">
+                    <m:oMathParaPr>
+                      <m:jc m:val="centerGroup"/>
+                    </m:oMathParaPr>
+                    <m:oMath xmlns:m="http://schemas.openxmlformats.org/officeDocument/2006/math">
+                      <m:r>
+                        <a:rPr lang="en-US" i="1" dirty="0" smtClean="0">
+                          <a:latin typeface="Cambria Math" panose="02040503050406030204" pitchFamily="18" charset="0"/>
+                        </a:rPr>
+                        <m:t>𝑎𝑏𝑐𝑑</m:t>
+                      </m:r>
+                    </m:oMath>
+                  </m:oMathPara>
+                </a14:m>
+                <a:endParaRPr lang="en-US" dirty="0"/>
+              </a:p>
+            </p:txBody>
+          </p:sp>
+        </mc:Choice>
+        <mc:Fallback>
+          <p:sp>
+            <p:nvSpPr>
+              <p:cNvPr id="7" name="Rectangle 6"/>
+              <p:cNvSpPr>
+                <a:spLocks noRot="1" noChangeAspect="1" noMove="1" noResize="1" noEditPoints="1" noAdjustHandles="1" noChangeArrowheads="1" noChangeShapeType="1" noTextEdit="1"/>
+              </p:cNvSpPr>
+              <p:nvPr/>
+            </p:nvSpPr>
+            <p:spPr>
+              <a:xfrm>
+                <a:off x="5478165" y="2026507"/>
+                <a:ext cx="700217" cy="453081"/>
+              </a:xfrm>
+              <a:prstGeom prst="rect">
+                <a:avLst/>
+              </a:prstGeom>
+              <a:blipFill rotWithShape="0">
+                <a:blip r:embed="rId5"/>
+                <a:stretch>
+                  <a:fillRect l="-855"/>
+                </a:stretch>
+              </a:blipFill>
+            </p:spPr>
+            <p:txBody>
+              <a:bodyPr/>
+              <a:lstStyle/>
+              <a:p>
+                <a:r>
+                  <a:rPr lang="en-US">
+                    <a:noFill/>
+                  </a:rPr>
+                  <a:t> </a:t>
+                </a:r>
+              </a:p>
+            </p:txBody>
+          </p:sp>
+        </mc:Fallback>
+      </mc:AlternateContent>
+      <mc:AlternateContent xmlns:mc="http://schemas.openxmlformats.org/markup-compatibility/2006">
+        <mc:Choice xmlns:a14="http://schemas.microsoft.com/office/drawing/2010/main" Requires="a14">
+          <p:sp>
+            <p:nvSpPr>
+              <p:cNvPr id="8" name="Rectangle 7"/>
+              <p:cNvSpPr/>
+              <p:nvPr/>
+            </p:nvSpPr>
+            <p:spPr>
+              <a:xfrm>
+                <a:off x="6178382" y="2026507"/>
+                <a:ext cx="1318050" cy="453081"/>
+              </a:xfrm>
+              <a:prstGeom prst="rect">
+                <a:avLst/>
+              </a:prstGeom>
+            </p:spPr>
+            <p:style>
+              <a:lnRef idx="2">
+                <a:schemeClr val="dk1"/>
+              </a:lnRef>
+              <a:fillRef idx="1">
+                <a:schemeClr val="lt1"/>
+              </a:fillRef>
+              <a:effectRef idx="0">
+                <a:schemeClr val="dk1"/>
+              </a:effectRef>
+              <a:fontRef idx="minor">
+                <a:schemeClr val="dk1"/>
+              </a:fontRef>
+            </p:style>
+            <p:txBody>
+              <a:bodyPr rtlCol="0" anchor="ctr"/>
+              <a:lstStyle/>
+              <a:p>
+                <a:pPr algn="ctr"/>
+                <a14:m>
+                  <m:oMathPara xmlns:m="http://schemas.openxmlformats.org/officeDocument/2006/math">
+                    <m:oMathParaPr>
+                      <m:jc m:val="centerGroup"/>
+                    </m:oMathParaPr>
+                    <m:oMath xmlns:m="http://schemas.openxmlformats.org/officeDocument/2006/math">
+                      <m:r>
+                        <a:rPr lang="en-US" i="1" dirty="0" smtClean="0">
+                          <a:latin typeface="Cambria Math" panose="02040503050406030204" pitchFamily="18" charset="0"/>
+                        </a:rPr>
+                        <m:t>𝑢𝑠𝑒𝑟𝐼𝑛𝑝𝑢𝑡</m:t>
+                      </m:r>
+                      <m:r>
+                        <a:rPr lang="en-US" i="1" dirty="0" smtClean="0">
+                          <a:latin typeface="Cambria Math" panose="02040503050406030204" pitchFamily="18" charset="0"/>
+                        </a:rPr>
+                        <m:t>()</m:t>
+                      </m:r>
+                    </m:oMath>
+                  </m:oMathPara>
+                </a14:m>
+                <a:endParaRPr lang="en-US" dirty="0"/>
+              </a:p>
+            </p:txBody>
+          </p:sp>
+        </mc:Choice>
+        <mc:Fallback>
+          <p:sp>
+            <p:nvSpPr>
+              <p:cNvPr id="8" name="Rectangle 7"/>
+              <p:cNvSpPr>
+                <a:spLocks noRot="1" noChangeAspect="1" noMove="1" noResize="1" noEditPoints="1" noAdjustHandles="1" noChangeArrowheads="1" noChangeShapeType="1" noTextEdit="1"/>
+              </p:cNvSpPr>
+              <p:nvPr/>
+            </p:nvSpPr>
+            <p:spPr>
+              <a:xfrm>
+                <a:off x="6178382" y="2026507"/>
+                <a:ext cx="1318050" cy="453081"/>
+              </a:xfrm>
+              <a:prstGeom prst="rect">
+                <a:avLst/>
+              </a:prstGeom>
+              <a:blipFill rotWithShape="0">
+                <a:blip r:embed="rId6"/>
+                <a:stretch>
+                  <a:fillRect l="-6422" r="-2294"/>
+                </a:stretch>
+              </a:blipFill>
+            </p:spPr>
+            <p:txBody>
+              <a:bodyPr/>
+              <a:lstStyle/>
+              <a:p>
+                <a:r>
+                  <a:rPr lang="en-US">
+                    <a:noFill/>
+                  </a:rPr>
+                  <a:t> </a:t>
+                </a:r>
+              </a:p>
+            </p:txBody>
+          </p:sp>
+        </mc:Fallback>
+      </mc:AlternateContent>
+      <p:sp>
+        <p:nvSpPr>
+          <p:cNvPr id="9" name="Right Brace 8"/>
+          <p:cNvSpPr/>
+          <p:nvPr/>
+        </p:nvSpPr>
+        <p:spPr>
+          <a:xfrm rot="5400000">
+            <a:off x="4023756" y="1871446"/>
+            <a:ext cx="107950" cy="1400434"/>
+          </a:xfrm>
+          <a:prstGeom prst="rightBrace">
+            <a:avLst>
+              <a:gd name="adj1" fmla="val 8333"/>
+              <a:gd name="adj2" fmla="val 49547"/>
+            </a:avLst>
+          </a:prstGeom>
+        </p:spPr>
+        <p:style>
+          <a:lnRef idx="2">
+            <a:schemeClr val="dk1"/>
+          </a:lnRef>
+          <a:fillRef idx="0">
+            <a:schemeClr val="dk1"/>
+          </a:fillRef>
+          <a:effectRef idx="1">
+            <a:schemeClr val="dk1"/>
+          </a:effectRef>
+          <a:fontRef idx="minor">
+            <a:schemeClr val="tx1"/>
+          </a:fontRef>
+        </p:style>
+        <p:txBody>
+          <a:bodyPr rtlCol="0" anchor="ctr"/>
+          <a:lstStyle/>
+          <a:p>
+            <a:pPr algn="ctr"/>
+            <a:endParaRPr lang="en-US"/>
+          </a:p>
+        </p:txBody>
+      </p:sp>
+      <p:sp>
+        <p:nvSpPr>
+          <p:cNvPr id="10" name="TextBox 9"/>
+          <p:cNvSpPr txBox="1"/>
+          <p:nvPr/>
+        </p:nvSpPr>
+        <p:spPr>
+          <a:xfrm>
+            <a:off x="3170792" y="2593887"/>
+            <a:ext cx="1963614" cy="276999"/>
+          </a:xfrm>
+          <a:prstGeom prst="rect">
+            <a:avLst/>
+          </a:prstGeom>
+          <a:noFill/>
+        </p:spPr>
+        <p:txBody>
+          <a:bodyPr wrap="none" rtlCol="0">
+            <a:spAutoFit/>
+          </a:bodyPr>
+          <a:lstStyle/>
+          <a:p>
+            <a:r>
+              <a:rPr lang="en-US" sz="1200" dirty="0" smtClean="0"/>
+              <a:t>Possible max and min length</a:t>
+            </a:r>
+            <a:endParaRPr lang="en-US" sz="1200" dirty="0"/>
+          </a:p>
+        </p:txBody>
+      </p:sp>
+      <p:sp>
+        <p:nvSpPr>
+          <p:cNvPr id="11" name="Right Brace 10"/>
+          <p:cNvSpPr/>
+          <p:nvPr/>
+        </p:nvSpPr>
+        <p:spPr>
+          <a:xfrm rot="16200000">
+            <a:off x="5424190" y="1237391"/>
+            <a:ext cx="107950" cy="1400434"/>
+          </a:xfrm>
+          <a:prstGeom prst="rightBrace">
+            <a:avLst>
+              <a:gd name="adj1" fmla="val 8333"/>
+              <a:gd name="adj2" fmla="val 49547"/>
+            </a:avLst>
+          </a:prstGeom>
+        </p:spPr>
+        <p:style>
+          <a:lnRef idx="2">
+            <a:schemeClr val="dk1"/>
+          </a:lnRef>
+          <a:fillRef idx="0">
+            <a:schemeClr val="dk1"/>
+          </a:fillRef>
+          <a:effectRef idx="1">
+            <a:schemeClr val="dk1"/>
+          </a:effectRef>
+          <a:fontRef idx="minor">
+            <a:schemeClr val="tx1"/>
+          </a:fontRef>
+        </p:style>
+        <p:txBody>
+          <a:bodyPr rtlCol="0" anchor="ctr"/>
+          <a:lstStyle/>
+          <a:p>
+            <a:pPr algn="ctr"/>
+            <a:endParaRPr lang="en-US"/>
+          </a:p>
+        </p:txBody>
+      </p:sp>
+      <p:sp>
+        <p:nvSpPr>
+          <p:cNvPr id="12" name="TextBox 11"/>
+          <p:cNvSpPr txBox="1"/>
+          <p:nvPr/>
+        </p:nvSpPr>
+        <p:spPr>
+          <a:xfrm>
+            <a:off x="4869312" y="1606632"/>
+            <a:ext cx="1217706" cy="276999"/>
+          </a:xfrm>
+          <a:prstGeom prst="rect">
+            <a:avLst/>
+          </a:prstGeom>
+          <a:noFill/>
+        </p:spPr>
+        <p:txBody>
+          <a:bodyPr wrap="none" rtlCol="0">
+            <a:spAutoFit/>
+          </a:bodyPr>
+          <a:lstStyle/>
+          <a:p>
+            <a:r>
+              <a:rPr lang="en-US" sz="1200" dirty="0" smtClean="0"/>
+              <a:t>Possible prefixes</a:t>
+            </a:r>
+            <a:endParaRPr lang="en-US" sz="1200" dirty="0"/>
+          </a:p>
+        </p:txBody>
+      </p:sp>
+      <p:sp>
+        <p:nvSpPr>
+          <p:cNvPr id="13" name="Right Brace 12"/>
+          <p:cNvSpPr/>
+          <p:nvPr/>
+        </p:nvSpPr>
+        <p:spPr>
+          <a:xfrm rot="5400000">
+            <a:off x="6783432" y="1912638"/>
+            <a:ext cx="107950" cy="1318050"/>
+          </a:xfrm>
+          <a:prstGeom prst="rightBrace">
+            <a:avLst>
+              <a:gd name="adj1" fmla="val 8333"/>
+              <a:gd name="adj2" fmla="val 49547"/>
+            </a:avLst>
+          </a:prstGeom>
+        </p:spPr>
+        <p:style>
+          <a:lnRef idx="2">
+            <a:schemeClr val="dk1"/>
+          </a:lnRef>
+          <a:fillRef idx="0">
+            <a:schemeClr val="dk1"/>
+          </a:fillRef>
+          <a:effectRef idx="1">
+            <a:schemeClr val="dk1"/>
+          </a:effectRef>
+          <a:fontRef idx="minor">
+            <a:schemeClr val="tx1"/>
+          </a:fontRef>
+        </p:style>
+        <p:txBody>
+          <a:bodyPr rtlCol="0" anchor="ctr"/>
+          <a:lstStyle/>
+          <a:p>
+            <a:pPr algn="ctr"/>
+            <a:endParaRPr lang="en-US"/>
+          </a:p>
+        </p:txBody>
+      </p:sp>
+      <p:sp>
+        <p:nvSpPr>
+          <p:cNvPr id="14" name="TextBox 13"/>
+          <p:cNvSpPr txBox="1"/>
+          <p:nvPr/>
+        </p:nvSpPr>
+        <p:spPr>
+          <a:xfrm>
+            <a:off x="5307057" y="2587450"/>
+            <a:ext cx="3060700" cy="276999"/>
+          </a:xfrm>
+          <a:prstGeom prst="rect">
+            <a:avLst/>
+          </a:prstGeom>
+          <a:noFill/>
+        </p:spPr>
+        <p:txBody>
+          <a:bodyPr wrap="square" rtlCol="0">
+            <a:spAutoFit/>
+          </a:bodyPr>
+          <a:lstStyle/>
+          <a:p>
+            <a:r>
+              <a:rPr lang="en-US" sz="1200" dirty="0" smtClean="0"/>
+              <a:t>Possible string contains evaluated dynamically</a:t>
+            </a:r>
+            <a:endParaRPr lang="en-US" sz="1200" dirty="0"/>
+          </a:p>
+        </p:txBody>
+      </p:sp>
+    </p:spTree>
+    <p:extLst>
+      <p:ext uri="{BB962C8B-B14F-4D97-AF65-F5344CB8AC3E}">
+        <p14:creationId xmlns:p14="http://schemas.microsoft.com/office/powerpoint/2010/main" val="691113519"/>
+      </p:ext>
+    </p:extLst>
+  </p:cSld>
+  <p:clrMapOvr>
+    <a:masterClrMapping/>
+  </p:clrMapOvr>
+</p:sld>
+</file>
+
 <file path=ppt/slides/slide2.xml><?xml version="1.0" encoding="utf-8"?>
 <p:sld xmlns:a="http://schemas.openxmlformats.org/drawingml/2006/main" xmlns:r="http://schemas.openxmlformats.org/officeDocument/2006/relationships" xmlns:p="http://schemas.openxmlformats.org/presentationml/2006/main">
   <p:cSld>
@@ -7437,8 +8162,8 @@
           </a:p>
         </p:txBody>
       </p:sp>
-      <mc:AlternateContent xmlns:mc="http://schemas.openxmlformats.org/markup-compatibility/2006">
-        <mc:Choice xmlns:a14="http://schemas.microsoft.com/office/drawing/2010/main" Requires="a14">
+      <mc:AlternateContent xmlns:mc="http://schemas.openxmlformats.org/markup-compatibility/2006" xmlns:a14="http://schemas.microsoft.com/office/drawing/2010/main">
+        <mc:Choice Requires="a14">
           <p:sp>
             <p:nvSpPr>
               <p:cNvPr id="21" name="TextBox 20"/>
@@ -7575,7 +8300,7 @@
             </p:txBody>
           </p:sp>
         </mc:Choice>
-        <mc:Fallback>
+        <mc:Fallback xmlns="">
           <p:sp>
             <p:nvSpPr>
               <p:cNvPr id="21" name="TextBox 20"/>
@@ -7724,8 +8449,8 @@
           </a:fontRef>
         </p:style>
       </p:cxnSp>
-      <mc:AlternateContent xmlns:mc="http://schemas.openxmlformats.org/markup-compatibility/2006">
-        <mc:Choice xmlns:a14="http://schemas.microsoft.com/office/drawing/2010/main" Requires="a14">
+      <mc:AlternateContent xmlns:mc="http://schemas.openxmlformats.org/markup-compatibility/2006" xmlns:a14="http://schemas.microsoft.com/office/drawing/2010/main">
+        <mc:Choice Requires="a14">
           <p:sp>
             <p:nvSpPr>
               <p:cNvPr id="20" name="TextBox 19"/>
@@ -7862,7 +8587,7 @@
             </p:txBody>
           </p:sp>
         </mc:Choice>
-        <mc:Fallback>
+        <mc:Fallback xmlns="">
           <p:sp>
             <p:nvSpPr>
               <p:cNvPr id="20" name="TextBox 19"/>
@@ -7937,8 +8662,8 @@
           </a:fontRef>
         </p:style>
       </p:cxnSp>
-      <mc:AlternateContent xmlns:mc="http://schemas.openxmlformats.org/markup-compatibility/2006">
-        <mc:Choice xmlns:a14="http://schemas.microsoft.com/office/drawing/2010/main" Requires="a14">
+      <mc:AlternateContent xmlns:mc="http://schemas.openxmlformats.org/markup-compatibility/2006" xmlns:a14="http://schemas.microsoft.com/office/drawing/2010/main">
+        <mc:Choice Requires="a14">
           <p:sp>
             <p:nvSpPr>
               <p:cNvPr id="30" name="TextBox 29"/>
@@ -7982,7 +8707,7 @@
             </p:txBody>
           </p:sp>
         </mc:Choice>
-        <mc:Fallback>
+        <mc:Fallback xmlns="">
           <p:sp>
             <p:nvSpPr>
               <p:cNvPr id="30" name="TextBox 29"/>
@@ -8310,8 +9035,8 @@
           </a:p>
         </p:txBody>
       </p:sp>
-      <mc:AlternateContent xmlns:mc="http://schemas.openxmlformats.org/markup-compatibility/2006">
-        <mc:Choice xmlns:a14="http://schemas.microsoft.com/office/drawing/2010/main" Requires="a14">
+      <mc:AlternateContent xmlns:mc="http://schemas.openxmlformats.org/markup-compatibility/2006" xmlns:a14="http://schemas.microsoft.com/office/drawing/2010/main">
+        <mc:Choice Requires="a14">
           <p:sp>
             <p:nvSpPr>
               <p:cNvPr id="21" name="TextBox 20"/>
@@ -8408,13 +9133,7 @@
                         <a:rPr lang="en-US" sz="2400" b="0" i="1" smtClean="0">
                           <a:latin typeface="Cambria Math" panose="02040503050406030204" pitchFamily="18" charset="0"/>
                         </a:rPr>
-                        <m:t>,</m:t>
-                      </m:r>
-                      <m:r>
-                        <a:rPr lang="en-US" sz="2400" b="0" i="1" smtClean="0">
-                          <a:latin typeface="Cambria Math" panose="02040503050406030204" pitchFamily="18" charset="0"/>
-                        </a:rPr>
-                        <m:t> </m:t>
+                        <m:t>, </m:t>
                       </m:r>
                     </m:oMath>
                   </m:oMathPara>
@@ -8517,7 +9236,7 @@
             </p:txBody>
           </p:sp>
         </mc:Choice>
-        <mc:Fallback>
+        <mc:Fallback xmlns="">
           <p:sp>
             <p:nvSpPr>
               <p:cNvPr id="21" name="TextBox 20"/>
@@ -8631,8 +9350,8 @@
           </a:p>
         </p:txBody>
       </p:sp>
-      <mc:AlternateContent xmlns:mc="http://schemas.openxmlformats.org/markup-compatibility/2006">
-        <mc:Choice xmlns:a14="http://schemas.microsoft.com/office/drawing/2010/main" Requires="a14">
+      <mc:AlternateContent xmlns:mc="http://schemas.openxmlformats.org/markup-compatibility/2006" xmlns:a14="http://schemas.microsoft.com/office/drawing/2010/main">
+        <mc:Choice Requires="a14">
           <p:sp>
             <p:nvSpPr>
               <p:cNvPr id="30" name="TextBox 29"/>
@@ -8676,7 +9395,7 @@
             </p:txBody>
           </p:sp>
         </mc:Choice>
-        <mc:Fallback>
+        <mc:Fallback xmlns="">
           <p:sp>
             <p:nvSpPr>
               <p:cNvPr id="30" name="TextBox 29"/>
@@ -8767,12 +9486,12 @@
           <a:graphicData uri="http://schemas.openxmlformats.org/presentationml/2006/ole">
             <mc:AlternateContent xmlns:mc="http://schemas.openxmlformats.org/markup-compatibility/2006">
               <mc:Choice xmlns:v="urn:schemas-microsoft-com:vml" Requires="v">
-                <p:oleObj spid="_x0000_s1083" name="Visio" r:id="rId3" imgW="3752882" imgH="4562496" progId="Visio.Drawing.15">
+                <p:oleObj spid="_x0000_s1084" name="Visio" r:id="rId4" imgW="3752882" imgH="4562496" progId="Visio.Drawing.15">
                   <p:embed/>
                 </p:oleObj>
               </mc:Choice>
               <mc:Fallback>
-                <p:oleObj name="Visio" r:id="rId3" imgW="3752882" imgH="4562496" progId="Visio.Drawing.15">
+                <p:oleObj name="Visio" r:id="rId4" imgW="3752882" imgH="4562496" progId="Visio.Drawing.15">
                   <p:embed/>
                   <p:pic>
                     <p:nvPicPr>
@@ -8781,7 +9500,7 @@
                       <p:nvPr/>
                     </p:nvPicPr>
                     <p:blipFill>
-                      <a:blip r:embed="rId4"/>
+                      <a:blip r:embed="rId5"/>
                       <a:stretch>
                         <a:fillRect/>
                       </a:stretch>

</xml_diff>

<commit_message>
Change in Clotho workflow image (figure 1) to make all fonts same and save a bit space
</commit_message>
<xml_diff>
--- a/images/ArrayIndex.pptx
+++ b/images/ArrayIndex.pptx
@@ -253,7 +253,7 @@
           <a:p>
             <a:fld id="{6E95F330-DC13-4D7E-9BB4-97CFBD9A349B}" type="datetimeFigureOut">
               <a:rPr lang="en-US" smtClean="0"/>
-              <a:t>6/22/2015</a:t>
+              <a:t>7/1/2015</a:t>
             </a:fld>
             <a:endParaRPr lang="en-US"/>
           </a:p>
@@ -423,7 +423,7 @@
           <a:p>
             <a:fld id="{6E95F330-DC13-4D7E-9BB4-97CFBD9A349B}" type="datetimeFigureOut">
               <a:rPr lang="en-US" smtClean="0"/>
-              <a:t>6/22/2015</a:t>
+              <a:t>7/1/2015</a:t>
             </a:fld>
             <a:endParaRPr lang="en-US"/>
           </a:p>
@@ -603,7 +603,7 @@
           <a:p>
             <a:fld id="{6E95F330-DC13-4D7E-9BB4-97CFBD9A349B}" type="datetimeFigureOut">
               <a:rPr lang="en-US" smtClean="0"/>
-              <a:t>6/22/2015</a:t>
+              <a:t>7/1/2015</a:t>
             </a:fld>
             <a:endParaRPr lang="en-US"/>
           </a:p>
@@ -773,7 +773,7 @@
           <a:p>
             <a:fld id="{6E95F330-DC13-4D7E-9BB4-97CFBD9A349B}" type="datetimeFigureOut">
               <a:rPr lang="en-US" smtClean="0"/>
-              <a:t>6/22/2015</a:t>
+              <a:t>7/1/2015</a:t>
             </a:fld>
             <a:endParaRPr lang="en-US"/>
           </a:p>
@@ -1019,7 +1019,7 @@
           <a:p>
             <a:fld id="{6E95F330-DC13-4D7E-9BB4-97CFBD9A349B}" type="datetimeFigureOut">
               <a:rPr lang="en-US" smtClean="0"/>
-              <a:t>6/22/2015</a:t>
+              <a:t>7/1/2015</a:t>
             </a:fld>
             <a:endParaRPr lang="en-US"/>
           </a:p>
@@ -1251,7 +1251,7 @@
           <a:p>
             <a:fld id="{6E95F330-DC13-4D7E-9BB4-97CFBD9A349B}" type="datetimeFigureOut">
               <a:rPr lang="en-US" smtClean="0"/>
-              <a:t>6/22/2015</a:t>
+              <a:t>7/1/2015</a:t>
             </a:fld>
             <a:endParaRPr lang="en-US"/>
           </a:p>
@@ -1618,7 +1618,7 @@
           <a:p>
             <a:fld id="{6E95F330-DC13-4D7E-9BB4-97CFBD9A349B}" type="datetimeFigureOut">
               <a:rPr lang="en-US" smtClean="0"/>
-              <a:t>6/22/2015</a:t>
+              <a:t>7/1/2015</a:t>
             </a:fld>
             <a:endParaRPr lang="en-US"/>
           </a:p>
@@ -1736,7 +1736,7 @@
           <a:p>
             <a:fld id="{6E95F330-DC13-4D7E-9BB4-97CFBD9A349B}" type="datetimeFigureOut">
               <a:rPr lang="en-US" smtClean="0"/>
-              <a:t>6/22/2015</a:t>
+              <a:t>7/1/2015</a:t>
             </a:fld>
             <a:endParaRPr lang="en-US"/>
           </a:p>
@@ -1831,7 +1831,7 @@
           <a:p>
             <a:fld id="{6E95F330-DC13-4D7E-9BB4-97CFBD9A349B}" type="datetimeFigureOut">
               <a:rPr lang="en-US" smtClean="0"/>
-              <a:t>6/22/2015</a:t>
+              <a:t>7/1/2015</a:t>
             </a:fld>
             <a:endParaRPr lang="en-US"/>
           </a:p>
@@ -2108,7 +2108,7 @@
           <a:p>
             <a:fld id="{6E95F330-DC13-4D7E-9BB4-97CFBD9A349B}" type="datetimeFigureOut">
               <a:rPr lang="en-US" smtClean="0"/>
-              <a:t>6/22/2015</a:t>
+              <a:t>7/1/2015</a:t>
             </a:fld>
             <a:endParaRPr lang="en-US"/>
           </a:p>
@@ -2361,7 +2361,7 @@
           <a:p>
             <a:fld id="{6E95F330-DC13-4D7E-9BB4-97CFBD9A349B}" type="datetimeFigureOut">
               <a:rPr lang="en-US" smtClean="0"/>
-              <a:t>6/22/2015</a:t>
+              <a:t>7/1/2015</a:t>
             </a:fld>
             <a:endParaRPr lang="en-US"/>
           </a:p>
@@ -2574,7 +2574,7 @@
           <a:p>
             <a:fld id="{6E95F330-DC13-4D7E-9BB4-97CFBD9A349B}" type="datetimeFigureOut">
               <a:rPr lang="en-US" smtClean="0"/>
-              <a:t>6/22/2015</a:t>
+              <a:t>7/1/2015</a:t>
             </a:fld>
             <a:endParaRPr lang="en-US"/>
           </a:p>
@@ -4872,8 +4872,8 @@
           <a:chExt cx="0" cy="0"/>
         </a:xfrm>
       </p:grpSpPr>
-      <mc:AlternateContent xmlns:mc="http://schemas.openxmlformats.org/markup-compatibility/2006">
-        <mc:Choice xmlns:a14="http://schemas.microsoft.com/office/drawing/2010/main" Requires="a14">
+      <mc:AlternateContent xmlns:mc="http://schemas.openxmlformats.org/markup-compatibility/2006" xmlns:a14="http://schemas.microsoft.com/office/drawing/2010/main">
+        <mc:Choice Requires="a14">
           <p:sp>
             <p:nvSpPr>
               <p:cNvPr id="4" name="Rectangle 3"/>
@@ -4928,7 +4928,7 @@
             </p:txBody>
           </p:sp>
         </mc:Choice>
-        <mc:Fallback>
+        <mc:Fallback xmlns="">
           <p:sp>
             <p:nvSpPr>
               <p:cNvPr id="4" name="Rectangle 3"/>
@@ -4967,8 +4967,8 @@
           </p:sp>
         </mc:Fallback>
       </mc:AlternateContent>
-      <mc:AlternateContent xmlns:mc="http://schemas.openxmlformats.org/markup-compatibility/2006">
-        <mc:Choice xmlns:a14="http://schemas.microsoft.com/office/drawing/2010/main" Requires="a14">
+      <mc:AlternateContent xmlns:mc="http://schemas.openxmlformats.org/markup-compatibility/2006" xmlns:a14="http://schemas.microsoft.com/office/drawing/2010/main">
+        <mc:Choice Requires="a14">
           <p:sp>
             <p:nvSpPr>
               <p:cNvPr id="5" name="Rectangle 4"/>
@@ -5023,7 +5023,7 @@
             </p:txBody>
           </p:sp>
         </mc:Choice>
-        <mc:Fallback>
+        <mc:Fallback xmlns="">
           <p:sp>
             <p:nvSpPr>
               <p:cNvPr id="5" name="Rectangle 4"/>
@@ -5062,8 +5062,8 @@
           </p:sp>
         </mc:Fallback>
       </mc:AlternateContent>
-      <mc:AlternateContent xmlns:mc="http://schemas.openxmlformats.org/markup-compatibility/2006">
-        <mc:Choice xmlns:a14="http://schemas.microsoft.com/office/drawing/2010/main" Requires="a14">
+      <mc:AlternateContent xmlns:mc="http://schemas.openxmlformats.org/markup-compatibility/2006" xmlns:a14="http://schemas.microsoft.com/office/drawing/2010/main">
+        <mc:Choice Requires="a14">
           <p:sp>
             <p:nvSpPr>
               <p:cNvPr id="6" name="Rectangle 5"/>
@@ -5118,7 +5118,7 @@
             </p:txBody>
           </p:sp>
         </mc:Choice>
-        <mc:Fallback>
+        <mc:Fallback xmlns="">
           <p:sp>
             <p:nvSpPr>
               <p:cNvPr id="6" name="Rectangle 5"/>
@@ -5157,8 +5157,8 @@
           </p:sp>
         </mc:Fallback>
       </mc:AlternateContent>
-      <mc:AlternateContent xmlns:mc="http://schemas.openxmlformats.org/markup-compatibility/2006">
-        <mc:Choice xmlns:a14="http://schemas.microsoft.com/office/drawing/2010/main" Requires="a14">
+      <mc:AlternateContent xmlns:mc="http://schemas.openxmlformats.org/markup-compatibility/2006" xmlns:a14="http://schemas.microsoft.com/office/drawing/2010/main">
+        <mc:Choice Requires="a14">
           <p:sp>
             <p:nvSpPr>
               <p:cNvPr id="7" name="Rectangle 6"/>
@@ -5213,7 +5213,7 @@
             </p:txBody>
           </p:sp>
         </mc:Choice>
-        <mc:Fallback>
+        <mc:Fallback xmlns="">
           <p:sp>
             <p:nvSpPr>
               <p:cNvPr id="7" name="Rectangle 6"/>
@@ -5252,8 +5252,8 @@
           </p:sp>
         </mc:Fallback>
       </mc:AlternateContent>
-      <mc:AlternateContent xmlns:mc="http://schemas.openxmlformats.org/markup-compatibility/2006">
-        <mc:Choice xmlns:a14="http://schemas.microsoft.com/office/drawing/2010/main" Requires="a14">
+      <mc:AlternateContent xmlns:mc="http://schemas.openxmlformats.org/markup-compatibility/2006" xmlns:a14="http://schemas.microsoft.com/office/drawing/2010/main">
+        <mc:Choice Requires="a14">
           <p:sp>
             <p:nvSpPr>
               <p:cNvPr id="8" name="Rectangle 7"/>
@@ -5314,7 +5314,7 @@
             </p:txBody>
           </p:sp>
         </mc:Choice>
-        <mc:Fallback>
+        <mc:Fallback xmlns="">
           <p:sp>
             <p:nvSpPr>
               <p:cNvPr id="8" name="Rectangle 7"/>
@@ -9486,12 +9486,12 @@
           <a:graphicData uri="http://schemas.openxmlformats.org/presentationml/2006/ole">
             <mc:AlternateContent xmlns:mc="http://schemas.openxmlformats.org/markup-compatibility/2006">
               <mc:Choice xmlns:v="urn:schemas-microsoft-com:vml" Requires="v">
-                <p:oleObj spid="_x0000_s1084" name="Visio" r:id="rId4" imgW="3752882" imgH="4562496" progId="Visio.Drawing.15">
+                <p:oleObj spid="_x0000_s1090" name="Visio" r:id="rId3" imgW="3752882" imgH="4562496" progId="Visio.Drawing.15">
                   <p:embed/>
                 </p:oleObj>
               </mc:Choice>
               <mc:Fallback>
-                <p:oleObj name="Visio" r:id="rId4" imgW="3752882" imgH="4562496" progId="Visio.Drawing.15">
+                <p:oleObj name="Visio" r:id="rId3" imgW="3752882" imgH="4562496" progId="Visio.Drawing.15">
                   <p:embed/>
                   <p:pic>
                     <p:nvPicPr>
@@ -9500,7 +9500,7 @@
                       <p:nvPr/>
                     </p:nvPicPr>
                     <p:blipFill>
-                      <a:blip r:embed="rId5"/>
+                      <a:blip r:embed="rId4"/>
                       <a:stretch>
                         <a:fillRect/>
                       </a:stretch>
@@ -9713,8 +9713,8 @@
         </p:nvSpPr>
         <p:spPr>
           <a:xfrm>
-            <a:off x="2031736" y="2927006"/>
-            <a:ext cx="915484" cy="589006"/>
+            <a:off x="1940349" y="2927006"/>
+            <a:ext cx="1006871" cy="589006"/>
           </a:xfrm>
           <a:prstGeom prst="roundRect">
             <a:avLst/>
@@ -9741,10 +9741,10 @@
           <a:p>
             <a:pPr algn="ctr"/>
             <a:r>
-              <a:rPr lang="en-US" sz="1400" dirty="0" smtClean="0"/>
+              <a:rPr lang="en-US" sz="1600" dirty="0" smtClean="0"/>
               <a:t>Input program</a:t>
             </a:r>
-            <a:endParaRPr lang="en-US" sz="1400" dirty="0"/>
+            <a:endParaRPr lang="en-US" sz="1600" dirty="0"/>
           </a:p>
         </p:txBody>
       </p:sp>
@@ -9799,7 +9799,7 @@
         <p:spPr>
           <a:xfrm>
             <a:off x="7186005" y="3783532"/>
-            <a:ext cx="1955745" cy="716692"/>
+            <a:ext cx="1955745" cy="544628"/>
           </a:xfrm>
           <a:prstGeom prst="rect">
             <a:avLst/>
@@ -9976,10 +9976,10 @@
           <a:p>
             <a:pPr algn="ctr"/>
             <a:r>
-              <a:rPr lang="en-US" sz="1400" dirty="0" smtClean="0"/>
+              <a:rPr lang="en-US" sz="1600" dirty="0" smtClean="0"/>
               <a:t>Repaired program</a:t>
             </a:r>
-            <a:endParaRPr lang="en-US" sz="1400" dirty="0"/>
+            <a:endParaRPr lang="en-US" sz="1600" dirty="0"/>
           </a:p>
         </p:txBody>
       </p:sp>
@@ -9991,8 +9991,8 @@
         </p:nvSpPr>
         <p:spPr>
           <a:xfrm>
-            <a:off x="9141750" y="2861182"/>
-            <a:ext cx="708338" cy="708338"/>
+            <a:off x="9141749" y="2854925"/>
+            <a:ext cx="739309" cy="739309"/>
           </a:xfrm>
           <a:prstGeom prst="ellipse">
             <a:avLst/>
@@ -10018,10 +10018,10 @@
           <a:p>
             <a:pPr algn="ctr"/>
             <a:r>
-              <a:rPr lang="en-US" sz="1400" dirty="0" smtClean="0"/>
+              <a:rPr lang="en-US" sz="1600" dirty="0" smtClean="0"/>
               <a:t>Run</a:t>
             </a:r>
-            <a:endParaRPr lang="en-US" sz="1400" dirty="0"/>
+            <a:endParaRPr lang="en-US" sz="1600" dirty="0"/>
           </a:p>
         </p:txBody>
       </p:sp>
@@ -10071,9 +10071,9 @@
           <p:nvPr/>
         </p:nvCxnSpPr>
         <p:spPr>
-          <a:xfrm flipV="1">
-            <a:off x="8893653" y="3215351"/>
-            <a:ext cx="248097" cy="6158"/>
+          <a:xfrm>
+            <a:off x="8893653" y="3221509"/>
+            <a:ext cx="248096" cy="3071"/>
           </a:xfrm>
           <a:prstGeom prst="straightConnector1">
             <a:avLst/>
@@ -10108,13 +10108,13 @@
         </p:nvCxnSpPr>
         <p:spPr>
           <a:xfrm rot="5400000">
-            <a:off x="9032656" y="3678615"/>
-            <a:ext cx="572358" cy="354169"/>
+            <a:off x="9095771" y="3640213"/>
+            <a:ext cx="461612" cy="369654"/>
           </a:xfrm>
           <a:prstGeom prst="bentConnector2">
             <a:avLst/>
           </a:prstGeom>
-          <a:ln>
+          <a:ln w="9525">
             <a:tailEnd type="triangle"/>
           </a:ln>
         </p:spPr>
@@ -10136,19 +10136,18 @@
       <p:cxnSp>
         <p:nvCxnSpPr>
           <p:cNvPr id="43" name="Straight Connector 42"/>
-          <p:cNvCxnSpPr>
-            <a:endCxn id="61" idx="1"/>
-          </p:cNvCxnSpPr>
+          <p:cNvCxnSpPr/>
           <p:nvPr/>
         </p:nvCxnSpPr>
         <p:spPr>
           <a:xfrm>
-            <a:off x="6269583" y="4141878"/>
+            <a:off x="6269583" y="4078162"/>
             <a:ext cx="916422" cy="0"/>
           </a:xfrm>
           <a:prstGeom prst="line">
             <a:avLst/>
           </a:prstGeom>
+          <a:ln w="12700"/>
         </p:spPr>
         <p:style>
           <a:lnRef idx="1">
@@ -10175,13 +10174,13 @@
         </p:nvCxnSpPr>
         <p:spPr>
           <a:xfrm rot="5400000" flipH="1" flipV="1">
-            <a:off x="5899806" y="3591287"/>
-            <a:ext cx="920379" cy="180825"/>
+            <a:off x="5931669" y="3559424"/>
+            <a:ext cx="856653" cy="180825"/>
           </a:xfrm>
           <a:prstGeom prst="bentConnector2">
             <a:avLst/>
           </a:prstGeom>
-          <a:ln w="9525">
+          <a:ln w="12700">
             <a:tailEnd type="triangle"/>
           </a:ln>
         </p:spPr>
@@ -10210,6 +10209,13 @@
   <p:clrMapOvr>
     <a:masterClrMapping/>
   </p:clrMapOvr>
+  <p:timing>
+    <p:tnLst>
+      <p:par>
+        <p:cTn id="1" dur="indefinite" restart="never" nodeType="tmRoot"/>
+      </p:par>
+    </p:tnLst>
+  </p:timing>
 </p:sld>
 </file>
 

</xml_diff>

<commit_message>
Minor changes in image
</commit_message>
<xml_diff>
--- a/images/ArrayIndex.pptx
+++ b/images/ArrayIndex.pptx
@@ -5402,8 +5402,8 @@
         </p:nvSpPr>
         <p:spPr>
           <a:xfrm>
-            <a:off x="3170792" y="2593887"/>
-            <a:ext cx="1963614" cy="276999"/>
+            <a:off x="2865898" y="2587450"/>
+            <a:ext cx="2262158" cy="261610"/>
           </a:xfrm>
           <a:prstGeom prst="rect">
             <a:avLst/>
@@ -5417,10 +5417,16 @@
           <a:lstStyle/>
           <a:p>
             <a:r>
-              <a:rPr lang="en-US" sz="1200" dirty="0" smtClean="0"/>
+              <a:rPr lang="en-US" sz="1100" dirty="0" smtClean="0">
+                <a:latin typeface="Consolas" panose="020B0609020204030204" pitchFamily="49" charset="0"/>
+                <a:cs typeface="Consolas" panose="020B0609020204030204" pitchFamily="49" charset="0"/>
+              </a:rPr>
               <a:t>Possible max and min length</a:t>
             </a:r>
-            <a:endParaRPr lang="en-US" sz="1200" dirty="0"/>
+            <a:endParaRPr lang="en-US" sz="1100" dirty="0">
+              <a:latin typeface="Consolas" panose="020B0609020204030204" pitchFamily="49" charset="0"/>
+              <a:cs typeface="Consolas" panose="020B0609020204030204" pitchFamily="49" charset="0"/>
+            </a:endParaRPr>
           </a:p>
         </p:txBody>
       </p:sp>
@@ -5473,8 +5479,8 @@
         </p:nvSpPr>
         <p:spPr>
           <a:xfrm>
-            <a:off x="4869312" y="1606632"/>
-            <a:ext cx="1217706" cy="276999"/>
+            <a:off x="4837562" y="1638528"/>
+            <a:ext cx="1492716" cy="261610"/>
           </a:xfrm>
           <a:prstGeom prst="rect">
             <a:avLst/>
@@ -5488,10 +5494,16 @@
           <a:lstStyle/>
           <a:p>
             <a:r>
-              <a:rPr lang="en-US" sz="1200" dirty="0" smtClean="0"/>
+              <a:rPr lang="en-US" sz="1100" dirty="0" smtClean="0">
+                <a:latin typeface="Consolas" panose="020B0609020204030204" pitchFamily="49" charset="0"/>
+                <a:cs typeface="Consolas" panose="020B0609020204030204" pitchFamily="49" charset="0"/>
+              </a:rPr>
               <a:t>Possible prefixes</a:t>
             </a:r>
-            <a:endParaRPr lang="en-US" sz="1200" dirty="0"/>
+            <a:endParaRPr lang="en-US" sz="1100" dirty="0">
+              <a:latin typeface="Consolas" panose="020B0609020204030204" pitchFamily="49" charset="0"/>
+              <a:cs typeface="Consolas" panose="020B0609020204030204" pitchFamily="49" charset="0"/>
+            </a:endParaRPr>
           </a:p>
         </p:txBody>
       </p:sp>
@@ -5544,8 +5556,8 @@
         </p:nvSpPr>
         <p:spPr>
           <a:xfrm>
-            <a:off x="5307057" y="2587450"/>
-            <a:ext cx="3060700" cy="276999"/>
+            <a:off x="5289565" y="2605957"/>
+            <a:ext cx="3689336" cy="261610"/>
           </a:xfrm>
           <a:prstGeom prst="rect">
             <a:avLst/>
@@ -5559,10 +5571,16 @@
           <a:lstStyle/>
           <a:p>
             <a:r>
-              <a:rPr lang="en-US" sz="1200" dirty="0" smtClean="0"/>
+              <a:rPr lang="en-US" sz="1100" dirty="0" smtClean="0">
+                <a:latin typeface="Consolas" panose="020B0609020204030204" pitchFamily="49" charset="0"/>
+                <a:cs typeface="Consolas" panose="020B0609020204030204" pitchFamily="49" charset="0"/>
+              </a:rPr>
               <a:t>Possible string contains evaluated dynamically</a:t>
             </a:r>
-            <a:endParaRPr lang="en-US" sz="1200" dirty="0"/>
+            <a:endParaRPr lang="en-US" sz="1100" dirty="0">
+              <a:latin typeface="Consolas" panose="020B0609020204030204" pitchFamily="49" charset="0"/>
+              <a:cs typeface="Consolas" panose="020B0609020204030204" pitchFamily="49" charset="0"/>
+            </a:endParaRPr>
           </a:p>
         </p:txBody>
       </p:sp>
@@ -5576,6 +5594,13 @@
   <p:clrMapOvr>
     <a:masterClrMapping/>
   </p:clrMapOvr>
+  <p:timing>
+    <p:tnLst>
+      <p:par>
+        <p:cTn id="1" dur="indefinite" restart="never" nodeType="tmRoot"/>
+      </p:par>
+    </p:tnLst>
+  </p:timing>
 </p:sld>
 </file>
 
@@ -9486,7 +9511,7 @@
           <a:graphicData uri="http://schemas.openxmlformats.org/presentationml/2006/ole">
             <mc:AlternateContent xmlns:mc="http://schemas.openxmlformats.org/markup-compatibility/2006">
               <mc:Choice xmlns:v="urn:schemas-microsoft-com:vml" Requires="v">
-                <p:oleObj spid="_x0000_s1090" name="Visio" r:id="rId3" imgW="3752882" imgH="4562496" progId="Visio.Drawing.15">
+                <p:oleObj spid="_x0000_s1091" name="Visio" r:id="rId3" imgW="3752882" imgH="4562496" progId="Visio.Drawing.15">
                   <p:embed/>
                 </p:oleObj>
               </mc:Choice>

</xml_diff>